<commit_message>
[#10 Regular Expression Matching] Add an image for Dynamic Programming.
</commit_message>
<xml_diff>
--- a/Resources/010_RegularExpressionMatching.pptx
+++ b/Resources/010_RegularExpressionMatching.pptx
@@ -66,6 +66,7 @@
     <p:sldId id="350" r:id="rId60"/>
     <p:sldId id="351" r:id="rId61"/>
     <p:sldId id="354" r:id="rId62"/>
+    <p:sldId id="371" r:id="rId63"/>
   </p:sldIdLst>
   <p:sldSz cx="12192000" cy="6858000"/>
   <p:notesSz cx="6858000" cy="9144000"/>
@@ -303,7 +304,7 @@
           <a:p>
             <a:fld id="{E27CD909-5952-48F8-A19C-6F1FFF2EAE97}" type="datetimeFigureOut">
               <a:rPr lang="zh-CN" altLang="en-US" smtClean="0"/>
-              <a:t>2017/6/29</a:t>
+              <a:t>2017/6/30</a:t>
             </a:fld>
             <a:endParaRPr lang="zh-CN" altLang="en-US"/>
           </a:p>
@@ -473,7 +474,7 @@
           <a:p>
             <a:fld id="{E27CD909-5952-48F8-A19C-6F1FFF2EAE97}" type="datetimeFigureOut">
               <a:rPr lang="zh-CN" altLang="en-US" smtClean="0"/>
-              <a:t>2017/6/29</a:t>
+              <a:t>2017/6/30</a:t>
             </a:fld>
             <a:endParaRPr lang="zh-CN" altLang="en-US"/>
           </a:p>
@@ -653,7 +654,7 @@
           <a:p>
             <a:fld id="{E27CD909-5952-48F8-A19C-6F1FFF2EAE97}" type="datetimeFigureOut">
               <a:rPr lang="zh-CN" altLang="en-US" smtClean="0"/>
-              <a:t>2017/6/29</a:t>
+              <a:t>2017/6/30</a:t>
             </a:fld>
             <a:endParaRPr lang="zh-CN" altLang="en-US"/>
           </a:p>
@@ -823,7 +824,7 @@
           <a:p>
             <a:fld id="{E27CD909-5952-48F8-A19C-6F1FFF2EAE97}" type="datetimeFigureOut">
               <a:rPr lang="zh-CN" altLang="en-US" smtClean="0"/>
-              <a:t>2017/6/29</a:t>
+              <a:t>2017/6/30</a:t>
             </a:fld>
             <a:endParaRPr lang="zh-CN" altLang="en-US"/>
           </a:p>
@@ -1069,7 +1070,7 @@
           <a:p>
             <a:fld id="{E27CD909-5952-48F8-A19C-6F1FFF2EAE97}" type="datetimeFigureOut">
               <a:rPr lang="zh-CN" altLang="en-US" smtClean="0"/>
-              <a:t>2017/6/29</a:t>
+              <a:t>2017/6/30</a:t>
             </a:fld>
             <a:endParaRPr lang="zh-CN" altLang="en-US"/>
           </a:p>
@@ -1301,7 +1302,7 @@
           <a:p>
             <a:fld id="{E27CD909-5952-48F8-A19C-6F1FFF2EAE97}" type="datetimeFigureOut">
               <a:rPr lang="zh-CN" altLang="en-US" smtClean="0"/>
-              <a:t>2017/6/29</a:t>
+              <a:t>2017/6/30</a:t>
             </a:fld>
             <a:endParaRPr lang="zh-CN" altLang="en-US"/>
           </a:p>
@@ -1668,7 +1669,7 @@
           <a:p>
             <a:fld id="{E27CD909-5952-48F8-A19C-6F1FFF2EAE97}" type="datetimeFigureOut">
               <a:rPr lang="zh-CN" altLang="en-US" smtClean="0"/>
-              <a:t>2017/6/29</a:t>
+              <a:t>2017/6/30</a:t>
             </a:fld>
             <a:endParaRPr lang="zh-CN" altLang="en-US"/>
           </a:p>
@@ -1786,7 +1787,7 @@
           <a:p>
             <a:fld id="{E27CD909-5952-48F8-A19C-6F1FFF2EAE97}" type="datetimeFigureOut">
               <a:rPr lang="zh-CN" altLang="en-US" smtClean="0"/>
-              <a:t>2017/6/29</a:t>
+              <a:t>2017/6/30</a:t>
             </a:fld>
             <a:endParaRPr lang="zh-CN" altLang="en-US"/>
           </a:p>
@@ -1881,7 +1882,7 @@
           <a:p>
             <a:fld id="{E27CD909-5952-48F8-A19C-6F1FFF2EAE97}" type="datetimeFigureOut">
               <a:rPr lang="zh-CN" altLang="en-US" smtClean="0"/>
-              <a:t>2017/6/29</a:t>
+              <a:t>2017/6/30</a:t>
             </a:fld>
             <a:endParaRPr lang="zh-CN" altLang="en-US"/>
           </a:p>
@@ -2158,7 +2159,7 @@
           <a:p>
             <a:fld id="{E27CD909-5952-48F8-A19C-6F1FFF2EAE97}" type="datetimeFigureOut">
               <a:rPr lang="zh-CN" altLang="en-US" smtClean="0"/>
-              <a:t>2017/6/29</a:t>
+              <a:t>2017/6/30</a:t>
             </a:fld>
             <a:endParaRPr lang="zh-CN" altLang="en-US"/>
           </a:p>
@@ -2411,7 +2412,7 @@
           <a:p>
             <a:fld id="{E27CD909-5952-48F8-A19C-6F1FFF2EAE97}" type="datetimeFigureOut">
               <a:rPr lang="zh-CN" altLang="en-US" smtClean="0"/>
-              <a:t>2017/6/29</a:t>
+              <a:t>2017/6/30</a:t>
             </a:fld>
             <a:endParaRPr lang="zh-CN" altLang="en-US"/>
           </a:p>
@@ -2624,7 +2625,7 @@
           <a:p>
             <a:fld id="{E27CD909-5952-48F8-A19C-6F1FFF2EAE97}" type="datetimeFigureOut">
               <a:rPr lang="zh-CN" altLang="en-US" smtClean="0"/>
-              <a:t>2017/6/29</a:t>
+              <a:t>2017/6/30</a:t>
             </a:fld>
             <a:endParaRPr lang="zh-CN" altLang="en-US"/>
           </a:p>
@@ -47621,6 +47622,2973 @@
       </p:par>
     </p:tnLst>
   </p:timing>
+</p:sld>
+</file>
+
+<file path=ppt/slides/slide62.xml><?xml version="1.0" encoding="utf-8"?>
+<p:sld xmlns:a="http://schemas.openxmlformats.org/drawingml/2006/main" xmlns:r="http://schemas.openxmlformats.org/officeDocument/2006/relationships" xmlns:p="http://schemas.openxmlformats.org/presentationml/2006/main">
+  <p:cSld>
+    <p:spTree>
+      <p:nvGrpSpPr>
+        <p:cNvPr id="1" name=""/>
+        <p:cNvGrpSpPr/>
+        <p:nvPr/>
+      </p:nvGrpSpPr>
+      <p:grpSpPr>
+        <a:xfrm>
+          <a:off x="0" y="0"/>
+          <a:ext cx="0" cy="0"/>
+          <a:chOff x="0" y="0"/>
+          <a:chExt cx="0" cy="0"/>
+        </a:xfrm>
+      </p:grpSpPr>
+      <p:sp>
+        <p:nvSpPr>
+          <p:cNvPr id="4" name="矩形 3"/>
+          <p:cNvSpPr/>
+          <p:nvPr/>
+        </p:nvSpPr>
+        <p:spPr>
+          <a:xfrm>
+            <a:off x="481356" y="437159"/>
+            <a:ext cx="360000" cy="360000"/>
+          </a:xfrm>
+          <a:prstGeom prst="rect">
+            <a:avLst/>
+          </a:prstGeom>
+        </p:spPr>
+        <p:style>
+          <a:lnRef idx="2">
+            <a:schemeClr val="accent1"/>
+          </a:lnRef>
+          <a:fillRef idx="1">
+            <a:schemeClr val="lt1"/>
+          </a:fillRef>
+          <a:effectRef idx="0">
+            <a:schemeClr val="accent1"/>
+          </a:effectRef>
+          <a:fontRef idx="minor">
+            <a:schemeClr val="dk1"/>
+          </a:fontRef>
+        </p:style>
+        <p:txBody>
+          <a:bodyPr rtlCol="0" anchor="ctr"/>
+          <a:lstStyle/>
+          <a:p>
+            <a:pPr algn="ctr"/>
+            <a:r>
+              <a:rPr lang="en-US" altLang="zh-CN" dirty="0" smtClean="0"/>
+              <a:t>1</a:t>
+            </a:r>
+            <a:endParaRPr lang="zh-CN" altLang="en-US" dirty="0"/>
+          </a:p>
+        </p:txBody>
+      </p:sp>
+      <p:sp>
+        <p:nvSpPr>
+          <p:cNvPr id="5" name="矩形 4"/>
+          <p:cNvSpPr/>
+          <p:nvPr/>
+        </p:nvSpPr>
+        <p:spPr>
+          <a:xfrm>
+            <a:off x="841356" y="437159"/>
+            <a:ext cx="360000" cy="360000"/>
+          </a:xfrm>
+          <a:prstGeom prst="rect">
+            <a:avLst/>
+          </a:prstGeom>
+        </p:spPr>
+        <p:style>
+          <a:lnRef idx="2">
+            <a:schemeClr val="accent1"/>
+          </a:lnRef>
+          <a:fillRef idx="1">
+            <a:schemeClr val="lt1"/>
+          </a:fillRef>
+          <a:effectRef idx="0">
+            <a:schemeClr val="accent1"/>
+          </a:effectRef>
+          <a:fontRef idx="minor">
+            <a:schemeClr val="dk1"/>
+          </a:fontRef>
+        </p:style>
+        <p:txBody>
+          <a:bodyPr rtlCol="0" anchor="ctr"/>
+          <a:lstStyle/>
+          <a:p>
+            <a:pPr algn="ctr"/>
+            <a:r>
+              <a:rPr lang="en-US" altLang="zh-CN" dirty="0" smtClean="0"/>
+              <a:t>0</a:t>
+            </a:r>
+            <a:endParaRPr lang="zh-CN" altLang="en-US" dirty="0"/>
+          </a:p>
+        </p:txBody>
+      </p:sp>
+      <p:sp>
+        <p:nvSpPr>
+          <p:cNvPr id="6" name="矩形 5"/>
+          <p:cNvSpPr/>
+          <p:nvPr/>
+        </p:nvSpPr>
+        <p:spPr>
+          <a:xfrm>
+            <a:off x="1201356" y="437159"/>
+            <a:ext cx="360000" cy="360000"/>
+          </a:xfrm>
+          <a:prstGeom prst="rect">
+            <a:avLst/>
+          </a:prstGeom>
+        </p:spPr>
+        <p:style>
+          <a:lnRef idx="2">
+            <a:schemeClr val="accent1"/>
+          </a:lnRef>
+          <a:fillRef idx="1">
+            <a:schemeClr val="lt1"/>
+          </a:fillRef>
+          <a:effectRef idx="0">
+            <a:schemeClr val="accent1"/>
+          </a:effectRef>
+          <a:fontRef idx="minor">
+            <a:schemeClr val="dk1"/>
+          </a:fontRef>
+        </p:style>
+        <p:txBody>
+          <a:bodyPr rtlCol="0" anchor="ctr"/>
+          <a:lstStyle/>
+          <a:p>
+            <a:pPr algn="ctr"/>
+            <a:r>
+              <a:rPr lang="en-US" altLang="zh-CN" dirty="0" smtClean="0"/>
+              <a:t>0</a:t>
+            </a:r>
+            <a:endParaRPr lang="zh-CN" altLang="en-US" dirty="0"/>
+          </a:p>
+        </p:txBody>
+      </p:sp>
+      <p:sp>
+        <p:nvSpPr>
+          <p:cNvPr id="7" name="矩形 6"/>
+          <p:cNvSpPr/>
+          <p:nvPr/>
+        </p:nvSpPr>
+        <p:spPr>
+          <a:xfrm>
+            <a:off x="1561356" y="437159"/>
+            <a:ext cx="360000" cy="360000"/>
+          </a:xfrm>
+          <a:prstGeom prst="rect">
+            <a:avLst/>
+          </a:prstGeom>
+        </p:spPr>
+        <p:style>
+          <a:lnRef idx="2">
+            <a:schemeClr val="accent1"/>
+          </a:lnRef>
+          <a:fillRef idx="1">
+            <a:schemeClr val="lt1"/>
+          </a:fillRef>
+          <a:effectRef idx="0">
+            <a:schemeClr val="accent1"/>
+          </a:effectRef>
+          <a:fontRef idx="minor">
+            <a:schemeClr val="dk1"/>
+          </a:fontRef>
+        </p:style>
+        <p:txBody>
+          <a:bodyPr rtlCol="0" anchor="ctr"/>
+          <a:lstStyle/>
+          <a:p>
+            <a:pPr algn="ctr"/>
+            <a:r>
+              <a:rPr lang="en-US" altLang="zh-CN" dirty="0" smtClean="0"/>
+              <a:t>0</a:t>
+            </a:r>
+            <a:endParaRPr lang="zh-CN" altLang="en-US" dirty="0"/>
+          </a:p>
+        </p:txBody>
+      </p:sp>
+      <p:sp>
+        <p:nvSpPr>
+          <p:cNvPr id="8" name="矩形 7"/>
+          <p:cNvSpPr/>
+          <p:nvPr/>
+        </p:nvSpPr>
+        <p:spPr>
+          <a:xfrm>
+            <a:off x="1921356" y="437159"/>
+            <a:ext cx="360000" cy="360000"/>
+          </a:xfrm>
+          <a:prstGeom prst="rect">
+            <a:avLst/>
+          </a:prstGeom>
+        </p:spPr>
+        <p:style>
+          <a:lnRef idx="2">
+            <a:schemeClr val="accent1"/>
+          </a:lnRef>
+          <a:fillRef idx="1">
+            <a:schemeClr val="lt1"/>
+          </a:fillRef>
+          <a:effectRef idx="0">
+            <a:schemeClr val="accent1"/>
+          </a:effectRef>
+          <a:fontRef idx="minor">
+            <a:schemeClr val="dk1"/>
+          </a:fontRef>
+        </p:style>
+        <p:txBody>
+          <a:bodyPr rtlCol="0" anchor="ctr"/>
+          <a:lstStyle/>
+          <a:p>
+            <a:pPr algn="ctr"/>
+            <a:r>
+              <a:rPr lang="en-US" altLang="zh-CN" dirty="0" smtClean="0"/>
+              <a:t>0</a:t>
+            </a:r>
+            <a:endParaRPr lang="zh-CN" altLang="en-US" dirty="0"/>
+          </a:p>
+        </p:txBody>
+      </p:sp>
+      <p:sp>
+        <p:nvSpPr>
+          <p:cNvPr id="9" name="矩形 8"/>
+          <p:cNvSpPr/>
+          <p:nvPr/>
+        </p:nvSpPr>
+        <p:spPr>
+          <a:xfrm>
+            <a:off x="2281356" y="437159"/>
+            <a:ext cx="360000" cy="360000"/>
+          </a:xfrm>
+          <a:prstGeom prst="rect">
+            <a:avLst/>
+          </a:prstGeom>
+        </p:spPr>
+        <p:style>
+          <a:lnRef idx="2">
+            <a:schemeClr val="accent1"/>
+          </a:lnRef>
+          <a:fillRef idx="1">
+            <a:schemeClr val="lt1"/>
+          </a:fillRef>
+          <a:effectRef idx="0">
+            <a:schemeClr val="accent1"/>
+          </a:effectRef>
+          <a:fontRef idx="minor">
+            <a:schemeClr val="dk1"/>
+          </a:fontRef>
+        </p:style>
+        <p:txBody>
+          <a:bodyPr rtlCol="0" anchor="ctr"/>
+          <a:lstStyle/>
+          <a:p>
+            <a:pPr algn="ctr"/>
+            <a:r>
+              <a:rPr lang="en-US" altLang="zh-CN" dirty="0" smtClean="0"/>
+              <a:t>0</a:t>
+            </a:r>
+            <a:endParaRPr lang="zh-CN" altLang="en-US" dirty="0"/>
+          </a:p>
+        </p:txBody>
+      </p:sp>
+      <p:sp>
+        <p:nvSpPr>
+          <p:cNvPr id="11" name="矩形 10"/>
+          <p:cNvSpPr/>
+          <p:nvPr/>
+        </p:nvSpPr>
+        <p:spPr>
+          <a:xfrm>
+            <a:off x="841356" y="76221"/>
+            <a:ext cx="360000" cy="360000"/>
+          </a:xfrm>
+          <a:prstGeom prst="rect">
+            <a:avLst/>
+          </a:prstGeom>
+          <a:ln>
+            <a:noFill/>
+          </a:ln>
+        </p:spPr>
+        <p:style>
+          <a:lnRef idx="2">
+            <a:schemeClr val="accent1"/>
+          </a:lnRef>
+          <a:fillRef idx="1">
+            <a:schemeClr val="lt1"/>
+          </a:fillRef>
+          <a:effectRef idx="0">
+            <a:schemeClr val="accent1"/>
+          </a:effectRef>
+          <a:fontRef idx="minor">
+            <a:schemeClr val="dk1"/>
+          </a:fontRef>
+        </p:style>
+        <p:txBody>
+          <a:bodyPr rtlCol="0" anchor="ctr"/>
+          <a:lstStyle/>
+          <a:p>
+            <a:pPr algn="ctr"/>
+            <a:r>
+              <a:rPr lang="en-US" altLang="zh-CN" dirty="0"/>
+              <a:t>a</a:t>
+            </a:r>
+            <a:endParaRPr lang="zh-CN" altLang="en-US" dirty="0"/>
+          </a:p>
+        </p:txBody>
+      </p:sp>
+      <p:sp>
+        <p:nvSpPr>
+          <p:cNvPr id="12" name="矩形 11"/>
+          <p:cNvSpPr/>
+          <p:nvPr/>
+        </p:nvSpPr>
+        <p:spPr>
+          <a:xfrm>
+            <a:off x="1201356" y="76221"/>
+            <a:ext cx="360000" cy="360000"/>
+          </a:xfrm>
+          <a:prstGeom prst="rect">
+            <a:avLst/>
+          </a:prstGeom>
+          <a:ln>
+            <a:noFill/>
+          </a:ln>
+        </p:spPr>
+        <p:style>
+          <a:lnRef idx="2">
+            <a:schemeClr val="accent1"/>
+          </a:lnRef>
+          <a:fillRef idx="1">
+            <a:schemeClr val="lt1"/>
+          </a:fillRef>
+          <a:effectRef idx="0">
+            <a:schemeClr val="accent1"/>
+          </a:effectRef>
+          <a:fontRef idx="minor">
+            <a:schemeClr val="dk1"/>
+          </a:fontRef>
+        </p:style>
+        <p:txBody>
+          <a:bodyPr rtlCol="0" anchor="ctr"/>
+          <a:lstStyle/>
+          <a:p>
+            <a:pPr algn="ctr"/>
+            <a:r>
+              <a:rPr lang="en-US" altLang="zh-CN" dirty="0"/>
+              <a:t>b</a:t>
+            </a:r>
+            <a:endParaRPr lang="zh-CN" altLang="en-US" dirty="0"/>
+          </a:p>
+        </p:txBody>
+      </p:sp>
+      <p:sp>
+        <p:nvSpPr>
+          <p:cNvPr id="13" name="矩形 12"/>
+          <p:cNvSpPr/>
+          <p:nvPr/>
+        </p:nvSpPr>
+        <p:spPr>
+          <a:xfrm>
+            <a:off x="1561356" y="76221"/>
+            <a:ext cx="360000" cy="360000"/>
+          </a:xfrm>
+          <a:prstGeom prst="rect">
+            <a:avLst/>
+          </a:prstGeom>
+          <a:ln>
+            <a:noFill/>
+          </a:ln>
+        </p:spPr>
+        <p:style>
+          <a:lnRef idx="2">
+            <a:schemeClr val="accent1"/>
+          </a:lnRef>
+          <a:fillRef idx="1">
+            <a:schemeClr val="lt1"/>
+          </a:fillRef>
+          <a:effectRef idx="0">
+            <a:schemeClr val="accent1"/>
+          </a:effectRef>
+          <a:fontRef idx="minor">
+            <a:schemeClr val="dk1"/>
+          </a:fontRef>
+        </p:style>
+        <p:txBody>
+          <a:bodyPr rtlCol="0" anchor="ctr"/>
+          <a:lstStyle/>
+          <a:p>
+            <a:pPr algn="ctr"/>
+            <a:r>
+              <a:rPr lang="en-US" altLang="zh-CN" dirty="0" smtClean="0"/>
+              <a:t>c</a:t>
+            </a:r>
+            <a:endParaRPr lang="zh-CN" altLang="en-US" dirty="0"/>
+          </a:p>
+        </p:txBody>
+      </p:sp>
+      <p:sp>
+        <p:nvSpPr>
+          <p:cNvPr id="14" name="矩形 13"/>
+          <p:cNvSpPr/>
+          <p:nvPr/>
+        </p:nvSpPr>
+        <p:spPr>
+          <a:xfrm>
+            <a:off x="1921356" y="76221"/>
+            <a:ext cx="360000" cy="360000"/>
+          </a:xfrm>
+          <a:prstGeom prst="rect">
+            <a:avLst/>
+          </a:prstGeom>
+          <a:ln>
+            <a:noFill/>
+          </a:ln>
+        </p:spPr>
+        <p:style>
+          <a:lnRef idx="2">
+            <a:schemeClr val="accent1"/>
+          </a:lnRef>
+          <a:fillRef idx="1">
+            <a:schemeClr val="lt1"/>
+          </a:fillRef>
+          <a:effectRef idx="0">
+            <a:schemeClr val="accent1"/>
+          </a:effectRef>
+          <a:fontRef idx="minor">
+            <a:schemeClr val="dk1"/>
+          </a:fontRef>
+        </p:style>
+        <p:txBody>
+          <a:bodyPr rtlCol="0" anchor="ctr"/>
+          <a:lstStyle/>
+          <a:p>
+            <a:pPr algn="ctr"/>
+            <a:r>
+              <a:rPr lang="en-US" altLang="zh-CN" dirty="0"/>
+              <a:t>d</a:t>
+            </a:r>
+            <a:endParaRPr lang="zh-CN" altLang="en-US" dirty="0"/>
+          </a:p>
+        </p:txBody>
+      </p:sp>
+      <p:sp>
+        <p:nvSpPr>
+          <p:cNvPr id="15" name="矩形 14"/>
+          <p:cNvSpPr/>
+          <p:nvPr/>
+        </p:nvSpPr>
+        <p:spPr>
+          <a:xfrm>
+            <a:off x="2281356" y="76221"/>
+            <a:ext cx="360000" cy="360000"/>
+          </a:xfrm>
+          <a:prstGeom prst="rect">
+            <a:avLst/>
+          </a:prstGeom>
+          <a:ln>
+            <a:noFill/>
+          </a:ln>
+        </p:spPr>
+        <p:style>
+          <a:lnRef idx="2">
+            <a:schemeClr val="accent1"/>
+          </a:lnRef>
+          <a:fillRef idx="1">
+            <a:schemeClr val="lt1"/>
+          </a:fillRef>
+          <a:effectRef idx="0">
+            <a:schemeClr val="accent1"/>
+          </a:effectRef>
+          <a:fontRef idx="minor">
+            <a:schemeClr val="dk1"/>
+          </a:fontRef>
+        </p:style>
+        <p:txBody>
+          <a:bodyPr rtlCol="0" anchor="ctr"/>
+          <a:lstStyle/>
+          <a:p>
+            <a:pPr algn="ctr"/>
+            <a:r>
+              <a:rPr lang="en-US" altLang="zh-CN" dirty="0"/>
+              <a:t>d</a:t>
+            </a:r>
+            <a:endParaRPr lang="zh-CN" altLang="en-US" dirty="0"/>
+          </a:p>
+        </p:txBody>
+      </p:sp>
+      <p:sp>
+        <p:nvSpPr>
+          <p:cNvPr id="16" name="矩形 15"/>
+          <p:cNvSpPr/>
+          <p:nvPr/>
+        </p:nvSpPr>
+        <p:spPr>
+          <a:xfrm>
+            <a:off x="2641356" y="76221"/>
+            <a:ext cx="360000" cy="360000"/>
+          </a:xfrm>
+          <a:prstGeom prst="rect">
+            <a:avLst/>
+          </a:prstGeom>
+          <a:ln>
+            <a:noFill/>
+          </a:ln>
+        </p:spPr>
+        <p:style>
+          <a:lnRef idx="2">
+            <a:schemeClr val="accent1"/>
+          </a:lnRef>
+          <a:fillRef idx="1">
+            <a:schemeClr val="lt1"/>
+          </a:fillRef>
+          <a:effectRef idx="0">
+            <a:schemeClr val="accent1"/>
+          </a:effectRef>
+          <a:fontRef idx="minor">
+            <a:schemeClr val="dk1"/>
+          </a:fontRef>
+        </p:style>
+        <p:txBody>
+          <a:bodyPr rtlCol="0" anchor="ctr"/>
+          <a:lstStyle/>
+          <a:p>
+            <a:pPr algn="ctr"/>
+            <a:r>
+              <a:rPr lang="en-US" altLang="zh-CN" dirty="0" smtClean="0"/>
+              <a:t>d</a:t>
+            </a:r>
+            <a:endParaRPr lang="zh-CN" altLang="en-US" dirty="0"/>
+          </a:p>
+        </p:txBody>
+      </p:sp>
+      <p:sp>
+        <p:nvSpPr>
+          <p:cNvPr id="17" name="矩形 16"/>
+          <p:cNvSpPr/>
+          <p:nvPr/>
+        </p:nvSpPr>
+        <p:spPr>
+          <a:xfrm>
+            <a:off x="3001356" y="75752"/>
+            <a:ext cx="360000" cy="360000"/>
+          </a:xfrm>
+          <a:prstGeom prst="rect">
+            <a:avLst/>
+          </a:prstGeom>
+          <a:ln>
+            <a:noFill/>
+          </a:ln>
+        </p:spPr>
+        <p:style>
+          <a:lnRef idx="2">
+            <a:schemeClr val="accent1"/>
+          </a:lnRef>
+          <a:fillRef idx="1">
+            <a:schemeClr val="lt1"/>
+          </a:fillRef>
+          <a:effectRef idx="0">
+            <a:schemeClr val="accent1"/>
+          </a:effectRef>
+          <a:fontRef idx="minor">
+            <a:schemeClr val="dk1"/>
+          </a:fontRef>
+        </p:style>
+        <p:txBody>
+          <a:bodyPr rtlCol="0" anchor="ctr"/>
+          <a:lstStyle/>
+          <a:p>
+            <a:pPr algn="ctr"/>
+            <a:r>
+              <a:rPr lang="en-US" altLang="zh-CN" dirty="0" smtClean="0"/>
+              <a:t>g</a:t>
+            </a:r>
+            <a:endParaRPr lang="zh-CN" altLang="en-US" dirty="0"/>
+          </a:p>
+        </p:txBody>
+      </p:sp>
+      <p:sp>
+        <p:nvSpPr>
+          <p:cNvPr id="19" name="矩形 18"/>
+          <p:cNvSpPr/>
+          <p:nvPr/>
+        </p:nvSpPr>
+        <p:spPr>
+          <a:xfrm>
+            <a:off x="481356" y="793969"/>
+            <a:ext cx="360000" cy="360000"/>
+          </a:xfrm>
+          <a:prstGeom prst="rect">
+            <a:avLst/>
+          </a:prstGeom>
+        </p:spPr>
+        <p:style>
+          <a:lnRef idx="2">
+            <a:schemeClr val="accent1"/>
+          </a:lnRef>
+          <a:fillRef idx="1">
+            <a:schemeClr val="lt1"/>
+          </a:fillRef>
+          <a:effectRef idx="0">
+            <a:schemeClr val="accent1"/>
+          </a:effectRef>
+          <a:fontRef idx="minor">
+            <a:schemeClr val="dk1"/>
+          </a:fontRef>
+        </p:style>
+        <p:txBody>
+          <a:bodyPr rtlCol="0" anchor="ctr"/>
+          <a:lstStyle/>
+          <a:p>
+            <a:pPr algn="ctr"/>
+            <a:r>
+              <a:rPr lang="en-US" altLang="zh-CN" dirty="0" smtClean="0"/>
+              <a:t>0</a:t>
+            </a:r>
+            <a:endParaRPr lang="zh-CN" altLang="en-US" dirty="0"/>
+          </a:p>
+        </p:txBody>
+      </p:sp>
+      <p:sp>
+        <p:nvSpPr>
+          <p:cNvPr id="20" name="矩形 19"/>
+          <p:cNvSpPr/>
+          <p:nvPr/>
+        </p:nvSpPr>
+        <p:spPr>
+          <a:xfrm>
+            <a:off x="841356" y="793969"/>
+            <a:ext cx="360000" cy="360000"/>
+          </a:xfrm>
+          <a:prstGeom prst="rect">
+            <a:avLst/>
+          </a:prstGeom>
+        </p:spPr>
+        <p:style>
+          <a:lnRef idx="2">
+            <a:schemeClr val="accent1"/>
+          </a:lnRef>
+          <a:fillRef idx="1">
+            <a:schemeClr val="lt1"/>
+          </a:fillRef>
+          <a:effectRef idx="0">
+            <a:schemeClr val="accent1"/>
+          </a:effectRef>
+          <a:fontRef idx="minor">
+            <a:schemeClr val="dk1"/>
+          </a:fontRef>
+        </p:style>
+        <p:txBody>
+          <a:bodyPr rtlCol="0" anchor="ctr"/>
+          <a:lstStyle/>
+          <a:p>
+            <a:pPr algn="ctr"/>
+            <a:r>
+              <a:rPr lang="en-US" altLang="zh-CN" dirty="0" smtClean="0"/>
+              <a:t>0</a:t>
+            </a:r>
+            <a:endParaRPr lang="zh-CN" altLang="en-US" dirty="0"/>
+          </a:p>
+        </p:txBody>
+      </p:sp>
+      <p:sp>
+        <p:nvSpPr>
+          <p:cNvPr id="21" name="矩形 20"/>
+          <p:cNvSpPr/>
+          <p:nvPr/>
+        </p:nvSpPr>
+        <p:spPr>
+          <a:xfrm>
+            <a:off x="1201356" y="793969"/>
+            <a:ext cx="360000" cy="360000"/>
+          </a:xfrm>
+          <a:prstGeom prst="rect">
+            <a:avLst/>
+          </a:prstGeom>
+        </p:spPr>
+        <p:style>
+          <a:lnRef idx="2">
+            <a:schemeClr val="accent1"/>
+          </a:lnRef>
+          <a:fillRef idx="1">
+            <a:schemeClr val="lt1"/>
+          </a:fillRef>
+          <a:effectRef idx="0">
+            <a:schemeClr val="accent1"/>
+          </a:effectRef>
+          <a:fontRef idx="minor">
+            <a:schemeClr val="dk1"/>
+          </a:fontRef>
+        </p:style>
+        <p:txBody>
+          <a:bodyPr rtlCol="0" anchor="ctr"/>
+          <a:lstStyle/>
+          <a:p>
+            <a:pPr algn="ctr"/>
+            <a:r>
+              <a:rPr lang="en-US" altLang="zh-CN" dirty="0" smtClean="0"/>
+              <a:t>0</a:t>
+            </a:r>
+            <a:endParaRPr lang="zh-CN" altLang="en-US" dirty="0"/>
+          </a:p>
+        </p:txBody>
+      </p:sp>
+      <p:sp>
+        <p:nvSpPr>
+          <p:cNvPr id="22" name="矩形 21"/>
+          <p:cNvSpPr/>
+          <p:nvPr/>
+        </p:nvSpPr>
+        <p:spPr>
+          <a:xfrm>
+            <a:off x="1561356" y="793969"/>
+            <a:ext cx="360000" cy="360000"/>
+          </a:xfrm>
+          <a:prstGeom prst="rect">
+            <a:avLst/>
+          </a:prstGeom>
+        </p:spPr>
+        <p:style>
+          <a:lnRef idx="2">
+            <a:schemeClr val="accent1"/>
+          </a:lnRef>
+          <a:fillRef idx="1">
+            <a:schemeClr val="lt1"/>
+          </a:fillRef>
+          <a:effectRef idx="0">
+            <a:schemeClr val="accent1"/>
+          </a:effectRef>
+          <a:fontRef idx="minor">
+            <a:schemeClr val="dk1"/>
+          </a:fontRef>
+        </p:style>
+        <p:txBody>
+          <a:bodyPr rtlCol="0" anchor="ctr"/>
+          <a:lstStyle/>
+          <a:p>
+            <a:pPr algn="ctr"/>
+            <a:r>
+              <a:rPr lang="en-US" altLang="zh-CN" dirty="0" smtClean="0"/>
+              <a:t>0</a:t>
+            </a:r>
+            <a:endParaRPr lang="zh-CN" altLang="en-US" dirty="0"/>
+          </a:p>
+        </p:txBody>
+      </p:sp>
+      <p:sp>
+        <p:nvSpPr>
+          <p:cNvPr id="23" name="矩形 22"/>
+          <p:cNvSpPr/>
+          <p:nvPr/>
+        </p:nvSpPr>
+        <p:spPr>
+          <a:xfrm>
+            <a:off x="1921356" y="793969"/>
+            <a:ext cx="360000" cy="360000"/>
+          </a:xfrm>
+          <a:prstGeom prst="rect">
+            <a:avLst/>
+          </a:prstGeom>
+        </p:spPr>
+        <p:style>
+          <a:lnRef idx="2">
+            <a:schemeClr val="accent1"/>
+          </a:lnRef>
+          <a:fillRef idx="1">
+            <a:schemeClr val="lt1"/>
+          </a:fillRef>
+          <a:effectRef idx="0">
+            <a:schemeClr val="accent1"/>
+          </a:effectRef>
+          <a:fontRef idx="minor">
+            <a:schemeClr val="dk1"/>
+          </a:fontRef>
+        </p:style>
+        <p:txBody>
+          <a:bodyPr rtlCol="0" anchor="ctr"/>
+          <a:lstStyle/>
+          <a:p>
+            <a:pPr algn="ctr"/>
+            <a:r>
+              <a:rPr lang="en-US" altLang="zh-CN" dirty="0" smtClean="0"/>
+              <a:t>0</a:t>
+            </a:r>
+            <a:endParaRPr lang="zh-CN" altLang="en-US" dirty="0"/>
+          </a:p>
+        </p:txBody>
+      </p:sp>
+      <p:sp>
+        <p:nvSpPr>
+          <p:cNvPr id="24" name="矩形 23"/>
+          <p:cNvSpPr/>
+          <p:nvPr/>
+        </p:nvSpPr>
+        <p:spPr>
+          <a:xfrm>
+            <a:off x="2281356" y="793969"/>
+            <a:ext cx="360000" cy="360000"/>
+          </a:xfrm>
+          <a:prstGeom prst="rect">
+            <a:avLst/>
+          </a:prstGeom>
+        </p:spPr>
+        <p:style>
+          <a:lnRef idx="2">
+            <a:schemeClr val="accent1"/>
+          </a:lnRef>
+          <a:fillRef idx="1">
+            <a:schemeClr val="lt1"/>
+          </a:fillRef>
+          <a:effectRef idx="0">
+            <a:schemeClr val="accent1"/>
+          </a:effectRef>
+          <a:fontRef idx="minor">
+            <a:schemeClr val="dk1"/>
+          </a:fontRef>
+        </p:style>
+        <p:txBody>
+          <a:bodyPr rtlCol="0" anchor="ctr"/>
+          <a:lstStyle/>
+          <a:p>
+            <a:pPr algn="ctr"/>
+            <a:r>
+              <a:rPr lang="en-US" altLang="zh-CN" dirty="0" smtClean="0"/>
+              <a:t>0</a:t>
+            </a:r>
+            <a:endParaRPr lang="zh-CN" altLang="en-US" dirty="0"/>
+          </a:p>
+        </p:txBody>
+      </p:sp>
+      <p:sp>
+        <p:nvSpPr>
+          <p:cNvPr id="27" name="矩形 26"/>
+          <p:cNvSpPr/>
+          <p:nvPr/>
+        </p:nvSpPr>
+        <p:spPr>
+          <a:xfrm>
+            <a:off x="2641356" y="435752"/>
+            <a:ext cx="360000" cy="360000"/>
+          </a:xfrm>
+          <a:prstGeom prst="rect">
+            <a:avLst/>
+          </a:prstGeom>
+        </p:spPr>
+        <p:style>
+          <a:lnRef idx="2">
+            <a:schemeClr val="accent1"/>
+          </a:lnRef>
+          <a:fillRef idx="1">
+            <a:schemeClr val="lt1"/>
+          </a:fillRef>
+          <a:effectRef idx="0">
+            <a:schemeClr val="accent1"/>
+          </a:effectRef>
+          <a:fontRef idx="minor">
+            <a:schemeClr val="dk1"/>
+          </a:fontRef>
+        </p:style>
+        <p:txBody>
+          <a:bodyPr rtlCol="0" anchor="ctr"/>
+          <a:lstStyle/>
+          <a:p>
+            <a:pPr algn="ctr"/>
+            <a:r>
+              <a:rPr lang="en-US" altLang="zh-CN" dirty="0" smtClean="0"/>
+              <a:t>0</a:t>
+            </a:r>
+            <a:endParaRPr lang="zh-CN" altLang="en-US" dirty="0"/>
+          </a:p>
+        </p:txBody>
+      </p:sp>
+      <p:sp>
+        <p:nvSpPr>
+          <p:cNvPr id="28" name="矩形 27"/>
+          <p:cNvSpPr/>
+          <p:nvPr/>
+        </p:nvSpPr>
+        <p:spPr>
+          <a:xfrm>
+            <a:off x="3001356" y="435752"/>
+            <a:ext cx="360000" cy="360000"/>
+          </a:xfrm>
+          <a:prstGeom prst="rect">
+            <a:avLst/>
+          </a:prstGeom>
+        </p:spPr>
+        <p:style>
+          <a:lnRef idx="2">
+            <a:schemeClr val="accent1"/>
+          </a:lnRef>
+          <a:fillRef idx="1">
+            <a:schemeClr val="lt1"/>
+          </a:fillRef>
+          <a:effectRef idx="0">
+            <a:schemeClr val="accent1"/>
+          </a:effectRef>
+          <a:fontRef idx="minor">
+            <a:schemeClr val="dk1"/>
+          </a:fontRef>
+        </p:style>
+        <p:txBody>
+          <a:bodyPr rtlCol="0" anchor="ctr"/>
+          <a:lstStyle/>
+          <a:p>
+            <a:pPr algn="ctr"/>
+            <a:r>
+              <a:rPr lang="en-US" altLang="zh-CN" dirty="0" smtClean="0"/>
+              <a:t>0</a:t>
+            </a:r>
+            <a:endParaRPr lang="zh-CN" altLang="en-US" dirty="0"/>
+          </a:p>
+        </p:txBody>
+      </p:sp>
+      <p:sp>
+        <p:nvSpPr>
+          <p:cNvPr id="29" name="矩形 28"/>
+          <p:cNvSpPr/>
+          <p:nvPr/>
+        </p:nvSpPr>
+        <p:spPr>
+          <a:xfrm>
+            <a:off x="2641356" y="792562"/>
+            <a:ext cx="360000" cy="360000"/>
+          </a:xfrm>
+          <a:prstGeom prst="rect">
+            <a:avLst/>
+          </a:prstGeom>
+        </p:spPr>
+        <p:style>
+          <a:lnRef idx="2">
+            <a:schemeClr val="accent1"/>
+          </a:lnRef>
+          <a:fillRef idx="1">
+            <a:schemeClr val="lt1"/>
+          </a:fillRef>
+          <a:effectRef idx="0">
+            <a:schemeClr val="accent1"/>
+          </a:effectRef>
+          <a:fontRef idx="minor">
+            <a:schemeClr val="dk1"/>
+          </a:fontRef>
+        </p:style>
+        <p:txBody>
+          <a:bodyPr rtlCol="0" anchor="ctr"/>
+          <a:lstStyle/>
+          <a:p>
+            <a:pPr algn="ctr"/>
+            <a:r>
+              <a:rPr lang="en-US" altLang="zh-CN" dirty="0" smtClean="0"/>
+              <a:t>0</a:t>
+            </a:r>
+            <a:endParaRPr lang="zh-CN" altLang="en-US" dirty="0"/>
+          </a:p>
+        </p:txBody>
+      </p:sp>
+      <p:sp>
+        <p:nvSpPr>
+          <p:cNvPr id="30" name="矩形 29"/>
+          <p:cNvSpPr/>
+          <p:nvPr/>
+        </p:nvSpPr>
+        <p:spPr>
+          <a:xfrm>
+            <a:off x="3001356" y="792562"/>
+            <a:ext cx="360000" cy="360000"/>
+          </a:xfrm>
+          <a:prstGeom prst="rect">
+            <a:avLst/>
+          </a:prstGeom>
+        </p:spPr>
+        <p:style>
+          <a:lnRef idx="2">
+            <a:schemeClr val="accent1"/>
+          </a:lnRef>
+          <a:fillRef idx="1">
+            <a:schemeClr val="lt1"/>
+          </a:fillRef>
+          <a:effectRef idx="0">
+            <a:schemeClr val="accent1"/>
+          </a:effectRef>
+          <a:fontRef idx="minor">
+            <a:schemeClr val="dk1"/>
+          </a:fontRef>
+        </p:style>
+        <p:txBody>
+          <a:bodyPr rtlCol="0" anchor="ctr"/>
+          <a:lstStyle/>
+          <a:p>
+            <a:pPr algn="ctr"/>
+            <a:r>
+              <a:rPr lang="en-US" altLang="zh-CN" dirty="0" smtClean="0"/>
+              <a:t>0</a:t>
+            </a:r>
+            <a:endParaRPr lang="zh-CN" altLang="en-US" dirty="0"/>
+          </a:p>
+        </p:txBody>
+      </p:sp>
+      <p:sp>
+        <p:nvSpPr>
+          <p:cNvPr id="33" name="矩形 32"/>
+          <p:cNvSpPr/>
+          <p:nvPr/>
+        </p:nvSpPr>
+        <p:spPr>
+          <a:xfrm>
+            <a:off x="481356" y="1151155"/>
+            <a:ext cx="360000" cy="360000"/>
+          </a:xfrm>
+          <a:prstGeom prst="rect">
+            <a:avLst/>
+          </a:prstGeom>
+        </p:spPr>
+        <p:style>
+          <a:lnRef idx="2">
+            <a:schemeClr val="accent1"/>
+          </a:lnRef>
+          <a:fillRef idx="1">
+            <a:schemeClr val="lt1"/>
+          </a:fillRef>
+          <a:effectRef idx="0">
+            <a:schemeClr val="accent1"/>
+          </a:effectRef>
+          <a:fontRef idx="minor">
+            <a:schemeClr val="dk1"/>
+          </a:fontRef>
+        </p:style>
+        <p:txBody>
+          <a:bodyPr rtlCol="0" anchor="ctr"/>
+          <a:lstStyle/>
+          <a:p>
+            <a:pPr algn="ctr"/>
+            <a:r>
+              <a:rPr lang="en-US" altLang="zh-CN" dirty="0" smtClean="0"/>
+              <a:t>0</a:t>
+            </a:r>
+            <a:endParaRPr lang="zh-CN" altLang="en-US" dirty="0"/>
+          </a:p>
+        </p:txBody>
+      </p:sp>
+      <p:sp>
+        <p:nvSpPr>
+          <p:cNvPr id="34" name="矩形 33"/>
+          <p:cNvSpPr/>
+          <p:nvPr/>
+        </p:nvSpPr>
+        <p:spPr>
+          <a:xfrm>
+            <a:off x="841356" y="1151155"/>
+            <a:ext cx="360000" cy="360000"/>
+          </a:xfrm>
+          <a:prstGeom prst="rect">
+            <a:avLst/>
+          </a:prstGeom>
+        </p:spPr>
+        <p:style>
+          <a:lnRef idx="2">
+            <a:schemeClr val="accent1"/>
+          </a:lnRef>
+          <a:fillRef idx="1">
+            <a:schemeClr val="lt1"/>
+          </a:fillRef>
+          <a:effectRef idx="0">
+            <a:schemeClr val="accent1"/>
+          </a:effectRef>
+          <a:fontRef idx="minor">
+            <a:schemeClr val="dk1"/>
+          </a:fontRef>
+        </p:style>
+        <p:txBody>
+          <a:bodyPr rtlCol="0" anchor="ctr"/>
+          <a:lstStyle/>
+          <a:p>
+            <a:pPr algn="ctr"/>
+            <a:r>
+              <a:rPr lang="en-US" altLang="zh-CN" dirty="0" smtClean="0"/>
+              <a:t>0</a:t>
+            </a:r>
+            <a:endParaRPr lang="zh-CN" altLang="en-US" dirty="0"/>
+          </a:p>
+        </p:txBody>
+      </p:sp>
+      <p:sp>
+        <p:nvSpPr>
+          <p:cNvPr id="35" name="矩形 34"/>
+          <p:cNvSpPr/>
+          <p:nvPr/>
+        </p:nvSpPr>
+        <p:spPr>
+          <a:xfrm>
+            <a:off x="1201356" y="1151155"/>
+            <a:ext cx="360000" cy="360000"/>
+          </a:xfrm>
+          <a:prstGeom prst="rect">
+            <a:avLst/>
+          </a:prstGeom>
+        </p:spPr>
+        <p:style>
+          <a:lnRef idx="2">
+            <a:schemeClr val="accent1"/>
+          </a:lnRef>
+          <a:fillRef idx="1">
+            <a:schemeClr val="lt1"/>
+          </a:fillRef>
+          <a:effectRef idx="0">
+            <a:schemeClr val="accent1"/>
+          </a:effectRef>
+          <a:fontRef idx="minor">
+            <a:schemeClr val="dk1"/>
+          </a:fontRef>
+        </p:style>
+        <p:txBody>
+          <a:bodyPr rtlCol="0" anchor="ctr"/>
+          <a:lstStyle/>
+          <a:p>
+            <a:pPr algn="ctr"/>
+            <a:r>
+              <a:rPr lang="en-US" altLang="zh-CN" dirty="0" smtClean="0"/>
+              <a:t>0</a:t>
+            </a:r>
+            <a:endParaRPr lang="zh-CN" altLang="en-US" dirty="0"/>
+          </a:p>
+        </p:txBody>
+      </p:sp>
+      <p:sp>
+        <p:nvSpPr>
+          <p:cNvPr id="36" name="矩形 35"/>
+          <p:cNvSpPr/>
+          <p:nvPr/>
+        </p:nvSpPr>
+        <p:spPr>
+          <a:xfrm>
+            <a:off x="1561356" y="1151155"/>
+            <a:ext cx="360000" cy="360000"/>
+          </a:xfrm>
+          <a:prstGeom prst="rect">
+            <a:avLst/>
+          </a:prstGeom>
+        </p:spPr>
+        <p:style>
+          <a:lnRef idx="2">
+            <a:schemeClr val="accent1"/>
+          </a:lnRef>
+          <a:fillRef idx="1">
+            <a:schemeClr val="lt1"/>
+          </a:fillRef>
+          <a:effectRef idx="0">
+            <a:schemeClr val="accent1"/>
+          </a:effectRef>
+          <a:fontRef idx="minor">
+            <a:schemeClr val="dk1"/>
+          </a:fontRef>
+        </p:style>
+        <p:txBody>
+          <a:bodyPr rtlCol="0" anchor="ctr"/>
+          <a:lstStyle/>
+          <a:p>
+            <a:pPr algn="ctr"/>
+            <a:r>
+              <a:rPr lang="en-US" altLang="zh-CN" dirty="0" smtClean="0"/>
+              <a:t>0</a:t>
+            </a:r>
+            <a:endParaRPr lang="zh-CN" altLang="en-US" dirty="0"/>
+          </a:p>
+        </p:txBody>
+      </p:sp>
+      <p:sp>
+        <p:nvSpPr>
+          <p:cNvPr id="37" name="矩形 36"/>
+          <p:cNvSpPr/>
+          <p:nvPr/>
+        </p:nvSpPr>
+        <p:spPr>
+          <a:xfrm>
+            <a:off x="1921356" y="1151155"/>
+            <a:ext cx="360000" cy="360000"/>
+          </a:xfrm>
+          <a:prstGeom prst="rect">
+            <a:avLst/>
+          </a:prstGeom>
+        </p:spPr>
+        <p:style>
+          <a:lnRef idx="2">
+            <a:schemeClr val="accent1"/>
+          </a:lnRef>
+          <a:fillRef idx="1">
+            <a:schemeClr val="lt1"/>
+          </a:fillRef>
+          <a:effectRef idx="0">
+            <a:schemeClr val="accent1"/>
+          </a:effectRef>
+          <a:fontRef idx="minor">
+            <a:schemeClr val="dk1"/>
+          </a:fontRef>
+        </p:style>
+        <p:txBody>
+          <a:bodyPr rtlCol="0" anchor="ctr"/>
+          <a:lstStyle/>
+          <a:p>
+            <a:pPr algn="ctr"/>
+            <a:r>
+              <a:rPr lang="en-US" altLang="zh-CN" dirty="0" smtClean="0"/>
+              <a:t>0</a:t>
+            </a:r>
+            <a:endParaRPr lang="zh-CN" altLang="en-US" dirty="0"/>
+          </a:p>
+        </p:txBody>
+      </p:sp>
+      <p:sp>
+        <p:nvSpPr>
+          <p:cNvPr id="38" name="矩形 37"/>
+          <p:cNvSpPr/>
+          <p:nvPr/>
+        </p:nvSpPr>
+        <p:spPr>
+          <a:xfrm>
+            <a:off x="2281356" y="1151155"/>
+            <a:ext cx="360000" cy="360000"/>
+          </a:xfrm>
+          <a:prstGeom prst="rect">
+            <a:avLst/>
+          </a:prstGeom>
+        </p:spPr>
+        <p:style>
+          <a:lnRef idx="2">
+            <a:schemeClr val="accent1"/>
+          </a:lnRef>
+          <a:fillRef idx="1">
+            <a:schemeClr val="lt1"/>
+          </a:fillRef>
+          <a:effectRef idx="0">
+            <a:schemeClr val="accent1"/>
+          </a:effectRef>
+          <a:fontRef idx="minor">
+            <a:schemeClr val="dk1"/>
+          </a:fontRef>
+        </p:style>
+        <p:txBody>
+          <a:bodyPr rtlCol="0" anchor="ctr"/>
+          <a:lstStyle/>
+          <a:p>
+            <a:pPr algn="ctr"/>
+            <a:r>
+              <a:rPr lang="en-US" altLang="zh-CN" dirty="0" smtClean="0"/>
+              <a:t>0</a:t>
+            </a:r>
+            <a:endParaRPr lang="zh-CN" altLang="en-US" dirty="0"/>
+          </a:p>
+        </p:txBody>
+      </p:sp>
+      <p:sp>
+        <p:nvSpPr>
+          <p:cNvPr id="45" name="矩形 44"/>
+          <p:cNvSpPr/>
+          <p:nvPr/>
+        </p:nvSpPr>
+        <p:spPr>
+          <a:xfrm>
+            <a:off x="2641356" y="1149748"/>
+            <a:ext cx="360000" cy="360000"/>
+          </a:xfrm>
+          <a:prstGeom prst="rect">
+            <a:avLst/>
+          </a:prstGeom>
+        </p:spPr>
+        <p:style>
+          <a:lnRef idx="2">
+            <a:schemeClr val="accent1"/>
+          </a:lnRef>
+          <a:fillRef idx="1">
+            <a:schemeClr val="lt1"/>
+          </a:fillRef>
+          <a:effectRef idx="0">
+            <a:schemeClr val="accent1"/>
+          </a:effectRef>
+          <a:fontRef idx="minor">
+            <a:schemeClr val="dk1"/>
+          </a:fontRef>
+        </p:style>
+        <p:txBody>
+          <a:bodyPr rtlCol="0" anchor="ctr"/>
+          <a:lstStyle/>
+          <a:p>
+            <a:pPr algn="ctr"/>
+            <a:r>
+              <a:rPr lang="en-US" altLang="zh-CN" dirty="0" smtClean="0"/>
+              <a:t>0</a:t>
+            </a:r>
+            <a:endParaRPr lang="zh-CN" altLang="en-US" dirty="0"/>
+          </a:p>
+        </p:txBody>
+      </p:sp>
+      <p:sp>
+        <p:nvSpPr>
+          <p:cNvPr id="46" name="矩形 45"/>
+          <p:cNvSpPr/>
+          <p:nvPr/>
+        </p:nvSpPr>
+        <p:spPr>
+          <a:xfrm>
+            <a:off x="3001356" y="1149748"/>
+            <a:ext cx="360000" cy="360000"/>
+          </a:xfrm>
+          <a:prstGeom prst="rect">
+            <a:avLst/>
+          </a:prstGeom>
+        </p:spPr>
+        <p:style>
+          <a:lnRef idx="2">
+            <a:schemeClr val="accent1"/>
+          </a:lnRef>
+          <a:fillRef idx="1">
+            <a:schemeClr val="lt1"/>
+          </a:fillRef>
+          <a:effectRef idx="0">
+            <a:schemeClr val="accent1"/>
+          </a:effectRef>
+          <a:fontRef idx="minor">
+            <a:schemeClr val="dk1"/>
+          </a:fontRef>
+        </p:style>
+        <p:txBody>
+          <a:bodyPr rtlCol="0" anchor="ctr"/>
+          <a:lstStyle/>
+          <a:p>
+            <a:pPr algn="ctr"/>
+            <a:r>
+              <a:rPr lang="en-US" altLang="zh-CN" dirty="0" smtClean="0"/>
+              <a:t>0</a:t>
+            </a:r>
+            <a:endParaRPr lang="zh-CN" altLang="en-US" dirty="0"/>
+          </a:p>
+        </p:txBody>
+      </p:sp>
+      <p:sp>
+        <p:nvSpPr>
+          <p:cNvPr id="65" name="矩形 64"/>
+          <p:cNvSpPr/>
+          <p:nvPr/>
+        </p:nvSpPr>
+        <p:spPr>
+          <a:xfrm>
+            <a:off x="121356" y="789748"/>
+            <a:ext cx="360000" cy="360000"/>
+          </a:xfrm>
+          <a:prstGeom prst="rect">
+            <a:avLst/>
+          </a:prstGeom>
+          <a:ln>
+            <a:noFill/>
+          </a:ln>
+        </p:spPr>
+        <p:style>
+          <a:lnRef idx="2">
+            <a:schemeClr val="accent1"/>
+          </a:lnRef>
+          <a:fillRef idx="1">
+            <a:schemeClr val="lt1"/>
+          </a:fillRef>
+          <a:effectRef idx="0">
+            <a:schemeClr val="accent1"/>
+          </a:effectRef>
+          <a:fontRef idx="minor">
+            <a:schemeClr val="dk1"/>
+          </a:fontRef>
+        </p:style>
+        <p:txBody>
+          <a:bodyPr rtlCol="0" anchor="ctr"/>
+          <a:lstStyle/>
+          <a:p>
+            <a:pPr algn="ctr"/>
+            <a:r>
+              <a:rPr lang="en-US" altLang="zh-CN" dirty="0"/>
+              <a:t>a</a:t>
+            </a:r>
+            <a:endParaRPr lang="zh-CN" altLang="en-US" dirty="0"/>
+          </a:p>
+        </p:txBody>
+      </p:sp>
+      <p:sp>
+        <p:nvSpPr>
+          <p:cNvPr id="66" name="矩形 65"/>
+          <p:cNvSpPr/>
+          <p:nvPr/>
+        </p:nvSpPr>
+        <p:spPr>
+          <a:xfrm>
+            <a:off x="121356" y="1142337"/>
+            <a:ext cx="360000" cy="360000"/>
+          </a:xfrm>
+          <a:prstGeom prst="rect">
+            <a:avLst/>
+          </a:prstGeom>
+          <a:ln>
+            <a:noFill/>
+          </a:ln>
+        </p:spPr>
+        <p:style>
+          <a:lnRef idx="2">
+            <a:schemeClr val="accent1"/>
+          </a:lnRef>
+          <a:fillRef idx="1">
+            <a:schemeClr val="lt1"/>
+          </a:fillRef>
+          <a:effectRef idx="0">
+            <a:schemeClr val="accent1"/>
+          </a:effectRef>
+          <a:fontRef idx="minor">
+            <a:schemeClr val="dk1"/>
+          </a:fontRef>
+        </p:style>
+        <p:txBody>
+          <a:bodyPr rtlCol="0" anchor="ctr"/>
+          <a:lstStyle/>
+          <a:p>
+            <a:pPr algn="ctr"/>
+            <a:r>
+              <a:rPr lang="en-US" altLang="zh-CN" dirty="0" smtClean="0"/>
+              <a:t>.</a:t>
+            </a:r>
+            <a:endParaRPr lang="zh-CN" altLang="en-US" dirty="0"/>
+          </a:p>
+        </p:txBody>
+      </p:sp>
+      <p:sp>
+        <p:nvSpPr>
+          <p:cNvPr id="67" name="矩形 66"/>
+          <p:cNvSpPr/>
+          <p:nvPr/>
+        </p:nvSpPr>
+        <p:spPr>
+          <a:xfrm>
+            <a:off x="121356" y="1516783"/>
+            <a:ext cx="360000" cy="360000"/>
+          </a:xfrm>
+          <a:prstGeom prst="rect">
+            <a:avLst/>
+          </a:prstGeom>
+          <a:ln>
+            <a:noFill/>
+          </a:ln>
+        </p:spPr>
+        <p:style>
+          <a:lnRef idx="2">
+            <a:schemeClr val="accent1"/>
+          </a:lnRef>
+          <a:fillRef idx="1">
+            <a:schemeClr val="lt1"/>
+          </a:fillRef>
+          <a:effectRef idx="0">
+            <a:schemeClr val="accent1"/>
+          </a:effectRef>
+          <a:fontRef idx="minor">
+            <a:schemeClr val="dk1"/>
+          </a:fontRef>
+        </p:style>
+        <p:txBody>
+          <a:bodyPr rtlCol="0" anchor="ctr"/>
+          <a:lstStyle/>
+          <a:p>
+            <a:pPr algn="ctr"/>
+            <a:r>
+              <a:rPr lang="en-US" altLang="zh-CN" dirty="0" smtClean="0"/>
+              <a:t>*</a:t>
+            </a:r>
+            <a:endParaRPr lang="zh-CN" altLang="en-US" dirty="0"/>
+          </a:p>
+        </p:txBody>
+      </p:sp>
+      <p:sp>
+        <p:nvSpPr>
+          <p:cNvPr id="68" name="矩形 67"/>
+          <p:cNvSpPr/>
+          <p:nvPr/>
+        </p:nvSpPr>
+        <p:spPr>
+          <a:xfrm>
+            <a:off x="121356" y="1869372"/>
+            <a:ext cx="360000" cy="360000"/>
+          </a:xfrm>
+          <a:prstGeom prst="rect">
+            <a:avLst/>
+          </a:prstGeom>
+          <a:ln>
+            <a:noFill/>
+          </a:ln>
+        </p:spPr>
+        <p:style>
+          <a:lnRef idx="2">
+            <a:schemeClr val="accent1"/>
+          </a:lnRef>
+          <a:fillRef idx="1">
+            <a:schemeClr val="lt1"/>
+          </a:fillRef>
+          <a:effectRef idx="0">
+            <a:schemeClr val="accent1"/>
+          </a:effectRef>
+          <a:fontRef idx="minor">
+            <a:schemeClr val="dk1"/>
+          </a:fontRef>
+        </p:style>
+        <p:txBody>
+          <a:bodyPr rtlCol="0" anchor="ctr"/>
+          <a:lstStyle/>
+          <a:p>
+            <a:pPr algn="ctr"/>
+            <a:r>
+              <a:rPr lang="en-US" altLang="zh-CN" dirty="0" smtClean="0"/>
+              <a:t>d</a:t>
+            </a:r>
+            <a:endParaRPr lang="zh-CN" altLang="en-US" dirty="0"/>
+          </a:p>
+        </p:txBody>
+      </p:sp>
+      <p:sp>
+        <p:nvSpPr>
+          <p:cNvPr id="69" name="矩形 68"/>
+          <p:cNvSpPr/>
+          <p:nvPr/>
+        </p:nvSpPr>
+        <p:spPr>
+          <a:xfrm>
+            <a:off x="121356" y="2233593"/>
+            <a:ext cx="360000" cy="360000"/>
+          </a:xfrm>
+          <a:prstGeom prst="rect">
+            <a:avLst/>
+          </a:prstGeom>
+          <a:ln>
+            <a:noFill/>
+          </a:ln>
+        </p:spPr>
+        <p:style>
+          <a:lnRef idx="2">
+            <a:schemeClr val="accent1"/>
+          </a:lnRef>
+          <a:fillRef idx="1">
+            <a:schemeClr val="lt1"/>
+          </a:fillRef>
+          <a:effectRef idx="0">
+            <a:schemeClr val="accent1"/>
+          </a:effectRef>
+          <a:fontRef idx="minor">
+            <a:schemeClr val="dk1"/>
+          </a:fontRef>
+        </p:style>
+        <p:txBody>
+          <a:bodyPr rtlCol="0" anchor="ctr"/>
+          <a:lstStyle/>
+          <a:p>
+            <a:pPr algn="ctr"/>
+            <a:r>
+              <a:rPr lang="en-US" altLang="zh-CN" dirty="0" smtClean="0"/>
+              <a:t>*</a:t>
+            </a:r>
+            <a:endParaRPr lang="zh-CN" altLang="en-US" dirty="0"/>
+          </a:p>
+        </p:txBody>
+      </p:sp>
+      <p:sp>
+        <p:nvSpPr>
+          <p:cNvPr id="70" name="矩形 69"/>
+          <p:cNvSpPr/>
+          <p:nvPr/>
+        </p:nvSpPr>
+        <p:spPr>
+          <a:xfrm>
+            <a:off x="121356" y="2586182"/>
+            <a:ext cx="360000" cy="360000"/>
+          </a:xfrm>
+          <a:prstGeom prst="rect">
+            <a:avLst/>
+          </a:prstGeom>
+          <a:ln>
+            <a:noFill/>
+          </a:ln>
+        </p:spPr>
+        <p:style>
+          <a:lnRef idx="2">
+            <a:schemeClr val="accent1"/>
+          </a:lnRef>
+          <a:fillRef idx="1">
+            <a:schemeClr val="lt1"/>
+          </a:fillRef>
+          <a:effectRef idx="0">
+            <a:schemeClr val="accent1"/>
+          </a:effectRef>
+          <a:fontRef idx="minor">
+            <a:schemeClr val="dk1"/>
+          </a:fontRef>
+        </p:style>
+        <p:txBody>
+          <a:bodyPr rtlCol="0" anchor="ctr"/>
+          <a:lstStyle/>
+          <a:p>
+            <a:pPr algn="ctr"/>
+            <a:r>
+              <a:rPr lang="en-US" altLang="zh-CN" dirty="0"/>
+              <a:t>g</a:t>
+            </a:r>
+            <a:endParaRPr lang="zh-CN" altLang="en-US" dirty="0"/>
+          </a:p>
+        </p:txBody>
+      </p:sp>
+      <p:sp>
+        <p:nvSpPr>
+          <p:cNvPr id="79" name="矩形 78"/>
+          <p:cNvSpPr/>
+          <p:nvPr/>
+        </p:nvSpPr>
+        <p:spPr>
+          <a:xfrm>
+            <a:off x="481356" y="1516715"/>
+            <a:ext cx="360000" cy="360000"/>
+          </a:xfrm>
+          <a:prstGeom prst="rect">
+            <a:avLst/>
+          </a:prstGeom>
+        </p:spPr>
+        <p:style>
+          <a:lnRef idx="2">
+            <a:schemeClr val="accent1"/>
+          </a:lnRef>
+          <a:fillRef idx="1">
+            <a:schemeClr val="lt1"/>
+          </a:fillRef>
+          <a:effectRef idx="0">
+            <a:schemeClr val="accent1"/>
+          </a:effectRef>
+          <a:fontRef idx="minor">
+            <a:schemeClr val="dk1"/>
+          </a:fontRef>
+        </p:style>
+        <p:txBody>
+          <a:bodyPr rtlCol="0" anchor="ctr"/>
+          <a:lstStyle/>
+          <a:p>
+            <a:pPr algn="ctr"/>
+            <a:r>
+              <a:rPr lang="en-US" altLang="zh-CN" dirty="0" smtClean="0"/>
+              <a:t>0</a:t>
+            </a:r>
+            <a:endParaRPr lang="zh-CN" altLang="en-US" dirty="0"/>
+          </a:p>
+        </p:txBody>
+      </p:sp>
+      <p:sp>
+        <p:nvSpPr>
+          <p:cNvPr id="80" name="矩形 79"/>
+          <p:cNvSpPr/>
+          <p:nvPr/>
+        </p:nvSpPr>
+        <p:spPr>
+          <a:xfrm>
+            <a:off x="841356" y="1516715"/>
+            <a:ext cx="360000" cy="360000"/>
+          </a:xfrm>
+          <a:prstGeom prst="rect">
+            <a:avLst/>
+          </a:prstGeom>
+        </p:spPr>
+        <p:style>
+          <a:lnRef idx="2">
+            <a:schemeClr val="accent1"/>
+          </a:lnRef>
+          <a:fillRef idx="1">
+            <a:schemeClr val="lt1"/>
+          </a:fillRef>
+          <a:effectRef idx="0">
+            <a:schemeClr val="accent1"/>
+          </a:effectRef>
+          <a:fontRef idx="minor">
+            <a:schemeClr val="dk1"/>
+          </a:fontRef>
+        </p:style>
+        <p:txBody>
+          <a:bodyPr rtlCol="0" anchor="ctr"/>
+          <a:lstStyle/>
+          <a:p>
+            <a:pPr algn="ctr"/>
+            <a:r>
+              <a:rPr lang="en-US" altLang="zh-CN" dirty="0" smtClean="0"/>
+              <a:t>0</a:t>
+            </a:r>
+            <a:endParaRPr lang="zh-CN" altLang="en-US" dirty="0"/>
+          </a:p>
+        </p:txBody>
+      </p:sp>
+      <p:sp>
+        <p:nvSpPr>
+          <p:cNvPr id="81" name="矩形 80"/>
+          <p:cNvSpPr/>
+          <p:nvPr/>
+        </p:nvSpPr>
+        <p:spPr>
+          <a:xfrm>
+            <a:off x="1201356" y="1516715"/>
+            <a:ext cx="360000" cy="360000"/>
+          </a:xfrm>
+          <a:prstGeom prst="rect">
+            <a:avLst/>
+          </a:prstGeom>
+        </p:spPr>
+        <p:style>
+          <a:lnRef idx="2">
+            <a:schemeClr val="accent1"/>
+          </a:lnRef>
+          <a:fillRef idx="1">
+            <a:schemeClr val="lt1"/>
+          </a:fillRef>
+          <a:effectRef idx="0">
+            <a:schemeClr val="accent1"/>
+          </a:effectRef>
+          <a:fontRef idx="minor">
+            <a:schemeClr val="dk1"/>
+          </a:fontRef>
+        </p:style>
+        <p:txBody>
+          <a:bodyPr rtlCol="0" anchor="ctr"/>
+          <a:lstStyle/>
+          <a:p>
+            <a:pPr algn="ctr"/>
+            <a:r>
+              <a:rPr lang="en-US" altLang="zh-CN" dirty="0" smtClean="0"/>
+              <a:t>0</a:t>
+            </a:r>
+            <a:endParaRPr lang="zh-CN" altLang="en-US" dirty="0"/>
+          </a:p>
+        </p:txBody>
+      </p:sp>
+      <p:sp>
+        <p:nvSpPr>
+          <p:cNvPr id="82" name="矩形 81"/>
+          <p:cNvSpPr/>
+          <p:nvPr/>
+        </p:nvSpPr>
+        <p:spPr>
+          <a:xfrm>
+            <a:off x="1561356" y="1516715"/>
+            <a:ext cx="360000" cy="360000"/>
+          </a:xfrm>
+          <a:prstGeom prst="rect">
+            <a:avLst/>
+          </a:prstGeom>
+        </p:spPr>
+        <p:style>
+          <a:lnRef idx="2">
+            <a:schemeClr val="accent1"/>
+          </a:lnRef>
+          <a:fillRef idx="1">
+            <a:schemeClr val="lt1"/>
+          </a:fillRef>
+          <a:effectRef idx="0">
+            <a:schemeClr val="accent1"/>
+          </a:effectRef>
+          <a:fontRef idx="minor">
+            <a:schemeClr val="dk1"/>
+          </a:fontRef>
+        </p:style>
+        <p:txBody>
+          <a:bodyPr rtlCol="0" anchor="ctr"/>
+          <a:lstStyle/>
+          <a:p>
+            <a:pPr algn="ctr"/>
+            <a:r>
+              <a:rPr lang="en-US" altLang="zh-CN" dirty="0" smtClean="0"/>
+              <a:t>0</a:t>
+            </a:r>
+            <a:endParaRPr lang="zh-CN" altLang="en-US" dirty="0"/>
+          </a:p>
+        </p:txBody>
+      </p:sp>
+      <p:sp>
+        <p:nvSpPr>
+          <p:cNvPr id="83" name="矩形 82"/>
+          <p:cNvSpPr/>
+          <p:nvPr/>
+        </p:nvSpPr>
+        <p:spPr>
+          <a:xfrm>
+            <a:off x="1921356" y="1516715"/>
+            <a:ext cx="360000" cy="360000"/>
+          </a:xfrm>
+          <a:prstGeom prst="rect">
+            <a:avLst/>
+          </a:prstGeom>
+        </p:spPr>
+        <p:style>
+          <a:lnRef idx="2">
+            <a:schemeClr val="accent1"/>
+          </a:lnRef>
+          <a:fillRef idx="1">
+            <a:schemeClr val="lt1"/>
+          </a:fillRef>
+          <a:effectRef idx="0">
+            <a:schemeClr val="accent1"/>
+          </a:effectRef>
+          <a:fontRef idx="minor">
+            <a:schemeClr val="dk1"/>
+          </a:fontRef>
+        </p:style>
+        <p:txBody>
+          <a:bodyPr rtlCol="0" anchor="ctr"/>
+          <a:lstStyle/>
+          <a:p>
+            <a:pPr algn="ctr"/>
+            <a:r>
+              <a:rPr lang="en-US" altLang="zh-CN" dirty="0" smtClean="0"/>
+              <a:t>0</a:t>
+            </a:r>
+            <a:endParaRPr lang="zh-CN" altLang="en-US" dirty="0"/>
+          </a:p>
+        </p:txBody>
+      </p:sp>
+      <p:sp>
+        <p:nvSpPr>
+          <p:cNvPr id="84" name="矩形 83"/>
+          <p:cNvSpPr/>
+          <p:nvPr/>
+        </p:nvSpPr>
+        <p:spPr>
+          <a:xfrm>
+            <a:off x="2281356" y="1516715"/>
+            <a:ext cx="360000" cy="360000"/>
+          </a:xfrm>
+          <a:prstGeom prst="rect">
+            <a:avLst/>
+          </a:prstGeom>
+        </p:spPr>
+        <p:style>
+          <a:lnRef idx="2">
+            <a:schemeClr val="accent1"/>
+          </a:lnRef>
+          <a:fillRef idx="1">
+            <a:schemeClr val="lt1"/>
+          </a:fillRef>
+          <a:effectRef idx="0">
+            <a:schemeClr val="accent1"/>
+          </a:effectRef>
+          <a:fontRef idx="minor">
+            <a:schemeClr val="dk1"/>
+          </a:fontRef>
+        </p:style>
+        <p:txBody>
+          <a:bodyPr rtlCol="0" anchor="ctr"/>
+          <a:lstStyle/>
+          <a:p>
+            <a:pPr algn="ctr"/>
+            <a:r>
+              <a:rPr lang="en-US" altLang="zh-CN" dirty="0" smtClean="0"/>
+              <a:t>0</a:t>
+            </a:r>
+            <a:endParaRPr lang="zh-CN" altLang="en-US" dirty="0"/>
+          </a:p>
+        </p:txBody>
+      </p:sp>
+      <p:sp>
+        <p:nvSpPr>
+          <p:cNvPr id="85" name="矩形 84"/>
+          <p:cNvSpPr/>
+          <p:nvPr/>
+        </p:nvSpPr>
+        <p:spPr>
+          <a:xfrm>
+            <a:off x="2641356" y="1515308"/>
+            <a:ext cx="360000" cy="360000"/>
+          </a:xfrm>
+          <a:prstGeom prst="rect">
+            <a:avLst/>
+          </a:prstGeom>
+        </p:spPr>
+        <p:style>
+          <a:lnRef idx="2">
+            <a:schemeClr val="accent1"/>
+          </a:lnRef>
+          <a:fillRef idx="1">
+            <a:schemeClr val="lt1"/>
+          </a:fillRef>
+          <a:effectRef idx="0">
+            <a:schemeClr val="accent1"/>
+          </a:effectRef>
+          <a:fontRef idx="minor">
+            <a:schemeClr val="dk1"/>
+          </a:fontRef>
+        </p:style>
+        <p:txBody>
+          <a:bodyPr rtlCol="0" anchor="ctr"/>
+          <a:lstStyle/>
+          <a:p>
+            <a:pPr algn="ctr"/>
+            <a:r>
+              <a:rPr lang="en-US" altLang="zh-CN" dirty="0" smtClean="0"/>
+              <a:t>0</a:t>
+            </a:r>
+            <a:endParaRPr lang="zh-CN" altLang="en-US" dirty="0"/>
+          </a:p>
+        </p:txBody>
+      </p:sp>
+      <p:sp>
+        <p:nvSpPr>
+          <p:cNvPr id="86" name="矩形 85"/>
+          <p:cNvSpPr/>
+          <p:nvPr/>
+        </p:nvSpPr>
+        <p:spPr>
+          <a:xfrm>
+            <a:off x="3001356" y="1515308"/>
+            <a:ext cx="360000" cy="360000"/>
+          </a:xfrm>
+          <a:prstGeom prst="rect">
+            <a:avLst/>
+          </a:prstGeom>
+        </p:spPr>
+        <p:style>
+          <a:lnRef idx="2">
+            <a:schemeClr val="accent1"/>
+          </a:lnRef>
+          <a:fillRef idx="1">
+            <a:schemeClr val="lt1"/>
+          </a:fillRef>
+          <a:effectRef idx="0">
+            <a:schemeClr val="accent1"/>
+          </a:effectRef>
+          <a:fontRef idx="minor">
+            <a:schemeClr val="dk1"/>
+          </a:fontRef>
+        </p:style>
+        <p:txBody>
+          <a:bodyPr rtlCol="0" anchor="ctr"/>
+          <a:lstStyle/>
+          <a:p>
+            <a:pPr algn="ctr"/>
+            <a:r>
+              <a:rPr lang="en-US" altLang="zh-CN" dirty="0" smtClean="0"/>
+              <a:t>0</a:t>
+            </a:r>
+            <a:endParaRPr lang="zh-CN" altLang="en-US" dirty="0"/>
+          </a:p>
+        </p:txBody>
+      </p:sp>
+      <p:sp>
+        <p:nvSpPr>
+          <p:cNvPr id="87" name="矩形 86"/>
+          <p:cNvSpPr/>
+          <p:nvPr/>
+        </p:nvSpPr>
+        <p:spPr>
+          <a:xfrm>
+            <a:off x="481356" y="1873901"/>
+            <a:ext cx="360000" cy="360000"/>
+          </a:xfrm>
+          <a:prstGeom prst="rect">
+            <a:avLst/>
+          </a:prstGeom>
+        </p:spPr>
+        <p:style>
+          <a:lnRef idx="2">
+            <a:schemeClr val="accent1"/>
+          </a:lnRef>
+          <a:fillRef idx="1">
+            <a:schemeClr val="lt1"/>
+          </a:fillRef>
+          <a:effectRef idx="0">
+            <a:schemeClr val="accent1"/>
+          </a:effectRef>
+          <a:fontRef idx="minor">
+            <a:schemeClr val="dk1"/>
+          </a:fontRef>
+        </p:style>
+        <p:txBody>
+          <a:bodyPr rtlCol="0" anchor="ctr"/>
+          <a:lstStyle/>
+          <a:p>
+            <a:pPr algn="ctr"/>
+            <a:r>
+              <a:rPr lang="en-US" altLang="zh-CN" dirty="0" smtClean="0"/>
+              <a:t>0</a:t>
+            </a:r>
+            <a:endParaRPr lang="zh-CN" altLang="en-US" dirty="0"/>
+          </a:p>
+        </p:txBody>
+      </p:sp>
+      <p:sp>
+        <p:nvSpPr>
+          <p:cNvPr id="88" name="矩形 87"/>
+          <p:cNvSpPr/>
+          <p:nvPr/>
+        </p:nvSpPr>
+        <p:spPr>
+          <a:xfrm>
+            <a:off x="841356" y="1873901"/>
+            <a:ext cx="360000" cy="360000"/>
+          </a:xfrm>
+          <a:prstGeom prst="rect">
+            <a:avLst/>
+          </a:prstGeom>
+        </p:spPr>
+        <p:style>
+          <a:lnRef idx="2">
+            <a:schemeClr val="accent1"/>
+          </a:lnRef>
+          <a:fillRef idx="1">
+            <a:schemeClr val="lt1"/>
+          </a:fillRef>
+          <a:effectRef idx="0">
+            <a:schemeClr val="accent1"/>
+          </a:effectRef>
+          <a:fontRef idx="minor">
+            <a:schemeClr val="dk1"/>
+          </a:fontRef>
+        </p:style>
+        <p:txBody>
+          <a:bodyPr rtlCol="0" anchor="ctr"/>
+          <a:lstStyle/>
+          <a:p>
+            <a:pPr algn="ctr"/>
+            <a:r>
+              <a:rPr lang="en-US" altLang="zh-CN" dirty="0" smtClean="0"/>
+              <a:t>0</a:t>
+            </a:r>
+            <a:endParaRPr lang="zh-CN" altLang="en-US" dirty="0"/>
+          </a:p>
+        </p:txBody>
+      </p:sp>
+      <p:sp>
+        <p:nvSpPr>
+          <p:cNvPr id="89" name="矩形 88"/>
+          <p:cNvSpPr/>
+          <p:nvPr/>
+        </p:nvSpPr>
+        <p:spPr>
+          <a:xfrm>
+            <a:off x="1201356" y="1873901"/>
+            <a:ext cx="360000" cy="360000"/>
+          </a:xfrm>
+          <a:prstGeom prst="rect">
+            <a:avLst/>
+          </a:prstGeom>
+        </p:spPr>
+        <p:style>
+          <a:lnRef idx="2">
+            <a:schemeClr val="accent1"/>
+          </a:lnRef>
+          <a:fillRef idx="1">
+            <a:schemeClr val="lt1"/>
+          </a:fillRef>
+          <a:effectRef idx="0">
+            <a:schemeClr val="accent1"/>
+          </a:effectRef>
+          <a:fontRef idx="minor">
+            <a:schemeClr val="dk1"/>
+          </a:fontRef>
+        </p:style>
+        <p:txBody>
+          <a:bodyPr rtlCol="0" anchor="ctr"/>
+          <a:lstStyle/>
+          <a:p>
+            <a:pPr algn="ctr"/>
+            <a:r>
+              <a:rPr lang="en-US" altLang="zh-CN" dirty="0" smtClean="0"/>
+              <a:t>0</a:t>
+            </a:r>
+            <a:endParaRPr lang="zh-CN" altLang="en-US" dirty="0"/>
+          </a:p>
+        </p:txBody>
+      </p:sp>
+      <p:sp>
+        <p:nvSpPr>
+          <p:cNvPr id="90" name="矩形 89"/>
+          <p:cNvSpPr/>
+          <p:nvPr/>
+        </p:nvSpPr>
+        <p:spPr>
+          <a:xfrm>
+            <a:off x="1561356" y="1873901"/>
+            <a:ext cx="360000" cy="360000"/>
+          </a:xfrm>
+          <a:prstGeom prst="rect">
+            <a:avLst/>
+          </a:prstGeom>
+        </p:spPr>
+        <p:style>
+          <a:lnRef idx="2">
+            <a:schemeClr val="accent1"/>
+          </a:lnRef>
+          <a:fillRef idx="1">
+            <a:schemeClr val="lt1"/>
+          </a:fillRef>
+          <a:effectRef idx="0">
+            <a:schemeClr val="accent1"/>
+          </a:effectRef>
+          <a:fontRef idx="minor">
+            <a:schemeClr val="dk1"/>
+          </a:fontRef>
+        </p:style>
+        <p:txBody>
+          <a:bodyPr rtlCol="0" anchor="ctr"/>
+          <a:lstStyle/>
+          <a:p>
+            <a:pPr algn="ctr"/>
+            <a:r>
+              <a:rPr lang="en-US" altLang="zh-CN" dirty="0" smtClean="0"/>
+              <a:t>0</a:t>
+            </a:r>
+            <a:endParaRPr lang="zh-CN" altLang="en-US" dirty="0"/>
+          </a:p>
+        </p:txBody>
+      </p:sp>
+      <p:sp>
+        <p:nvSpPr>
+          <p:cNvPr id="91" name="矩形 90"/>
+          <p:cNvSpPr/>
+          <p:nvPr/>
+        </p:nvSpPr>
+        <p:spPr>
+          <a:xfrm>
+            <a:off x="1921356" y="1873901"/>
+            <a:ext cx="360000" cy="360000"/>
+          </a:xfrm>
+          <a:prstGeom prst="rect">
+            <a:avLst/>
+          </a:prstGeom>
+        </p:spPr>
+        <p:style>
+          <a:lnRef idx="2">
+            <a:schemeClr val="accent1"/>
+          </a:lnRef>
+          <a:fillRef idx="1">
+            <a:schemeClr val="lt1"/>
+          </a:fillRef>
+          <a:effectRef idx="0">
+            <a:schemeClr val="accent1"/>
+          </a:effectRef>
+          <a:fontRef idx="minor">
+            <a:schemeClr val="dk1"/>
+          </a:fontRef>
+        </p:style>
+        <p:txBody>
+          <a:bodyPr rtlCol="0" anchor="ctr"/>
+          <a:lstStyle/>
+          <a:p>
+            <a:pPr algn="ctr"/>
+            <a:r>
+              <a:rPr lang="en-US" altLang="zh-CN" dirty="0" smtClean="0"/>
+              <a:t>0</a:t>
+            </a:r>
+            <a:endParaRPr lang="zh-CN" altLang="en-US" dirty="0"/>
+          </a:p>
+        </p:txBody>
+      </p:sp>
+      <p:sp>
+        <p:nvSpPr>
+          <p:cNvPr id="92" name="矩形 91"/>
+          <p:cNvSpPr/>
+          <p:nvPr/>
+        </p:nvSpPr>
+        <p:spPr>
+          <a:xfrm>
+            <a:off x="2281356" y="1873901"/>
+            <a:ext cx="360000" cy="360000"/>
+          </a:xfrm>
+          <a:prstGeom prst="rect">
+            <a:avLst/>
+          </a:prstGeom>
+        </p:spPr>
+        <p:style>
+          <a:lnRef idx="2">
+            <a:schemeClr val="accent1"/>
+          </a:lnRef>
+          <a:fillRef idx="1">
+            <a:schemeClr val="lt1"/>
+          </a:fillRef>
+          <a:effectRef idx="0">
+            <a:schemeClr val="accent1"/>
+          </a:effectRef>
+          <a:fontRef idx="minor">
+            <a:schemeClr val="dk1"/>
+          </a:fontRef>
+        </p:style>
+        <p:txBody>
+          <a:bodyPr rtlCol="0" anchor="ctr"/>
+          <a:lstStyle/>
+          <a:p>
+            <a:pPr algn="ctr"/>
+            <a:r>
+              <a:rPr lang="en-US" altLang="zh-CN" dirty="0" smtClean="0"/>
+              <a:t>0</a:t>
+            </a:r>
+            <a:endParaRPr lang="zh-CN" altLang="en-US" dirty="0"/>
+          </a:p>
+        </p:txBody>
+      </p:sp>
+      <p:sp>
+        <p:nvSpPr>
+          <p:cNvPr id="93" name="矩形 92"/>
+          <p:cNvSpPr/>
+          <p:nvPr/>
+        </p:nvSpPr>
+        <p:spPr>
+          <a:xfrm>
+            <a:off x="2641356" y="1872494"/>
+            <a:ext cx="360000" cy="360000"/>
+          </a:xfrm>
+          <a:prstGeom prst="rect">
+            <a:avLst/>
+          </a:prstGeom>
+        </p:spPr>
+        <p:style>
+          <a:lnRef idx="2">
+            <a:schemeClr val="accent1"/>
+          </a:lnRef>
+          <a:fillRef idx="1">
+            <a:schemeClr val="lt1"/>
+          </a:fillRef>
+          <a:effectRef idx="0">
+            <a:schemeClr val="accent1"/>
+          </a:effectRef>
+          <a:fontRef idx="minor">
+            <a:schemeClr val="dk1"/>
+          </a:fontRef>
+        </p:style>
+        <p:txBody>
+          <a:bodyPr rtlCol="0" anchor="ctr"/>
+          <a:lstStyle/>
+          <a:p>
+            <a:pPr algn="ctr"/>
+            <a:r>
+              <a:rPr lang="en-US" altLang="zh-CN" dirty="0" smtClean="0"/>
+              <a:t>0</a:t>
+            </a:r>
+            <a:endParaRPr lang="zh-CN" altLang="en-US" dirty="0"/>
+          </a:p>
+        </p:txBody>
+      </p:sp>
+      <p:sp>
+        <p:nvSpPr>
+          <p:cNvPr id="94" name="矩形 93"/>
+          <p:cNvSpPr/>
+          <p:nvPr/>
+        </p:nvSpPr>
+        <p:spPr>
+          <a:xfrm>
+            <a:off x="3001356" y="1872494"/>
+            <a:ext cx="360000" cy="360000"/>
+          </a:xfrm>
+          <a:prstGeom prst="rect">
+            <a:avLst/>
+          </a:prstGeom>
+        </p:spPr>
+        <p:style>
+          <a:lnRef idx="2">
+            <a:schemeClr val="accent1"/>
+          </a:lnRef>
+          <a:fillRef idx="1">
+            <a:schemeClr val="lt1"/>
+          </a:fillRef>
+          <a:effectRef idx="0">
+            <a:schemeClr val="accent1"/>
+          </a:effectRef>
+          <a:fontRef idx="minor">
+            <a:schemeClr val="dk1"/>
+          </a:fontRef>
+        </p:style>
+        <p:txBody>
+          <a:bodyPr rtlCol="0" anchor="ctr"/>
+          <a:lstStyle/>
+          <a:p>
+            <a:pPr algn="ctr"/>
+            <a:r>
+              <a:rPr lang="en-US" altLang="zh-CN" dirty="0" smtClean="0"/>
+              <a:t>0</a:t>
+            </a:r>
+            <a:endParaRPr lang="zh-CN" altLang="en-US" dirty="0"/>
+          </a:p>
+        </p:txBody>
+      </p:sp>
+      <p:sp>
+        <p:nvSpPr>
+          <p:cNvPr id="95" name="矩形 94"/>
+          <p:cNvSpPr/>
+          <p:nvPr/>
+        </p:nvSpPr>
+        <p:spPr>
+          <a:xfrm>
+            <a:off x="481356" y="2237814"/>
+            <a:ext cx="360000" cy="360000"/>
+          </a:xfrm>
+          <a:prstGeom prst="rect">
+            <a:avLst/>
+          </a:prstGeom>
+        </p:spPr>
+        <p:style>
+          <a:lnRef idx="2">
+            <a:schemeClr val="accent1"/>
+          </a:lnRef>
+          <a:fillRef idx="1">
+            <a:schemeClr val="lt1"/>
+          </a:fillRef>
+          <a:effectRef idx="0">
+            <a:schemeClr val="accent1"/>
+          </a:effectRef>
+          <a:fontRef idx="minor">
+            <a:schemeClr val="dk1"/>
+          </a:fontRef>
+        </p:style>
+        <p:txBody>
+          <a:bodyPr rtlCol="0" anchor="ctr"/>
+          <a:lstStyle/>
+          <a:p>
+            <a:pPr algn="ctr"/>
+            <a:r>
+              <a:rPr lang="en-US" altLang="zh-CN" dirty="0" smtClean="0"/>
+              <a:t>0</a:t>
+            </a:r>
+            <a:endParaRPr lang="zh-CN" altLang="en-US" dirty="0"/>
+          </a:p>
+        </p:txBody>
+      </p:sp>
+      <p:sp>
+        <p:nvSpPr>
+          <p:cNvPr id="96" name="矩形 95"/>
+          <p:cNvSpPr/>
+          <p:nvPr/>
+        </p:nvSpPr>
+        <p:spPr>
+          <a:xfrm>
+            <a:off x="841356" y="2237814"/>
+            <a:ext cx="360000" cy="360000"/>
+          </a:xfrm>
+          <a:prstGeom prst="rect">
+            <a:avLst/>
+          </a:prstGeom>
+        </p:spPr>
+        <p:style>
+          <a:lnRef idx="2">
+            <a:schemeClr val="accent1"/>
+          </a:lnRef>
+          <a:fillRef idx="1">
+            <a:schemeClr val="lt1"/>
+          </a:fillRef>
+          <a:effectRef idx="0">
+            <a:schemeClr val="accent1"/>
+          </a:effectRef>
+          <a:fontRef idx="minor">
+            <a:schemeClr val="dk1"/>
+          </a:fontRef>
+        </p:style>
+        <p:txBody>
+          <a:bodyPr rtlCol="0" anchor="ctr"/>
+          <a:lstStyle/>
+          <a:p>
+            <a:pPr algn="ctr"/>
+            <a:r>
+              <a:rPr lang="en-US" altLang="zh-CN" dirty="0" smtClean="0"/>
+              <a:t>0</a:t>
+            </a:r>
+            <a:endParaRPr lang="zh-CN" altLang="en-US" dirty="0"/>
+          </a:p>
+        </p:txBody>
+      </p:sp>
+      <p:sp>
+        <p:nvSpPr>
+          <p:cNvPr id="97" name="矩形 96"/>
+          <p:cNvSpPr/>
+          <p:nvPr/>
+        </p:nvSpPr>
+        <p:spPr>
+          <a:xfrm>
+            <a:off x="1201356" y="2237814"/>
+            <a:ext cx="360000" cy="360000"/>
+          </a:xfrm>
+          <a:prstGeom prst="rect">
+            <a:avLst/>
+          </a:prstGeom>
+        </p:spPr>
+        <p:style>
+          <a:lnRef idx="2">
+            <a:schemeClr val="accent1"/>
+          </a:lnRef>
+          <a:fillRef idx="1">
+            <a:schemeClr val="lt1"/>
+          </a:fillRef>
+          <a:effectRef idx="0">
+            <a:schemeClr val="accent1"/>
+          </a:effectRef>
+          <a:fontRef idx="minor">
+            <a:schemeClr val="dk1"/>
+          </a:fontRef>
+        </p:style>
+        <p:txBody>
+          <a:bodyPr rtlCol="0" anchor="ctr"/>
+          <a:lstStyle/>
+          <a:p>
+            <a:pPr algn="ctr"/>
+            <a:r>
+              <a:rPr lang="en-US" altLang="zh-CN" dirty="0" smtClean="0"/>
+              <a:t>0</a:t>
+            </a:r>
+            <a:endParaRPr lang="zh-CN" altLang="en-US" dirty="0"/>
+          </a:p>
+        </p:txBody>
+      </p:sp>
+      <p:sp>
+        <p:nvSpPr>
+          <p:cNvPr id="98" name="矩形 97"/>
+          <p:cNvSpPr/>
+          <p:nvPr/>
+        </p:nvSpPr>
+        <p:spPr>
+          <a:xfrm>
+            <a:off x="1561356" y="2237814"/>
+            <a:ext cx="360000" cy="360000"/>
+          </a:xfrm>
+          <a:prstGeom prst="rect">
+            <a:avLst/>
+          </a:prstGeom>
+        </p:spPr>
+        <p:style>
+          <a:lnRef idx="2">
+            <a:schemeClr val="accent1"/>
+          </a:lnRef>
+          <a:fillRef idx="1">
+            <a:schemeClr val="lt1"/>
+          </a:fillRef>
+          <a:effectRef idx="0">
+            <a:schemeClr val="accent1"/>
+          </a:effectRef>
+          <a:fontRef idx="minor">
+            <a:schemeClr val="dk1"/>
+          </a:fontRef>
+        </p:style>
+        <p:txBody>
+          <a:bodyPr rtlCol="0" anchor="ctr"/>
+          <a:lstStyle/>
+          <a:p>
+            <a:pPr algn="ctr"/>
+            <a:r>
+              <a:rPr lang="en-US" altLang="zh-CN" dirty="0" smtClean="0"/>
+              <a:t>0</a:t>
+            </a:r>
+            <a:endParaRPr lang="zh-CN" altLang="en-US" dirty="0"/>
+          </a:p>
+        </p:txBody>
+      </p:sp>
+      <p:sp>
+        <p:nvSpPr>
+          <p:cNvPr id="99" name="矩形 98"/>
+          <p:cNvSpPr/>
+          <p:nvPr/>
+        </p:nvSpPr>
+        <p:spPr>
+          <a:xfrm>
+            <a:off x="1921356" y="2237814"/>
+            <a:ext cx="360000" cy="360000"/>
+          </a:xfrm>
+          <a:prstGeom prst="rect">
+            <a:avLst/>
+          </a:prstGeom>
+        </p:spPr>
+        <p:style>
+          <a:lnRef idx="2">
+            <a:schemeClr val="accent1"/>
+          </a:lnRef>
+          <a:fillRef idx="1">
+            <a:schemeClr val="lt1"/>
+          </a:fillRef>
+          <a:effectRef idx="0">
+            <a:schemeClr val="accent1"/>
+          </a:effectRef>
+          <a:fontRef idx="minor">
+            <a:schemeClr val="dk1"/>
+          </a:fontRef>
+        </p:style>
+        <p:txBody>
+          <a:bodyPr rtlCol="0" anchor="ctr"/>
+          <a:lstStyle/>
+          <a:p>
+            <a:pPr algn="ctr"/>
+            <a:r>
+              <a:rPr lang="en-US" altLang="zh-CN" dirty="0" smtClean="0"/>
+              <a:t>0</a:t>
+            </a:r>
+            <a:endParaRPr lang="zh-CN" altLang="en-US" dirty="0"/>
+          </a:p>
+        </p:txBody>
+      </p:sp>
+      <p:sp>
+        <p:nvSpPr>
+          <p:cNvPr id="100" name="矩形 99"/>
+          <p:cNvSpPr/>
+          <p:nvPr/>
+        </p:nvSpPr>
+        <p:spPr>
+          <a:xfrm>
+            <a:off x="2281356" y="2237814"/>
+            <a:ext cx="360000" cy="360000"/>
+          </a:xfrm>
+          <a:prstGeom prst="rect">
+            <a:avLst/>
+          </a:prstGeom>
+        </p:spPr>
+        <p:style>
+          <a:lnRef idx="2">
+            <a:schemeClr val="accent1"/>
+          </a:lnRef>
+          <a:fillRef idx="1">
+            <a:schemeClr val="lt1"/>
+          </a:fillRef>
+          <a:effectRef idx="0">
+            <a:schemeClr val="accent1"/>
+          </a:effectRef>
+          <a:fontRef idx="minor">
+            <a:schemeClr val="dk1"/>
+          </a:fontRef>
+        </p:style>
+        <p:txBody>
+          <a:bodyPr rtlCol="0" anchor="ctr"/>
+          <a:lstStyle/>
+          <a:p>
+            <a:pPr algn="ctr"/>
+            <a:r>
+              <a:rPr lang="en-US" altLang="zh-CN" dirty="0" smtClean="0"/>
+              <a:t>0</a:t>
+            </a:r>
+            <a:endParaRPr lang="zh-CN" altLang="en-US" dirty="0"/>
+          </a:p>
+        </p:txBody>
+      </p:sp>
+      <p:sp>
+        <p:nvSpPr>
+          <p:cNvPr id="101" name="矩形 100"/>
+          <p:cNvSpPr/>
+          <p:nvPr/>
+        </p:nvSpPr>
+        <p:spPr>
+          <a:xfrm>
+            <a:off x="2641356" y="2236407"/>
+            <a:ext cx="360000" cy="360000"/>
+          </a:xfrm>
+          <a:prstGeom prst="rect">
+            <a:avLst/>
+          </a:prstGeom>
+        </p:spPr>
+        <p:style>
+          <a:lnRef idx="2">
+            <a:schemeClr val="accent1"/>
+          </a:lnRef>
+          <a:fillRef idx="1">
+            <a:schemeClr val="lt1"/>
+          </a:fillRef>
+          <a:effectRef idx="0">
+            <a:schemeClr val="accent1"/>
+          </a:effectRef>
+          <a:fontRef idx="minor">
+            <a:schemeClr val="dk1"/>
+          </a:fontRef>
+        </p:style>
+        <p:txBody>
+          <a:bodyPr rtlCol="0" anchor="ctr"/>
+          <a:lstStyle/>
+          <a:p>
+            <a:pPr algn="ctr"/>
+            <a:r>
+              <a:rPr lang="en-US" altLang="zh-CN" dirty="0" smtClean="0"/>
+              <a:t>0</a:t>
+            </a:r>
+            <a:endParaRPr lang="zh-CN" altLang="en-US" dirty="0"/>
+          </a:p>
+        </p:txBody>
+      </p:sp>
+      <p:sp>
+        <p:nvSpPr>
+          <p:cNvPr id="102" name="矩形 101"/>
+          <p:cNvSpPr/>
+          <p:nvPr/>
+        </p:nvSpPr>
+        <p:spPr>
+          <a:xfrm>
+            <a:off x="3001356" y="2236407"/>
+            <a:ext cx="360000" cy="360000"/>
+          </a:xfrm>
+          <a:prstGeom prst="rect">
+            <a:avLst/>
+          </a:prstGeom>
+        </p:spPr>
+        <p:style>
+          <a:lnRef idx="2">
+            <a:schemeClr val="accent1"/>
+          </a:lnRef>
+          <a:fillRef idx="1">
+            <a:schemeClr val="lt1"/>
+          </a:fillRef>
+          <a:effectRef idx="0">
+            <a:schemeClr val="accent1"/>
+          </a:effectRef>
+          <a:fontRef idx="minor">
+            <a:schemeClr val="dk1"/>
+          </a:fontRef>
+        </p:style>
+        <p:txBody>
+          <a:bodyPr rtlCol="0" anchor="ctr"/>
+          <a:lstStyle/>
+          <a:p>
+            <a:pPr algn="ctr"/>
+            <a:r>
+              <a:rPr lang="en-US" altLang="zh-CN" dirty="0" smtClean="0"/>
+              <a:t>0</a:t>
+            </a:r>
+            <a:endParaRPr lang="zh-CN" altLang="en-US" dirty="0"/>
+          </a:p>
+        </p:txBody>
+      </p:sp>
+      <p:sp>
+        <p:nvSpPr>
+          <p:cNvPr id="103" name="矩形 102"/>
+          <p:cNvSpPr/>
+          <p:nvPr/>
+        </p:nvSpPr>
+        <p:spPr>
+          <a:xfrm>
+            <a:off x="481356" y="2595000"/>
+            <a:ext cx="360000" cy="360000"/>
+          </a:xfrm>
+          <a:prstGeom prst="rect">
+            <a:avLst/>
+          </a:prstGeom>
+        </p:spPr>
+        <p:style>
+          <a:lnRef idx="2">
+            <a:schemeClr val="accent1"/>
+          </a:lnRef>
+          <a:fillRef idx="1">
+            <a:schemeClr val="lt1"/>
+          </a:fillRef>
+          <a:effectRef idx="0">
+            <a:schemeClr val="accent1"/>
+          </a:effectRef>
+          <a:fontRef idx="minor">
+            <a:schemeClr val="dk1"/>
+          </a:fontRef>
+        </p:style>
+        <p:txBody>
+          <a:bodyPr rtlCol="0" anchor="ctr"/>
+          <a:lstStyle/>
+          <a:p>
+            <a:pPr algn="ctr"/>
+            <a:r>
+              <a:rPr lang="en-US" altLang="zh-CN" dirty="0" smtClean="0"/>
+              <a:t>0</a:t>
+            </a:r>
+            <a:endParaRPr lang="zh-CN" altLang="en-US" dirty="0"/>
+          </a:p>
+        </p:txBody>
+      </p:sp>
+      <p:sp>
+        <p:nvSpPr>
+          <p:cNvPr id="104" name="矩形 103"/>
+          <p:cNvSpPr/>
+          <p:nvPr/>
+        </p:nvSpPr>
+        <p:spPr>
+          <a:xfrm>
+            <a:off x="841356" y="2595000"/>
+            <a:ext cx="360000" cy="360000"/>
+          </a:xfrm>
+          <a:prstGeom prst="rect">
+            <a:avLst/>
+          </a:prstGeom>
+        </p:spPr>
+        <p:style>
+          <a:lnRef idx="2">
+            <a:schemeClr val="accent1"/>
+          </a:lnRef>
+          <a:fillRef idx="1">
+            <a:schemeClr val="lt1"/>
+          </a:fillRef>
+          <a:effectRef idx="0">
+            <a:schemeClr val="accent1"/>
+          </a:effectRef>
+          <a:fontRef idx="minor">
+            <a:schemeClr val="dk1"/>
+          </a:fontRef>
+        </p:style>
+        <p:txBody>
+          <a:bodyPr rtlCol="0" anchor="ctr"/>
+          <a:lstStyle/>
+          <a:p>
+            <a:pPr algn="ctr"/>
+            <a:r>
+              <a:rPr lang="en-US" altLang="zh-CN" dirty="0" smtClean="0"/>
+              <a:t>0</a:t>
+            </a:r>
+            <a:endParaRPr lang="zh-CN" altLang="en-US" dirty="0"/>
+          </a:p>
+        </p:txBody>
+      </p:sp>
+      <p:sp>
+        <p:nvSpPr>
+          <p:cNvPr id="105" name="矩形 104"/>
+          <p:cNvSpPr/>
+          <p:nvPr/>
+        </p:nvSpPr>
+        <p:spPr>
+          <a:xfrm>
+            <a:off x="1201356" y="2595000"/>
+            <a:ext cx="360000" cy="360000"/>
+          </a:xfrm>
+          <a:prstGeom prst="rect">
+            <a:avLst/>
+          </a:prstGeom>
+        </p:spPr>
+        <p:style>
+          <a:lnRef idx="2">
+            <a:schemeClr val="accent1"/>
+          </a:lnRef>
+          <a:fillRef idx="1">
+            <a:schemeClr val="lt1"/>
+          </a:fillRef>
+          <a:effectRef idx="0">
+            <a:schemeClr val="accent1"/>
+          </a:effectRef>
+          <a:fontRef idx="minor">
+            <a:schemeClr val="dk1"/>
+          </a:fontRef>
+        </p:style>
+        <p:txBody>
+          <a:bodyPr rtlCol="0" anchor="ctr"/>
+          <a:lstStyle/>
+          <a:p>
+            <a:pPr algn="ctr"/>
+            <a:r>
+              <a:rPr lang="en-US" altLang="zh-CN" dirty="0" smtClean="0"/>
+              <a:t>0</a:t>
+            </a:r>
+            <a:endParaRPr lang="zh-CN" altLang="en-US" dirty="0"/>
+          </a:p>
+        </p:txBody>
+      </p:sp>
+      <p:sp>
+        <p:nvSpPr>
+          <p:cNvPr id="106" name="矩形 105"/>
+          <p:cNvSpPr/>
+          <p:nvPr/>
+        </p:nvSpPr>
+        <p:spPr>
+          <a:xfrm>
+            <a:off x="1561356" y="2595000"/>
+            <a:ext cx="360000" cy="360000"/>
+          </a:xfrm>
+          <a:prstGeom prst="rect">
+            <a:avLst/>
+          </a:prstGeom>
+        </p:spPr>
+        <p:style>
+          <a:lnRef idx="2">
+            <a:schemeClr val="accent1"/>
+          </a:lnRef>
+          <a:fillRef idx="1">
+            <a:schemeClr val="lt1"/>
+          </a:fillRef>
+          <a:effectRef idx="0">
+            <a:schemeClr val="accent1"/>
+          </a:effectRef>
+          <a:fontRef idx="minor">
+            <a:schemeClr val="dk1"/>
+          </a:fontRef>
+        </p:style>
+        <p:txBody>
+          <a:bodyPr rtlCol="0" anchor="ctr"/>
+          <a:lstStyle/>
+          <a:p>
+            <a:pPr algn="ctr"/>
+            <a:r>
+              <a:rPr lang="en-US" altLang="zh-CN" dirty="0" smtClean="0"/>
+              <a:t>0</a:t>
+            </a:r>
+            <a:endParaRPr lang="zh-CN" altLang="en-US" dirty="0"/>
+          </a:p>
+        </p:txBody>
+      </p:sp>
+      <p:sp>
+        <p:nvSpPr>
+          <p:cNvPr id="107" name="矩形 106"/>
+          <p:cNvSpPr/>
+          <p:nvPr/>
+        </p:nvSpPr>
+        <p:spPr>
+          <a:xfrm>
+            <a:off x="1921356" y="2595000"/>
+            <a:ext cx="360000" cy="360000"/>
+          </a:xfrm>
+          <a:prstGeom prst="rect">
+            <a:avLst/>
+          </a:prstGeom>
+        </p:spPr>
+        <p:style>
+          <a:lnRef idx="2">
+            <a:schemeClr val="accent1"/>
+          </a:lnRef>
+          <a:fillRef idx="1">
+            <a:schemeClr val="lt1"/>
+          </a:fillRef>
+          <a:effectRef idx="0">
+            <a:schemeClr val="accent1"/>
+          </a:effectRef>
+          <a:fontRef idx="minor">
+            <a:schemeClr val="dk1"/>
+          </a:fontRef>
+        </p:style>
+        <p:txBody>
+          <a:bodyPr rtlCol="0" anchor="ctr"/>
+          <a:lstStyle/>
+          <a:p>
+            <a:pPr algn="ctr"/>
+            <a:r>
+              <a:rPr lang="en-US" altLang="zh-CN" dirty="0" smtClean="0"/>
+              <a:t>0</a:t>
+            </a:r>
+            <a:endParaRPr lang="zh-CN" altLang="en-US" dirty="0"/>
+          </a:p>
+        </p:txBody>
+      </p:sp>
+      <p:sp>
+        <p:nvSpPr>
+          <p:cNvPr id="108" name="矩形 107"/>
+          <p:cNvSpPr/>
+          <p:nvPr/>
+        </p:nvSpPr>
+        <p:spPr>
+          <a:xfrm>
+            <a:off x="2281356" y="2595000"/>
+            <a:ext cx="360000" cy="360000"/>
+          </a:xfrm>
+          <a:prstGeom prst="rect">
+            <a:avLst/>
+          </a:prstGeom>
+        </p:spPr>
+        <p:style>
+          <a:lnRef idx="2">
+            <a:schemeClr val="accent1"/>
+          </a:lnRef>
+          <a:fillRef idx="1">
+            <a:schemeClr val="lt1"/>
+          </a:fillRef>
+          <a:effectRef idx="0">
+            <a:schemeClr val="accent1"/>
+          </a:effectRef>
+          <a:fontRef idx="minor">
+            <a:schemeClr val="dk1"/>
+          </a:fontRef>
+        </p:style>
+        <p:txBody>
+          <a:bodyPr rtlCol="0" anchor="ctr"/>
+          <a:lstStyle/>
+          <a:p>
+            <a:pPr algn="ctr"/>
+            <a:r>
+              <a:rPr lang="en-US" altLang="zh-CN" dirty="0" smtClean="0"/>
+              <a:t>0</a:t>
+            </a:r>
+            <a:endParaRPr lang="zh-CN" altLang="en-US" dirty="0"/>
+          </a:p>
+        </p:txBody>
+      </p:sp>
+      <p:sp>
+        <p:nvSpPr>
+          <p:cNvPr id="109" name="矩形 108"/>
+          <p:cNvSpPr/>
+          <p:nvPr/>
+        </p:nvSpPr>
+        <p:spPr>
+          <a:xfrm>
+            <a:off x="2641356" y="2593593"/>
+            <a:ext cx="360000" cy="360000"/>
+          </a:xfrm>
+          <a:prstGeom prst="rect">
+            <a:avLst/>
+          </a:prstGeom>
+        </p:spPr>
+        <p:style>
+          <a:lnRef idx="2">
+            <a:schemeClr val="accent1"/>
+          </a:lnRef>
+          <a:fillRef idx="1">
+            <a:schemeClr val="lt1"/>
+          </a:fillRef>
+          <a:effectRef idx="0">
+            <a:schemeClr val="accent1"/>
+          </a:effectRef>
+          <a:fontRef idx="minor">
+            <a:schemeClr val="dk1"/>
+          </a:fontRef>
+        </p:style>
+        <p:txBody>
+          <a:bodyPr rtlCol="0" anchor="ctr"/>
+          <a:lstStyle/>
+          <a:p>
+            <a:pPr algn="ctr"/>
+            <a:r>
+              <a:rPr lang="en-US" altLang="zh-CN" dirty="0" smtClean="0"/>
+              <a:t>0</a:t>
+            </a:r>
+            <a:endParaRPr lang="zh-CN" altLang="en-US" dirty="0"/>
+          </a:p>
+        </p:txBody>
+      </p:sp>
+      <p:sp>
+        <p:nvSpPr>
+          <p:cNvPr id="110" name="矩形 109"/>
+          <p:cNvSpPr/>
+          <p:nvPr/>
+        </p:nvSpPr>
+        <p:spPr>
+          <a:xfrm>
+            <a:off x="3001356" y="2593593"/>
+            <a:ext cx="360000" cy="360000"/>
+          </a:xfrm>
+          <a:prstGeom prst="rect">
+            <a:avLst/>
+          </a:prstGeom>
+        </p:spPr>
+        <p:style>
+          <a:lnRef idx="2">
+            <a:schemeClr val="accent1"/>
+          </a:lnRef>
+          <a:fillRef idx="1">
+            <a:schemeClr val="lt1"/>
+          </a:fillRef>
+          <a:effectRef idx="0">
+            <a:schemeClr val="accent1"/>
+          </a:effectRef>
+          <a:fontRef idx="minor">
+            <a:schemeClr val="dk1"/>
+          </a:fontRef>
+        </p:style>
+        <p:txBody>
+          <a:bodyPr rtlCol="0" anchor="ctr"/>
+          <a:lstStyle/>
+          <a:p>
+            <a:pPr algn="ctr"/>
+            <a:r>
+              <a:rPr lang="en-US" altLang="zh-CN" dirty="0" smtClean="0"/>
+              <a:t>0</a:t>
+            </a:r>
+            <a:endParaRPr lang="zh-CN" altLang="en-US" dirty="0"/>
+          </a:p>
+        </p:txBody>
+      </p:sp>
+    </p:spTree>
+    <p:extLst>
+      <p:ext uri="{BB962C8B-B14F-4D97-AF65-F5344CB8AC3E}">
+        <p14:creationId xmlns:p14="http://schemas.microsoft.com/office/powerpoint/2010/main" val="2960270139"/>
+      </p:ext>
+    </p:extLst>
+  </p:cSld>
+  <p:clrMapOvr>
+    <a:masterClrMapping/>
+  </p:clrMapOvr>
 </p:sld>
 </file>
 

</xml_diff>

<commit_message>
[#10 Regular Expression Matching] Add a new PPT for Dynamic Programming.
</commit_message>
<xml_diff>
--- a/Resources/010_RegularExpressionMatching.pptx
+++ b/Resources/010_RegularExpressionMatching.pptx
@@ -66,7 +66,6 @@
     <p:sldId id="350" r:id="rId60"/>
     <p:sldId id="351" r:id="rId61"/>
     <p:sldId id="354" r:id="rId62"/>
-    <p:sldId id="371" r:id="rId63"/>
   </p:sldIdLst>
   <p:sldSz cx="12192000" cy="6858000"/>
   <p:notesSz cx="6858000" cy="9144000"/>
@@ -47622,2973 +47621,6 @@
       </p:par>
     </p:tnLst>
   </p:timing>
-</p:sld>
-</file>
-
-<file path=ppt/slides/slide62.xml><?xml version="1.0" encoding="utf-8"?>
-<p:sld xmlns:a="http://schemas.openxmlformats.org/drawingml/2006/main" xmlns:r="http://schemas.openxmlformats.org/officeDocument/2006/relationships" xmlns:p="http://schemas.openxmlformats.org/presentationml/2006/main">
-  <p:cSld>
-    <p:spTree>
-      <p:nvGrpSpPr>
-        <p:cNvPr id="1" name=""/>
-        <p:cNvGrpSpPr/>
-        <p:nvPr/>
-      </p:nvGrpSpPr>
-      <p:grpSpPr>
-        <a:xfrm>
-          <a:off x="0" y="0"/>
-          <a:ext cx="0" cy="0"/>
-          <a:chOff x="0" y="0"/>
-          <a:chExt cx="0" cy="0"/>
-        </a:xfrm>
-      </p:grpSpPr>
-      <p:sp>
-        <p:nvSpPr>
-          <p:cNvPr id="4" name="矩形 3"/>
-          <p:cNvSpPr/>
-          <p:nvPr/>
-        </p:nvSpPr>
-        <p:spPr>
-          <a:xfrm>
-            <a:off x="481356" y="437159"/>
-            <a:ext cx="360000" cy="360000"/>
-          </a:xfrm>
-          <a:prstGeom prst="rect">
-            <a:avLst/>
-          </a:prstGeom>
-        </p:spPr>
-        <p:style>
-          <a:lnRef idx="2">
-            <a:schemeClr val="accent1"/>
-          </a:lnRef>
-          <a:fillRef idx="1">
-            <a:schemeClr val="lt1"/>
-          </a:fillRef>
-          <a:effectRef idx="0">
-            <a:schemeClr val="accent1"/>
-          </a:effectRef>
-          <a:fontRef idx="minor">
-            <a:schemeClr val="dk1"/>
-          </a:fontRef>
-        </p:style>
-        <p:txBody>
-          <a:bodyPr rtlCol="0" anchor="ctr"/>
-          <a:lstStyle/>
-          <a:p>
-            <a:pPr algn="ctr"/>
-            <a:r>
-              <a:rPr lang="en-US" altLang="zh-CN" dirty="0" smtClean="0"/>
-              <a:t>1</a:t>
-            </a:r>
-            <a:endParaRPr lang="zh-CN" altLang="en-US" dirty="0"/>
-          </a:p>
-        </p:txBody>
-      </p:sp>
-      <p:sp>
-        <p:nvSpPr>
-          <p:cNvPr id="5" name="矩形 4"/>
-          <p:cNvSpPr/>
-          <p:nvPr/>
-        </p:nvSpPr>
-        <p:spPr>
-          <a:xfrm>
-            <a:off x="841356" y="437159"/>
-            <a:ext cx="360000" cy="360000"/>
-          </a:xfrm>
-          <a:prstGeom prst="rect">
-            <a:avLst/>
-          </a:prstGeom>
-        </p:spPr>
-        <p:style>
-          <a:lnRef idx="2">
-            <a:schemeClr val="accent1"/>
-          </a:lnRef>
-          <a:fillRef idx="1">
-            <a:schemeClr val="lt1"/>
-          </a:fillRef>
-          <a:effectRef idx="0">
-            <a:schemeClr val="accent1"/>
-          </a:effectRef>
-          <a:fontRef idx="minor">
-            <a:schemeClr val="dk1"/>
-          </a:fontRef>
-        </p:style>
-        <p:txBody>
-          <a:bodyPr rtlCol="0" anchor="ctr"/>
-          <a:lstStyle/>
-          <a:p>
-            <a:pPr algn="ctr"/>
-            <a:r>
-              <a:rPr lang="en-US" altLang="zh-CN" dirty="0" smtClean="0"/>
-              <a:t>0</a:t>
-            </a:r>
-            <a:endParaRPr lang="zh-CN" altLang="en-US" dirty="0"/>
-          </a:p>
-        </p:txBody>
-      </p:sp>
-      <p:sp>
-        <p:nvSpPr>
-          <p:cNvPr id="6" name="矩形 5"/>
-          <p:cNvSpPr/>
-          <p:nvPr/>
-        </p:nvSpPr>
-        <p:spPr>
-          <a:xfrm>
-            <a:off x="1201356" y="437159"/>
-            <a:ext cx="360000" cy="360000"/>
-          </a:xfrm>
-          <a:prstGeom prst="rect">
-            <a:avLst/>
-          </a:prstGeom>
-        </p:spPr>
-        <p:style>
-          <a:lnRef idx="2">
-            <a:schemeClr val="accent1"/>
-          </a:lnRef>
-          <a:fillRef idx="1">
-            <a:schemeClr val="lt1"/>
-          </a:fillRef>
-          <a:effectRef idx="0">
-            <a:schemeClr val="accent1"/>
-          </a:effectRef>
-          <a:fontRef idx="minor">
-            <a:schemeClr val="dk1"/>
-          </a:fontRef>
-        </p:style>
-        <p:txBody>
-          <a:bodyPr rtlCol="0" anchor="ctr"/>
-          <a:lstStyle/>
-          <a:p>
-            <a:pPr algn="ctr"/>
-            <a:r>
-              <a:rPr lang="en-US" altLang="zh-CN" dirty="0" smtClean="0"/>
-              <a:t>0</a:t>
-            </a:r>
-            <a:endParaRPr lang="zh-CN" altLang="en-US" dirty="0"/>
-          </a:p>
-        </p:txBody>
-      </p:sp>
-      <p:sp>
-        <p:nvSpPr>
-          <p:cNvPr id="7" name="矩形 6"/>
-          <p:cNvSpPr/>
-          <p:nvPr/>
-        </p:nvSpPr>
-        <p:spPr>
-          <a:xfrm>
-            <a:off x="1561356" y="437159"/>
-            <a:ext cx="360000" cy="360000"/>
-          </a:xfrm>
-          <a:prstGeom prst="rect">
-            <a:avLst/>
-          </a:prstGeom>
-        </p:spPr>
-        <p:style>
-          <a:lnRef idx="2">
-            <a:schemeClr val="accent1"/>
-          </a:lnRef>
-          <a:fillRef idx="1">
-            <a:schemeClr val="lt1"/>
-          </a:fillRef>
-          <a:effectRef idx="0">
-            <a:schemeClr val="accent1"/>
-          </a:effectRef>
-          <a:fontRef idx="minor">
-            <a:schemeClr val="dk1"/>
-          </a:fontRef>
-        </p:style>
-        <p:txBody>
-          <a:bodyPr rtlCol="0" anchor="ctr"/>
-          <a:lstStyle/>
-          <a:p>
-            <a:pPr algn="ctr"/>
-            <a:r>
-              <a:rPr lang="en-US" altLang="zh-CN" dirty="0" smtClean="0"/>
-              <a:t>0</a:t>
-            </a:r>
-            <a:endParaRPr lang="zh-CN" altLang="en-US" dirty="0"/>
-          </a:p>
-        </p:txBody>
-      </p:sp>
-      <p:sp>
-        <p:nvSpPr>
-          <p:cNvPr id="8" name="矩形 7"/>
-          <p:cNvSpPr/>
-          <p:nvPr/>
-        </p:nvSpPr>
-        <p:spPr>
-          <a:xfrm>
-            <a:off x="1921356" y="437159"/>
-            <a:ext cx="360000" cy="360000"/>
-          </a:xfrm>
-          <a:prstGeom prst="rect">
-            <a:avLst/>
-          </a:prstGeom>
-        </p:spPr>
-        <p:style>
-          <a:lnRef idx="2">
-            <a:schemeClr val="accent1"/>
-          </a:lnRef>
-          <a:fillRef idx="1">
-            <a:schemeClr val="lt1"/>
-          </a:fillRef>
-          <a:effectRef idx="0">
-            <a:schemeClr val="accent1"/>
-          </a:effectRef>
-          <a:fontRef idx="minor">
-            <a:schemeClr val="dk1"/>
-          </a:fontRef>
-        </p:style>
-        <p:txBody>
-          <a:bodyPr rtlCol="0" anchor="ctr"/>
-          <a:lstStyle/>
-          <a:p>
-            <a:pPr algn="ctr"/>
-            <a:r>
-              <a:rPr lang="en-US" altLang="zh-CN" dirty="0" smtClean="0"/>
-              <a:t>0</a:t>
-            </a:r>
-            <a:endParaRPr lang="zh-CN" altLang="en-US" dirty="0"/>
-          </a:p>
-        </p:txBody>
-      </p:sp>
-      <p:sp>
-        <p:nvSpPr>
-          <p:cNvPr id="9" name="矩形 8"/>
-          <p:cNvSpPr/>
-          <p:nvPr/>
-        </p:nvSpPr>
-        <p:spPr>
-          <a:xfrm>
-            <a:off x="2281356" y="437159"/>
-            <a:ext cx="360000" cy="360000"/>
-          </a:xfrm>
-          <a:prstGeom prst="rect">
-            <a:avLst/>
-          </a:prstGeom>
-        </p:spPr>
-        <p:style>
-          <a:lnRef idx="2">
-            <a:schemeClr val="accent1"/>
-          </a:lnRef>
-          <a:fillRef idx="1">
-            <a:schemeClr val="lt1"/>
-          </a:fillRef>
-          <a:effectRef idx="0">
-            <a:schemeClr val="accent1"/>
-          </a:effectRef>
-          <a:fontRef idx="minor">
-            <a:schemeClr val="dk1"/>
-          </a:fontRef>
-        </p:style>
-        <p:txBody>
-          <a:bodyPr rtlCol="0" anchor="ctr"/>
-          <a:lstStyle/>
-          <a:p>
-            <a:pPr algn="ctr"/>
-            <a:r>
-              <a:rPr lang="en-US" altLang="zh-CN" dirty="0" smtClean="0"/>
-              <a:t>0</a:t>
-            </a:r>
-            <a:endParaRPr lang="zh-CN" altLang="en-US" dirty="0"/>
-          </a:p>
-        </p:txBody>
-      </p:sp>
-      <p:sp>
-        <p:nvSpPr>
-          <p:cNvPr id="11" name="矩形 10"/>
-          <p:cNvSpPr/>
-          <p:nvPr/>
-        </p:nvSpPr>
-        <p:spPr>
-          <a:xfrm>
-            <a:off x="841356" y="76221"/>
-            <a:ext cx="360000" cy="360000"/>
-          </a:xfrm>
-          <a:prstGeom prst="rect">
-            <a:avLst/>
-          </a:prstGeom>
-          <a:ln>
-            <a:noFill/>
-          </a:ln>
-        </p:spPr>
-        <p:style>
-          <a:lnRef idx="2">
-            <a:schemeClr val="accent1"/>
-          </a:lnRef>
-          <a:fillRef idx="1">
-            <a:schemeClr val="lt1"/>
-          </a:fillRef>
-          <a:effectRef idx="0">
-            <a:schemeClr val="accent1"/>
-          </a:effectRef>
-          <a:fontRef idx="minor">
-            <a:schemeClr val="dk1"/>
-          </a:fontRef>
-        </p:style>
-        <p:txBody>
-          <a:bodyPr rtlCol="0" anchor="ctr"/>
-          <a:lstStyle/>
-          <a:p>
-            <a:pPr algn="ctr"/>
-            <a:r>
-              <a:rPr lang="en-US" altLang="zh-CN" dirty="0"/>
-              <a:t>a</a:t>
-            </a:r>
-            <a:endParaRPr lang="zh-CN" altLang="en-US" dirty="0"/>
-          </a:p>
-        </p:txBody>
-      </p:sp>
-      <p:sp>
-        <p:nvSpPr>
-          <p:cNvPr id="12" name="矩形 11"/>
-          <p:cNvSpPr/>
-          <p:nvPr/>
-        </p:nvSpPr>
-        <p:spPr>
-          <a:xfrm>
-            <a:off x="1201356" y="76221"/>
-            <a:ext cx="360000" cy="360000"/>
-          </a:xfrm>
-          <a:prstGeom prst="rect">
-            <a:avLst/>
-          </a:prstGeom>
-          <a:ln>
-            <a:noFill/>
-          </a:ln>
-        </p:spPr>
-        <p:style>
-          <a:lnRef idx="2">
-            <a:schemeClr val="accent1"/>
-          </a:lnRef>
-          <a:fillRef idx="1">
-            <a:schemeClr val="lt1"/>
-          </a:fillRef>
-          <a:effectRef idx="0">
-            <a:schemeClr val="accent1"/>
-          </a:effectRef>
-          <a:fontRef idx="minor">
-            <a:schemeClr val="dk1"/>
-          </a:fontRef>
-        </p:style>
-        <p:txBody>
-          <a:bodyPr rtlCol="0" anchor="ctr"/>
-          <a:lstStyle/>
-          <a:p>
-            <a:pPr algn="ctr"/>
-            <a:r>
-              <a:rPr lang="en-US" altLang="zh-CN" dirty="0"/>
-              <a:t>b</a:t>
-            </a:r>
-            <a:endParaRPr lang="zh-CN" altLang="en-US" dirty="0"/>
-          </a:p>
-        </p:txBody>
-      </p:sp>
-      <p:sp>
-        <p:nvSpPr>
-          <p:cNvPr id="13" name="矩形 12"/>
-          <p:cNvSpPr/>
-          <p:nvPr/>
-        </p:nvSpPr>
-        <p:spPr>
-          <a:xfrm>
-            <a:off x="1561356" y="76221"/>
-            <a:ext cx="360000" cy="360000"/>
-          </a:xfrm>
-          <a:prstGeom prst="rect">
-            <a:avLst/>
-          </a:prstGeom>
-          <a:ln>
-            <a:noFill/>
-          </a:ln>
-        </p:spPr>
-        <p:style>
-          <a:lnRef idx="2">
-            <a:schemeClr val="accent1"/>
-          </a:lnRef>
-          <a:fillRef idx="1">
-            <a:schemeClr val="lt1"/>
-          </a:fillRef>
-          <a:effectRef idx="0">
-            <a:schemeClr val="accent1"/>
-          </a:effectRef>
-          <a:fontRef idx="minor">
-            <a:schemeClr val="dk1"/>
-          </a:fontRef>
-        </p:style>
-        <p:txBody>
-          <a:bodyPr rtlCol="0" anchor="ctr"/>
-          <a:lstStyle/>
-          <a:p>
-            <a:pPr algn="ctr"/>
-            <a:r>
-              <a:rPr lang="en-US" altLang="zh-CN" dirty="0" smtClean="0"/>
-              <a:t>c</a:t>
-            </a:r>
-            <a:endParaRPr lang="zh-CN" altLang="en-US" dirty="0"/>
-          </a:p>
-        </p:txBody>
-      </p:sp>
-      <p:sp>
-        <p:nvSpPr>
-          <p:cNvPr id="14" name="矩形 13"/>
-          <p:cNvSpPr/>
-          <p:nvPr/>
-        </p:nvSpPr>
-        <p:spPr>
-          <a:xfrm>
-            <a:off x="1921356" y="76221"/>
-            <a:ext cx="360000" cy="360000"/>
-          </a:xfrm>
-          <a:prstGeom prst="rect">
-            <a:avLst/>
-          </a:prstGeom>
-          <a:ln>
-            <a:noFill/>
-          </a:ln>
-        </p:spPr>
-        <p:style>
-          <a:lnRef idx="2">
-            <a:schemeClr val="accent1"/>
-          </a:lnRef>
-          <a:fillRef idx="1">
-            <a:schemeClr val="lt1"/>
-          </a:fillRef>
-          <a:effectRef idx="0">
-            <a:schemeClr val="accent1"/>
-          </a:effectRef>
-          <a:fontRef idx="minor">
-            <a:schemeClr val="dk1"/>
-          </a:fontRef>
-        </p:style>
-        <p:txBody>
-          <a:bodyPr rtlCol="0" anchor="ctr"/>
-          <a:lstStyle/>
-          <a:p>
-            <a:pPr algn="ctr"/>
-            <a:r>
-              <a:rPr lang="en-US" altLang="zh-CN" dirty="0"/>
-              <a:t>d</a:t>
-            </a:r>
-            <a:endParaRPr lang="zh-CN" altLang="en-US" dirty="0"/>
-          </a:p>
-        </p:txBody>
-      </p:sp>
-      <p:sp>
-        <p:nvSpPr>
-          <p:cNvPr id="15" name="矩形 14"/>
-          <p:cNvSpPr/>
-          <p:nvPr/>
-        </p:nvSpPr>
-        <p:spPr>
-          <a:xfrm>
-            <a:off x="2281356" y="76221"/>
-            <a:ext cx="360000" cy="360000"/>
-          </a:xfrm>
-          <a:prstGeom prst="rect">
-            <a:avLst/>
-          </a:prstGeom>
-          <a:ln>
-            <a:noFill/>
-          </a:ln>
-        </p:spPr>
-        <p:style>
-          <a:lnRef idx="2">
-            <a:schemeClr val="accent1"/>
-          </a:lnRef>
-          <a:fillRef idx="1">
-            <a:schemeClr val="lt1"/>
-          </a:fillRef>
-          <a:effectRef idx="0">
-            <a:schemeClr val="accent1"/>
-          </a:effectRef>
-          <a:fontRef idx="minor">
-            <a:schemeClr val="dk1"/>
-          </a:fontRef>
-        </p:style>
-        <p:txBody>
-          <a:bodyPr rtlCol="0" anchor="ctr"/>
-          <a:lstStyle/>
-          <a:p>
-            <a:pPr algn="ctr"/>
-            <a:r>
-              <a:rPr lang="en-US" altLang="zh-CN" dirty="0"/>
-              <a:t>d</a:t>
-            </a:r>
-            <a:endParaRPr lang="zh-CN" altLang="en-US" dirty="0"/>
-          </a:p>
-        </p:txBody>
-      </p:sp>
-      <p:sp>
-        <p:nvSpPr>
-          <p:cNvPr id="16" name="矩形 15"/>
-          <p:cNvSpPr/>
-          <p:nvPr/>
-        </p:nvSpPr>
-        <p:spPr>
-          <a:xfrm>
-            <a:off x="2641356" y="76221"/>
-            <a:ext cx="360000" cy="360000"/>
-          </a:xfrm>
-          <a:prstGeom prst="rect">
-            <a:avLst/>
-          </a:prstGeom>
-          <a:ln>
-            <a:noFill/>
-          </a:ln>
-        </p:spPr>
-        <p:style>
-          <a:lnRef idx="2">
-            <a:schemeClr val="accent1"/>
-          </a:lnRef>
-          <a:fillRef idx="1">
-            <a:schemeClr val="lt1"/>
-          </a:fillRef>
-          <a:effectRef idx="0">
-            <a:schemeClr val="accent1"/>
-          </a:effectRef>
-          <a:fontRef idx="minor">
-            <a:schemeClr val="dk1"/>
-          </a:fontRef>
-        </p:style>
-        <p:txBody>
-          <a:bodyPr rtlCol="0" anchor="ctr"/>
-          <a:lstStyle/>
-          <a:p>
-            <a:pPr algn="ctr"/>
-            <a:r>
-              <a:rPr lang="en-US" altLang="zh-CN" dirty="0" smtClean="0"/>
-              <a:t>d</a:t>
-            </a:r>
-            <a:endParaRPr lang="zh-CN" altLang="en-US" dirty="0"/>
-          </a:p>
-        </p:txBody>
-      </p:sp>
-      <p:sp>
-        <p:nvSpPr>
-          <p:cNvPr id="17" name="矩形 16"/>
-          <p:cNvSpPr/>
-          <p:nvPr/>
-        </p:nvSpPr>
-        <p:spPr>
-          <a:xfrm>
-            <a:off x="3001356" y="75752"/>
-            <a:ext cx="360000" cy="360000"/>
-          </a:xfrm>
-          <a:prstGeom prst="rect">
-            <a:avLst/>
-          </a:prstGeom>
-          <a:ln>
-            <a:noFill/>
-          </a:ln>
-        </p:spPr>
-        <p:style>
-          <a:lnRef idx="2">
-            <a:schemeClr val="accent1"/>
-          </a:lnRef>
-          <a:fillRef idx="1">
-            <a:schemeClr val="lt1"/>
-          </a:fillRef>
-          <a:effectRef idx="0">
-            <a:schemeClr val="accent1"/>
-          </a:effectRef>
-          <a:fontRef idx="minor">
-            <a:schemeClr val="dk1"/>
-          </a:fontRef>
-        </p:style>
-        <p:txBody>
-          <a:bodyPr rtlCol="0" anchor="ctr"/>
-          <a:lstStyle/>
-          <a:p>
-            <a:pPr algn="ctr"/>
-            <a:r>
-              <a:rPr lang="en-US" altLang="zh-CN" dirty="0" smtClean="0"/>
-              <a:t>g</a:t>
-            </a:r>
-            <a:endParaRPr lang="zh-CN" altLang="en-US" dirty="0"/>
-          </a:p>
-        </p:txBody>
-      </p:sp>
-      <p:sp>
-        <p:nvSpPr>
-          <p:cNvPr id="19" name="矩形 18"/>
-          <p:cNvSpPr/>
-          <p:nvPr/>
-        </p:nvSpPr>
-        <p:spPr>
-          <a:xfrm>
-            <a:off x="481356" y="793969"/>
-            <a:ext cx="360000" cy="360000"/>
-          </a:xfrm>
-          <a:prstGeom prst="rect">
-            <a:avLst/>
-          </a:prstGeom>
-        </p:spPr>
-        <p:style>
-          <a:lnRef idx="2">
-            <a:schemeClr val="accent1"/>
-          </a:lnRef>
-          <a:fillRef idx="1">
-            <a:schemeClr val="lt1"/>
-          </a:fillRef>
-          <a:effectRef idx="0">
-            <a:schemeClr val="accent1"/>
-          </a:effectRef>
-          <a:fontRef idx="minor">
-            <a:schemeClr val="dk1"/>
-          </a:fontRef>
-        </p:style>
-        <p:txBody>
-          <a:bodyPr rtlCol="0" anchor="ctr"/>
-          <a:lstStyle/>
-          <a:p>
-            <a:pPr algn="ctr"/>
-            <a:r>
-              <a:rPr lang="en-US" altLang="zh-CN" dirty="0" smtClean="0"/>
-              <a:t>0</a:t>
-            </a:r>
-            <a:endParaRPr lang="zh-CN" altLang="en-US" dirty="0"/>
-          </a:p>
-        </p:txBody>
-      </p:sp>
-      <p:sp>
-        <p:nvSpPr>
-          <p:cNvPr id="20" name="矩形 19"/>
-          <p:cNvSpPr/>
-          <p:nvPr/>
-        </p:nvSpPr>
-        <p:spPr>
-          <a:xfrm>
-            <a:off x="841356" y="793969"/>
-            <a:ext cx="360000" cy="360000"/>
-          </a:xfrm>
-          <a:prstGeom prst="rect">
-            <a:avLst/>
-          </a:prstGeom>
-        </p:spPr>
-        <p:style>
-          <a:lnRef idx="2">
-            <a:schemeClr val="accent1"/>
-          </a:lnRef>
-          <a:fillRef idx="1">
-            <a:schemeClr val="lt1"/>
-          </a:fillRef>
-          <a:effectRef idx="0">
-            <a:schemeClr val="accent1"/>
-          </a:effectRef>
-          <a:fontRef idx="minor">
-            <a:schemeClr val="dk1"/>
-          </a:fontRef>
-        </p:style>
-        <p:txBody>
-          <a:bodyPr rtlCol="0" anchor="ctr"/>
-          <a:lstStyle/>
-          <a:p>
-            <a:pPr algn="ctr"/>
-            <a:r>
-              <a:rPr lang="en-US" altLang="zh-CN" dirty="0" smtClean="0"/>
-              <a:t>0</a:t>
-            </a:r>
-            <a:endParaRPr lang="zh-CN" altLang="en-US" dirty="0"/>
-          </a:p>
-        </p:txBody>
-      </p:sp>
-      <p:sp>
-        <p:nvSpPr>
-          <p:cNvPr id="21" name="矩形 20"/>
-          <p:cNvSpPr/>
-          <p:nvPr/>
-        </p:nvSpPr>
-        <p:spPr>
-          <a:xfrm>
-            <a:off x="1201356" y="793969"/>
-            <a:ext cx="360000" cy="360000"/>
-          </a:xfrm>
-          <a:prstGeom prst="rect">
-            <a:avLst/>
-          </a:prstGeom>
-        </p:spPr>
-        <p:style>
-          <a:lnRef idx="2">
-            <a:schemeClr val="accent1"/>
-          </a:lnRef>
-          <a:fillRef idx="1">
-            <a:schemeClr val="lt1"/>
-          </a:fillRef>
-          <a:effectRef idx="0">
-            <a:schemeClr val="accent1"/>
-          </a:effectRef>
-          <a:fontRef idx="minor">
-            <a:schemeClr val="dk1"/>
-          </a:fontRef>
-        </p:style>
-        <p:txBody>
-          <a:bodyPr rtlCol="0" anchor="ctr"/>
-          <a:lstStyle/>
-          <a:p>
-            <a:pPr algn="ctr"/>
-            <a:r>
-              <a:rPr lang="en-US" altLang="zh-CN" dirty="0" smtClean="0"/>
-              <a:t>0</a:t>
-            </a:r>
-            <a:endParaRPr lang="zh-CN" altLang="en-US" dirty="0"/>
-          </a:p>
-        </p:txBody>
-      </p:sp>
-      <p:sp>
-        <p:nvSpPr>
-          <p:cNvPr id="22" name="矩形 21"/>
-          <p:cNvSpPr/>
-          <p:nvPr/>
-        </p:nvSpPr>
-        <p:spPr>
-          <a:xfrm>
-            <a:off x="1561356" y="793969"/>
-            <a:ext cx="360000" cy="360000"/>
-          </a:xfrm>
-          <a:prstGeom prst="rect">
-            <a:avLst/>
-          </a:prstGeom>
-        </p:spPr>
-        <p:style>
-          <a:lnRef idx="2">
-            <a:schemeClr val="accent1"/>
-          </a:lnRef>
-          <a:fillRef idx="1">
-            <a:schemeClr val="lt1"/>
-          </a:fillRef>
-          <a:effectRef idx="0">
-            <a:schemeClr val="accent1"/>
-          </a:effectRef>
-          <a:fontRef idx="minor">
-            <a:schemeClr val="dk1"/>
-          </a:fontRef>
-        </p:style>
-        <p:txBody>
-          <a:bodyPr rtlCol="0" anchor="ctr"/>
-          <a:lstStyle/>
-          <a:p>
-            <a:pPr algn="ctr"/>
-            <a:r>
-              <a:rPr lang="en-US" altLang="zh-CN" dirty="0" smtClean="0"/>
-              <a:t>0</a:t>
-            </a:r>
-            <a:endParaRPr lang="zh-CN" altLang="en-US" dirty="0"/>
-          </a:p>
-        </p:txBody>
-      </p:sp>
-      <p:sp>
-        <p:nvSpPr>
-          <p:cNvPr id="23" name="矩形 22"/>
-          <p:cNvSpPr/>
-          <p:nvPr/>
-        </p:nvSpPr>
-        <p:spPr>
-          <a:xfrm>
-            <a:off x="1921356" y="793969"/>
-            <a:ext cx="360000" cy="360000"/>
-          </a:xfrm>
-          <a:prstGeom prst="rect">
-            <a:avLst/>
-          </a:prstGeom>
-        </p:spPr>
-        <p:style>
-          <a:lnRef idx="2">
-            <a:schemeClr val="accent1"/>
-          </a:lnRef>
-          <a:fillRef idx="1">
-            <a:schemeClr val="lt1"/>
-          </a:fillRef>
-          <a:effectRef idx="0">
-            <a:schemeClr val="accent1"/>
-          </a:effectRef>
-          <a:fontRef idx="minor">
-            <a:schemeClr val="dk1"/>
-          </a:fontRef>
-        </p:style>
-        <p:txBody>
-          <a:bodyPr rtlCol="0" anchor="ctr"/>
-          <a:lstStyle/>
-          <a:p>
-            <a:pPr algn="ctr"/>
-            <a:r>
-              <a:rPr lang="en-US" altLang="zh-CN" dirty="0" smtClean="0"/>
-              <a:t>0</a:t>
-            </a:r>
-            <a:endParaRPr lang="zh-CN" altLang="en-US" dirty="0"/>
-          </a:p>
-        </p:txBody>
-      </p:sp>
-      <p:sp>
-        <p:nvSpPr>
-          <p:cNvPr id="24" name="矩形 23"/>
-          <p:cNvSpPr/>
-          <p:nvPr/>
-        </p:nvSpPr>
-        <p:spPr>
-          <a:xfrm>
-            <a:off x="2281356" y="793969"/>
-            <a:ext cx="360000" cy="360000"/>
-          </a:xfrm>
-          <a:prstGeom prst="rect">
-            <a:avLst/>
-          </a:prstGeom>
-        </p:spPr>
-        <p:style>
-          <a:lnRef idx="2">
-            <a:schemeClr val="accent1"/>
-          </a:lnRef>
-          <a:fillRef idx="1">
-            <a:schemeClr val="lt1"/>
-          </a:fillRef>
-          <a:effectRef idx="0">
-            <a:schemeClr val="accent1"/>
-          </a:effectRef>
-          <a:fontRef idx="minor">
-            <a:schemeClr val="dk1"/>
-          </a:fontRef>
-        </p:style>
-        <p:txBody>
-          <a:bodyPr rtlCol="0" anchor="ctr"/>
-          <a:lstStyle/>
-          <a:p>
-            <a:pPr algn="ctr"/>
-            <a:r>
-              <a:rPr lang="en-US" altLang="zh-CN" dirty="0" smtClean="0"/>
-              <a:t>0</a:t>
-            </a:r>
-            <a:endParaRPr lang="zh-CN" altLang="en-US" dirty="0"/>
-          </a:p>
-        </p:txBody>
-      </p:sp>
-      <p:sp>
-        <p:nvSpPr>
-          <p:cNvPr id="27" name="矩形 26"/>
-          <p:cNvSpPr/>
-          <p:nvPr/>
-        </p:nvSpPr>
-        <p:spPr>
-          <a:xfrm>
-            <a:off x="2641356" y="435752"/>
-            <a:ext cx="360000" cy="360000"/>
-          </a:xfrm>
-          <a:prstGeom prst="rect">
-            <a:avLst/>
-          </a:prstGeom>
-        </p:spPr>
-        <p:style>
-          <a:lnRef idx="2">
-            <a:schemeClr val="accent1"/>
-          </a:lnRef>
-          <a:fillRef idx="1">
-            <a:schemeClr val="lt1"/>
-          </a:fillRef>
-          <a:effectRef idx="0">
-            <a:schemeClr val="accent1"/>
-          </a:effectRef>
-          <a:fontRef idx="minor">
-            <a:schemeClr val="dk1"/>
-          </a:fontRef>
-        </p:style>
-        <p:txBody>
-          <a:bodyPr rtlCol="0" anchor="ctr"/>
-          <a:lstStyle/>
-          <a:p>
-            <a:pPr algn="ctr"/>
-            <a:r>
-              <a:rPr lang="en-US" altLang="zh-CN" dirty="0" smtClean="0"/>
-              <a:t>0</a:t>
-            </a:r>
-            <a:endParaRPr lang="zh-CN" altLang="en-US" dirty="0"/>
-          </a:p>
-        </p:txBody>
-      </p:sp>
-      <p:sp>
-        <p:nvSpPr>
-          <p:cNvPr id="28" name="矩形 27"/>
-          <p:cNvSpPr/>
-          <p:nvPr/>
-        </p:nvSpPr>
-        <p:spPr>
-          <a:xfrm>
-            <a:off x="3001356" y="435752"/>
-            <a:ext cx="360000" cy="360000"/>
-          </a:xfrm>
-          <a:prstGeom prst="rect">
-            <a:avLst/>
-          </a:prstGeom>
-        </p:spPr>
-        <p:style>
-          <a:lnRef idx="2">
-            <a:schemeClr val="accent1"/>
-          </a:lnRef>
-          <a:fillRef idx="1">
-            <a:schemeClr val="lt1"/>
-          </a:fillRef>
-          <a:effectRef idx="0">
-            <a:schemeClr val="accent1"/>
-          </a:effectRef>
-          <a:fontRef idx="minor">
-            <a:schemeClr val="dk1"/>
-          </a:fontRef>
-        </p:style>
-        <p:txBody>
-          <a:bodyPr rtlCol="0" anchor="ctr"/>
-          <a:lstStyle/>
-          <a:p>
-            <a:pPr algn="ctr"/>
-            <a:r>
-              <a:rPr lang="en-US" altLang="zh-CN" dirty="0" smtClean="0"/>
-              <a:t>0</a:t>
-            </a:r>
-            <a:endParaRPr lang="zh-CN" altLang="en-US" dirty="0"/>
-          </a:p>
-        </p:txBody>
-      </p:sp>
-      <p:sp>
-        <p:nvSpPr>
-          <p:cNvPr id="29" name="矩形 28"/>
-          <p:cNvSpPr/>
-          <p:nvPr/>
-        </p:nvSpPr>
-        <p:spPr>
-          <a:xfrm>
-            <a:off x="2641356" y="792562"/>
-            <a:ext cx="360000" cy="360000"/>
-          </a:xfrm>
-          <a:prstGeom prst="rect">
-            <a:avLst/>
-          </a:prstGeom>
-        </p:spPr>
-        <p:style>
-          <a:lnRef idx="2">
-            <a:schemeClr val="accent1"/>
-          </a:lnRef>
-          <a:fillRef idx="1">
-            <a:schemeClr val="lt1"/>
-          </a:fillRef>
-          <a:effectRef idx="0">
-            <a:schemeClr val="accent1"/>
-          </a:effectRef>
-          <a:fontRef idx="minor">
-            <a:schemeClr val="dk1"/>
-          </a:fontRef>
-        </p:style>
-        <p:txBody>
-          <a:bodyPr rtlCol="0" anchor="ctr"/>
-          <a:lstStyle/>
-          <a:p>
-            <a:pPr algn="ctr"/>
-            <a:r>
-              <a:rPr lang="en-US" altLang="zh-CN" dirty="0" smtClean="0"/>
-              <a:t>0</a:t>
-            </a:r>
-            <a:endParaRPr lang="zh-CN" altLang="en-US" dirty="0"/>
-          </a:p>
-        </p:txBody>
-      </p:sp>
-      <p:sp>
-        <p:nvSpPr>
-          <p:cNvPr id="30" name="矩形 29"/>
-          <p:cNvSpPr/>
-          <p:nvPr/>
-        </p:nvSpPr>
-        <p:spPr>
-          <a:xfrm>
-            <a:off x="3001356" y="792562"/>
-            <a:ext cx="360000" cy="360000"/>
-          </a:xfrm>
-          <a:prstGeom prst="rect">
-            <a:avLst/>
-          </a:prstGeom>
-        </p:spPr>
-        <p:style>
-          <a:lnRef idx="2">
-            <a:schemeClr val="accent1"/>
-          </a:lnRef>
-          <a:fillRef idx="1">
-            <a:schemeClr val="lt1"/>
-          </a:fillRef>
-          <a:effectRef idx="0">
-            <a:schemeClr val="accent1"/>
-          </a:effectRef>
-          <a:fontRef idx="minor">
-            <a:schemeClr val="dk1"/>
-          </a:fontRef>
-        </p:style>
-        <p:txBody>
-          <a:bodyPr rtlCol="0" anchor="ctr"/>
-          <a:lstStyle/>
-          <a:p>
-            <a:pPr algn="ctr"/>
-            <a:r>
-              <a:rPr lang="en-US" altLang="zh-CN" dirty="0" smtClean="0"/>
-              <a:t>0</a:t>
-            </a:r>
-            <a:endParaRPr lang="zh-CN" altLang="en-US" dirty="0"/>
-          </a:p>
-        </p:txBody>
-      </p:sp>
-      <p:sp>
-        <p:nvSpPr>
-          <p:cNvPr id="33" name="矩形 32"/>
-          <p:cNvSpPr/>
-          <p:nvPr/>
-        </p:nvSpPr>
-        <p:spPr>
-          <a:xfrm>
-            <a:off x="481356" y="1151155"/>
-            <a:ext cx="360000" cy="360000"/>
-          </a:xfrm>
-          <a:prstGeom prst="rect">
-            <a:avLst/>
-          </a:prstGeom>
-        </p:spPr>
-        <p:style>
-          <a:lnRef idx="2">
-            <a:schemeClr val="accent1"/>
-          </a:lnRef>
-          <a:fillRef idx="1">
-            <a:schemeClr val="lt1"/>
-          </a:fillRef>
-          <a:effectRef idx="0">
-            <a:schemeClr val="accent1"/>
-          </a:effectRef>
-          <a:fontRef idx="minor">
-            <a:schemeClr val="dk1"/>
-          </a:fontRef>
-        </p:style>
-        <p:txBody>
-          <a:bodyPr rtlCol="0" anchor="ctr"/>
-          <a:lstStyle/>
-          <a:p>
-            <a:pPr algn="ctr"/>
-            <a:r>
-              <a:rPr lang="en-US" altLang="zh-CN" dirty="0" smtClean="0"/>
-              <a:t>0</a:t>
-            </a:r>
-            <a:endParaRPr lang="zh-CN" altLang="en-US" dirty="0"/>
-          </a:p>
-        </p:txBody>
-      </p:sp>
-      <p:sp>
-        <p:nvSpPr>
-          <p:cNvPr id="34" name="矩形 33"/>
-          <p:cNvSpPr/>
-          <p:nvPr/>
-        </p:nvSpPr>
-        <p:spPr>
-          <a:xfrm>
-            <a:off x="841356" y="1151155"/>
-            <a:ext cx="360000" cy="360000"/>
-          </a:xfrm>
-          <a:prstGeom prst="rect">
-            <a:avLst/>
-          </a:prstGeom>
-        </p:spPr>
-        <p:style>
-          <a:lnRef idx="2">
-            <a:schemeClr val="accent1"/>
-          </a:lnRef>
-          <a:fillRef idx="1">
-            <a:schemeClr val="lt1"/>
-          </a:fillRef>
-          <a:effectRef idx="0">
-            <a:schemeClr val="accent1"/>
-          </a:effectRef>
-          <a:fontRef idx="minor">
-            <a:schemeClr val="dk1"/>
-          </a:fontRef>
-        </p:style>
-        <p:txBody>
-          <a:bodyPr rtlCol="0" anchor="ctr"/>
-          <a:lstStyle/>
-          <a:p>
-            <a:pPr algn="ctr"/>
-            <a:r>
-              <a:rPr lang="en-US" altLang="zh-CN" dirty="0" smtClean="0"/>
-              <a:t>0</a:t>
-            </a:r>
-            <a:endParaRPr lang="zh-CN" altLang="en-US" dirty="0"/>
-          </a:p>
-        </p:txBody>
-      </p:sp>
-      <p:sp>
-        <p:nvSpPr>
-          <p:cNvPr id="35" name="矩形 34"/>
-          <p:cNvSpPr/>
-          <p:nvPr/>
-        </p:nvSpPr>
-        <p:spPr>
-          <a:xfrm>
-            <a:off x="1201356" y="1151155"/>
-            <a:ext cx="360000" cy="360000"/>
-          </a:xfrm>
-          <a:prstGeom prst="rect">
-            <a:avLst/>
-          </a:prstGeom>
-        </p:spPr>
-        <p:style>
-          <a:lnRef idx="2">
-            <a:schemeClr val="accent1"/>
-          </a:lnRef>
-          <a:fillRef idx="1">
-            <a:schemeClr val="lt1"/>
-          </a:fillRef>
-          <a:effectRef idx="0">
-            <a:schemeClr val="accent1"/>
-          </a:effectRef>
-          <a:fontRef idx="minor">
-            <a:schemeClr val="dk1"/>
-          </a:fontRef>
-        </p:style>
-        <p:txBody>
-          <a:bodyPr rtlCol="0" anchor="ctr"/>
-          <a:lstStyle/>
-          <a:p>
-            <a:pPr algn="ctr"/>
-            <a:r>
-              <a:rPr lang="en-US" altLang="zh-CN" dirty="0" smtClean="0"/>
-              <a:t>0</a:t>
-            </a:r>
-            <a:endParaRPr lang="zh-CN" altLang="en-US" dirty="0"/>
-          </a:p>
-        </p:txBody>
-      </p:sp>
-      <p:sp>
-        <p:nvSpPr>
-          <p:cNvPr id="36" name="矩形 35"/>
-          <p:cNvSpPr/>
-          <p:nvPr/>
-        </p:nvSpPr>
-        <p:spPr>
-          <a:xfrm>
-            <a:off x="1561356" y="1151155"/>
-            <a:ext cx="360000" cy="360000"/>
-          </a:xfrm>
-          <a:prstGeom prst="rect">
-            <a:avLst/>
-          </a:prstGeom>
-        </p:spPr>
-        <p:style>
-          <a:lnRef idx="2">
-            <a:schemeClr val="accent1"/>
-          </a:lnRef>
-          <a:fillRef idx="1">
-            <a:schemeClr val="lt1"/>
-          </a:fillRef>
-          <a:effectRef idx="0">
-            <a:schemeClr val="accent1"/>
-          </a:effectRef>
-          <a:fontRef idx="minor">
-            <a:schemeClr val="dk1"/>
-          </a:fontRef>
-        </p:style>
-        <p:txBody>
-          <a:bodyPr rtlCol="0" anchor="ctr"/>
-          <a:lstStyle/>
-          <a:p>
-            <a:pPr algn="ctr"/>
-            <a:r>
-              <a:rPr lang="en-US" altLang="zh-CN" dirty="0" smtClean="0"/>
-              <a:t>0</a:t>
-            </a:r>
-            <a:endParaRPr lang="zh-CN" altLang="en-US" dirty="0"/>
-          </a:p>
-        </p:txBody>
-      </p:sp>
-      <p:sp>
-        <p:nvSpPr>
-          <p:cNvPr id="37" name="矩形 36"/>
-          <p:cNvSpPr/>
-          <p:nvPr/>
-        </p:nvSpPr>
-        <p:spPr>
-          <a:xfrm>
-            <a:off x="1921356" y="1151155"/>
-            <a:ext cx="360000" cy="360000"/>
-          </a:xfrm>
-          <a:prstGeom prst="rect">
-            <a:avLst/>
-          </a:prstGeom>
-        </p:spPr>
-        <p:style>
-          <a:lnRef idx="2">
-            <a:schemeClr val="accent1"/>
-          </a:lnRef>
-          <a:fillRef idx="1">
-            <a:schemeClr val="lt1"/>
-          </a:fillRef>
-          <a:effectRef idx="0">
-            <a:schemeClr val="accent1"/>
-          </a:effectRef>
-          <a:fontRef idx="minor">
-            <a:schemeClr val="dk1"/>
-          </a:fontRef>
-        </p:style>
-        <p:txBody>
-          <a:bodyPr rtlCol="0" anchor="ctr"/>
-          <a:lstStyle/>
-          <a:p>
-            <a:pPr algn="ctr"/>
-            <a:r>
-              <a:rPr lang="en-US" altLang="zh-CN" dirty="0" smtClean="0"/>
-              <a:t>0</a:t>
-            </a:r>
-            <a:endParaRPr lang="zh-CN" altLang="en-US" dirty="0"/>
-          </a:p>
-        </p:txBody>
-      </p:sp>
-      <p:sp>
-        <p:nvSpPr>
-          <p:cNvPr id="38" name="矩形 37"/>
-          <p:cNvSpPr/>
-          <p:nvPr/>
-        </p:nvSpPr>
-        <p:spPr>
-          <a:xfrm>
-            <a:off x="2281356" y="1151155"/>
-            <a:ext cx="360000" cy="360000"/>
-          </a:xfrm>
-          <a:prstGeom prst="rect">
-            <a:avLst/>
-          </a:prstGeom>
-        </p:spPr>
-        <p:style>
-          <a:lnRef idx="2">
-            <a:schemeClr val="accent1"/>
-          </a:lnRef>
-          <a:fillRef idx="1">
-            <a:schemeClr val="lt1"/>
-          </a:fillRef>
-          <a:effectRef idx="0">
-            <a:schemeClr val="accent1"/>
-          </a:effectRef>
-          <a:fontRef idx="minor">
-            <a:schemeClr val="dk1"/>
-          </a:fontRef>
-        </p:style>
-        <p:txBody>
-          <a:bodyPr rtlCol="0" anchor="ctr"/>
-          <a:lstStyle/>
-          <a:p>
-            <a:pPr algn="ctr"/>
-            <a:r>
-              <a:rPr lang="en-US" altLang="zh-CN" dirty="0" smtClean="0"/>
-              <a:t>0</a:t>
-            </a:r>
-            <a:endParaRPr lang="zh-CN" altLang="en-US" dirty="0"/>
-          </a:p>
-        </p:txBody>
-      </p:sp>
-      <p:sp>
-        <p:nvSpPr>
-          <p:cNvPr id="45" name="矩形 44"/>
-          <p:cNvSpPr/>
-          <p:nvPr/>
-        </p:nvSpPr>
-        <p:spPr>
-          <a:xfrm>
-            <a:off x="2641356" y="1149748"/>
-            <a:ext cx="360000" cy="360000"/>
-          </a:xfrm>
-          <a:prstGeom prst="rect">
-            <a:avLst/>
-          </a:prstGeom>
-        </p:spPr>
-        <p:style>
-          <a:lnRef idx="2">
-            <a:schemeClr val="accent1"/>
-          </a:lnRef>
-          <a:fillRef idx="1">
-            <a:schemeClr val="lt1"/>
-          </a:fillRef>
-          <a:effectRef idx="0">
-            <a:schemeClr val="accent1"/>
-          </a:effectRef>
-          <a:fontRef idx="minor">
-            <a:schemeClr val="dk1"/>
-          </a:fontRef>
-        </p:style>
-        <p:txBody>
-          <a:bodyPr rtlCol="0" anchor="ctr"/>
-          <a:lstStyle/>
-          <a:p>
-            <a:pPr algn="ctr"/>
-            <a:r>
-              <a:rPr lang="en-US" altLang="zh-CN" dirty="0" smtClean="0"/>
-              <a:t>0</a:t>
-            </a:r>
-            <a:endParaRPr lang="zh-CN" altLang="en-US" dirty="0"/>
-          </a:p>
-        </p:txBody>
-      </p:sp>
-      <p:sp>
-        <p:nvSpPr>
-          <p:cNvPr id="46" name="矩形 45"/>
-          <p:cNvSpPr/>
-          <p:nvPr/>
-        </p:nvSpPr>
-        <p:spPr>
-          <a:xfrm>
-            <a:off x="3001356" y="1149748"/>
-            <a:ext cx="360000" cy="360000"/>
-          </a:xfrm>
-          <a:prstGeom prst="rect">
-            <a:avLst/>
-          </a:prstGeom>
-        </p:spPr>
-        <p:style>
-          <a:lnRef idx="2">
-            <a:schemeClr val="accent1"/>
-          </a:lnRef>
-          <a:fillRef idx="1">
-            <a:schemeClr val="lt1"/>
-          </a:fillRef>
-          <a:effectRef idx="0">
-            <a:schemeClr val="accent1"/>
-          </a:effectRef>
-          <a:fontRef idx="minor">
-            <a:schemeClr val="dk1"/>
-          </a:fontRef>
-        </p:style>
-        <p:txBody>
-          <a:bodyPr rtlCol="0" anchor="ctr"/>
-          <a:lstStyle/>
-          <a:p>
-            <a:pPr algn="ctr"/>
-            <a:r>
-              <a:rPr lang="en-US" altLang="zh-CN" dirty="0" smtClean="0"/>
-              <a:t>0</a:t>
-            </a:r>
-            <a:endParaRPr lang="zh-CN" altLang="en-US" dirty="0"/>
-          </a:p>
-        </p:txBody>
-      </p:sp>
-      <p:sp>
-        <p:nvSpPr>
-          <p:cNvPr id="65" name="矩形 64"/>
-          <p:cNvSpPr/>
-          <p:nvPr/>
-        </p:nvSpPr>
-        <p:spPr>
-          <a:xfrm>
-            <a:off x="121356" y="789748"/>
-            <a:ext cx="360000" cy="360000"/>
-          </a:xfrm>
-          <a:prstGeom prst="rect">
-            <a:avLst/>
-          </a:prstGeom>
-          <a:ln>
-            <a:noFill/>
-          </a:ln>
-        </p:spPr>
-        <p:style>
-          <a:lnRef idx="2">
-            <a:schemeClr val="accent1"/>
-          </a:lnRef>
-          <a:fillRef idx="1">
-            <a:schemeClr val="lt1"/>
-          </a:fillRef>
-          <a:effectRef idx="0">
-            <a:schemeClr val="accent1"/>
-          </a:effectRef>
-          <a:fontRef idx="minor">
-            <a:schemeClr val="dk1"/>
-          </a:fontRef>
-        </p:style>
-        <p:txBody>
-          <a:bodyPr rtlCol="0" anchor="ctr"/>
-          <a:lstStyle/>
-          <a:p>
-            <a:pPr algn="ctr"/>
-            <a:r>
-              <a:rPr lang="en-US" altLang="zh-CN" dirty="0"/>
-              <a:t>a</a:t>
-            </a:r>
-            <a:endParaRPr lang="zh-CN" altLang="en-US" dirty="0"/>
-          </a:p>
-        </p:txBody>
-      </p:sp>
-      <p:sp>
-        <p:nvSpPr>
-          <p:cNvPr id="66" name="矩形 65"/>
-          <p:cNvSpPr/>
-          <p:nvPr/>
-        </p:nvSpPr>
-        <p:spPr>
-          <a:xfrm>
-            <a:off x="121356" y="1142337"/>
-            <a:ext cx="360000" cy="360000"/>
-          </a:xfrm>
-          <a:prstGeom prst="rect">
-            <a:avLst/>
-          </a:prstGeom>
-          <a:ln>
-            <a:noFill/>
-          </a:ln>
-        </p:spPr>
-        <p:style>
-          <a:lnRef idx="2">
-            <a:schemeClr val="accent1"/>
-          </a:lnRef>
-          <a:fillRef idx="1">
-            <a:schemeClr val="lt1"/>
-          </a:fillRef>
-          <a:effectRef idx="0">
-            <a:schemeClr val="accent1"/>
-          </a:effectRef>
-          <a:fontRef idx="minor">
-            <a:schemeClr val="dk1"/>
-          </a:fontRef>
-        </p:style>
-        <p:txBody>
-          <a:bodyPr rtlCol="0" anchor="ctr"/>
-          <a:lstStyle/>
-          <a:p>
-            <a:pPr algn="ctr"/>
-            <a:r>
-              <a:rPr lang="en-US" altLang="zh-CN" dirty="0" smtClean="0"/>
-              <a:t>.</a:t>
-            </a:r>
-            <a:endParaRPr lang="zh-CN" altLang="en-US" dirty="0"/>
-          </a:p>
-        </p:txBody>
-      </p:sp>
-      <p:sp>
-        <p:nvSpPr>
-          <p:cNvPr id="67" name="矩形 66"/>
-          <p:cNvSpPr/>
-          <p:nvPr/>
-        </p:nvSpPr>
-        <p:spPr>
-          <a:xfrm>
-            <a:off x="121356" y="1516783"/>
-            <a:ext cx="360000" cy="360000"/>
-          </a:xfrm>
-          <a:prstGeom prst="rect">
-            <a:avLst/>
-          </a:prstGeom>
-          <a:ln>
-            <a:noFill/>
-          </a:ln>
-        </p:spPr>
-        <p:style>
-          <a:lnRef idx="2">
-            <a:schemeClr val="accent1"/>
-          </a:lnRef>
-          <a:fillRef idx="1">
-            <a:schemeClr val="lt1"/>
-          </a:fillRef>
-          <a:effectRef idx="0">
-            <a:schemeClr val="accent1"/>
-          </a:effectRef>
-          <a:fontRef idx="minor">
-            <a:schemeClr val="dk1"/>
-          </a:fontRef>
-        </p:style>
-        <p:txBody>
-          <a:bodyPr rtlCol="0" anchor="ctr"/>
-          <a:lstStyle/>
-          <a:p>
-            <a:pPr algn="ctr"/>
-            <a:r>
-              <a:rPr lang="en-US" altLang="zh-CN" dirty="0" smtClean="0"/>
-              <a:t>*</a:t>
-            </a:r>
-            <a:endParaRPr lang="zh-CN" altLang="en-US" dirty="0"/>
-          </a:p>
-        </p:txBody>
-      </p:sp>
-      <p:sp>
-        <p:nvSpPr>
-          <p:cNvPr id="68" name="矩形 67"/>
-          <p:cNvSpPr/>
-          <p:nvPr/>
-        </p:nvSpPr>
-        <p:spPr>
-          <a:xfrm>
-            <a:off x="121356" y="1869372"/>
-            <a:ext cx="360000" cy="360000"/>
-          </a:xfrm>
-          <a:prstGeom prst="rect">
-            <a:avLst/>
-          </a:prstGeom>
-          <a:ln>
-            <a:noFill/>
-          </a:ln>
-        </p:spPr>
-        <p:style>
-          <a:lnRef idx="2">
-            <a:schemeClr val="accent1"/>
-          </a:lnRef>
-          <a:fillRef idx="1">
-            <a:schemeClr val="lt1"/>
-          </a:fillRef>
-          <a:effectRef idx="0">
-            <a:schemeClr val="accent1"/>
-          </a:effectRef>
-          <a:fontRef idx="minor">
-            <a:schemeClr val="dk1"/>
-          </a:fontRef>
-        </p:style>
-        <p:txBody>
-          <a:bodyPr rtlCol="0" anchor="ctr"/>
-          <a:lstStyle/>
-          <a:p>
-            <a:pPr algn="ctr"/>
-            <a:r>
-              <a:rPr lang="en-US" altLang="zh-CN" dirty="0" smtClean="0"/>
-              <a:t>d</a:t>
-            </a:r>
-            <a:endParaRPr lang="zh-CN" altLang="en-US" dirty="0"/>
-          </a:p>
-        </p:txBody>
-      </p:sp>
-      <p:sp>
-        <p:nvSpPr>
-          <p:cNvPr id="69" name="矩形 68"/>
-          <p:cNvSpPr/>
-          <p:nvPr/>
-        </p:nvSpPr>
-        <p:spPr>
-          <a:xfrm>
-            <a:off x="121356" y="2233593"/>
-            <a:ext cx="360000" cy="360000"/>
-          </a:xfrm>
-          <a:prstGeom prst="rect">
-            <a:avLst/>
-          </a:prstGeom>
-          <a:ln>
-            <a:noFill/>
-          </a:ln>
-        </p:spPr>
-        <p:style>
-          <a:lnRef idx="2">
-            <a:schemeClr val="accent1"/>
-          </a:lnRef>
-          <a:fillRef idx="1">
-            <a:schemeClr val="lt1"/>
-          </a:fillRef>
-          <a:effectRef idx="0">
-            <a:schemeClr val="accent1"/>
-          </a:effectRef>
-          <a:fontRef idx="minor">
-            <a:schemeClr val="dk1"/>
-          </a:fontRef>
-        </p:style>
-        <p:txBody>
-          <a:bodyPr rtlCol="0" anchor="ctr"/>
-          <a:lstStyle/>
-          <a:p>
-            <a:pPr algn="ctr"/>
-            <a:r>
-              <a:rPr lang="en-US" altLang="zh-CN" dirty="0" smtClean="0"/>
-              <a:t>*</a:t>
-            </a:r>
-            <a:endParaRPr lang="zh-CN" altLang="en-US" dirty="0"/>
-          </a:p>
-        </p:txBody>
-      </p:sp>
-      <p:sp>
-        <p:nvSpPr>
-          <p:cNvPr id="70" name="矩形 69"/>
-          <p:cNvSpPr/>
-          <p:nvPr/>
-        </p:nvSpPr>
-        <p:spPr>
-          <a:xfrm>
-            <a:off x="121356" y="2586182"/>
-            <a:ext cx="360000" cy="360000"/>
-          </a:xfrm>
-          <a:prstGeom prst="rect">
-            <a:avLst/>
-          </a:prstGeom>
-          <a:ln>
-            <a:noFill/>
-          </a:ln>
-        </p:spPr>
-        <p:style>
-          <a:lnRef idx="2">
-            <a:schemeClr val="accent1"/>
-          </a:lnRef>
-          <a:fillRef idx="1">
-            <a:schemeClr val="lt1"/>
-          </a:fillRef>
-          <a:effectRef idx="0">
-            <a:schemeClr val="accent1"/>
-          </a:effectRef>
-          <a:fontRef idx="minor">
-            <a:schemeClr val="dk1"/>
-          </a:fontRef>
-        </p:style>
-        <p:txBody>
-          <a:bodyPr rtlCol="0" anchor="ctr"/>
-          <a:lstStyle/>
-          <a:p>
-            <a:pPr algn="ctr"/>
-            <a:r>
-              <a:rPr lang="en-US" altLang="zh-CN" dirty="0"/>
-              <a:t>g</a:t>
-            </a:r>
-            <a:endParaRPr lang="zh-CN" altLang="en-US" dirty="0"/>
-          </a:p>
-        </p:txBody>
-      </p:sp>
-      <p:sp>
-        <p:nvSpPr>
-          <p:cNvPr id="79" name="矩形 78"/>
-          <p:cNvSpPr/>
-          <p:nvPr/>
-        </p:nvSpPr>
-        <p:spPr>
-          <a:xfrm>
-            <a:off x="481356" y="1516715"/>
-            <a:ext cx="360000" cy="360000"/>
-          </a:xfrm>
-          <a:prstGeom prst="rect">
-            <a:avLst/>
-          </a:prstGeom>
-        </p:spPr>
-        <p:style>
-          <a:lnRef idx="2">
-            <a:schemeClr val="accent1"/>
-          </a:lnRef>
-          <a:fillRef idx="1">
-            <a:schemeClr val="lt1"/>
-          </a:fillRef>
-          <a:effectRef idx="0">
-            <a:schemeClr val="accent1"/>
-          </a:effectRef>
-          <a:fontRef idx="minor">
-            <a:schemeClr val="dk1"/>
-          </a:fontRef>
-        </p:style>
-        <p:txBody>
-          <a:bodyPr rtlCol="0" anchor="ctr"/>
-          <a:lstStyle/>
-          <a:p>
-            <a:pPr algn="ctr"/>
-            <a:r>
-              <a:rPr lang="en-US" altLang="zh-CN" dirty="0" smtClean="0"/>
-              <a:t>0</a:t>
-            </a:r>
-            <a:endParaRPr lang="zh-CN" altLang="en-US" dirty="0"/>
-          </a:p>
-        </p:txBody>
-      </p:sp>
-      <p:sp>
-        <p:nvSpPr>
-          <p:cNvPr id="80" name="矩形 79"/>
-          <p:cNvSpPr/>
-          <p:nvPr/>
-        </p:nvSpPr>
-        <p:spPr>
-          <a:xfrm>
-            <a:off x="841356" y="1516715"/>
-            <a:ext cx="360000" cy="360000"/>
-          </a:xfrm>
-          <a:prstGeom prst="rect">
-            <a:avLst/>
-          </a:prstGeom>
-        </p:spPr>
-        <p:style>
-          <a:lnRef idx="2">
-            <a:schemeClr val="accent1"/>
-          </a:lnRef>
-          <a:fillRef idx="1">
-            <a:schemeClr val="lt1"/>
-          </a:fillRef>
-          <a:effectRef idx="0">
-            <a:schemeClr val="accent1"/>
-          </a:effectRef>
-          <a:fontRef idx="minor">
-            <a:schemeClr val="dk1"/>
-          </a:fontRef>
-        </p:style>
-        <p:txBody>
-          <a:bodyPr rtlCol="0" anchor="ctr"/>
-          <a:lstStyle/>
-          <a:p>
-            <a:pPr algn="ctr"/>
-            <a:r>
-              <a:rPr lang="en-US" altLang="zh-CN" dirty="0" smtClean="0"/>
-              <a:t>0</a:t>
-            </a:r>
-            <a:endParaRPr lang="zh-CN" altLang="en-US" dirty="0"/>
-          </a:p>
-        </p:txBody>
-      </p:sp>
-      <p:sp>
-        <p:nvSpPr>
-          <p:cNvPr id="81" name="矩形 80"/>
-          <p:cNvSpPr/>
-          <p:nvPr/>
-        </p:nvSpPr>
-        <p:spPr>
-          <a:xfrm>
-            <a:off x="1201356" y="1516715"/>
-            <a:ext cx="360000" cy="360000"/>
-          </a:xfrm>
-          <a:prstGeom prst="rect">
-            <a:avLst/>
-          </a:prstGeom>
-        </p:spPr>
-        <p:style>
-          <a:lnRef idx="2">
-            <a:schemeClr val="accent1"/>
-          </a:lnRef>
-          <a:fillRef idx="1">
-            <a:schemeClr val="lt1"/>
-          </a:fillRef>
-          <a:effectRef idx="0">
-            <a:schemeClr val="accent1"/>
-          </a:effectRef>
-          <a:fontRef idx="minor">
-            <a:schemeClr val="dk1"/>
-          </a:fontRef>
-        </p:style>
-        <p:txBody>
-          <a:bodyPr rtlCol="0" anchor="ctr"/>
-          <a:lstStyle/>
-          <a:p>
-            <a:pPr algn="ctr"/>
-            <a:r>
-              <a:rPr lang="en-US" altLang="zh-CN" dirty="0" smtClean="0"/>
-              <a:t>0</a:t>
-            </a:r>
-            <a:endParaRPr lang="zh-CN" altLang="en-US" dirty="0"/>
-          </a:p>
-        </p:txBody>
-      </p:sp>
-      <p:sp>
-        <p:nvSpPr>
-          <p:cNvPr id="82" name="矩形 81"/>
-          <p:cNvSpPr/>
-          <p:nvPr/>
-        </p:nvSpPr>
-        <p:spPr>
-          <a:xfrm>
-            <a:off x="1561356" y="1516715"/>
-            <a:ext cx="360000" cy="360000"/>
-          </a:xfrm>
-          <a:prstGeom prst="rect">
-            <a:avLst/>
-          </a:prstGeom>
-        </p:spPr>
-        <p:style>
-          <a:lnRef idx="2">
-            <a:schemeClr val="accent1"/>
-          </a:lnRef>
-          <a:fillRef idx="1">
-            <a:schemeClr val="lt1"/>
-          </a:fillRef>
-          <a:effectRef idx="0">
-            <a:schemeClr val="accent1"/>
-          </a:effectRef>
-          <a:fontRef idx="minor">
-            <a:schemeClr val="dk1"/>
-          </a:fontRef>
-        </p:style>
-        <p:txBody>
-          <a:bodyPr rtlCol="0" anchor="ctr"/>
-          <a:lstStyle/>
-          <a:p>
-            <a:pPr algn="ctr"/>
-            <a:r>
-              <a:rPr lang="en-US" altLang="zh-CN" dirty="0" smtClean="0"/>
-              <a:t>0</a:t>
-            </a:r>
-            <a:endParaRPr lang="zh-CN" altLang="en-US" dirty="0"/>
-          </a:p>
-        </p:txBody>
-      </p:sp>
-      <p:sp>
-        <p:nvSpPr>
-          <p:cNvPr id="83" name="矩形 82"/>
-          <p:cNvSpPr/>
-          <p:nvPr/>
-        </p:nvSpPr>
-        <p:spPr>
-          <a:xfrm>
-            <a:off x="1921356" y="1516715"/>
-            <a:ext cx="360000" cy="360000"/>
-          </a:xfrm>
-          <a:prstGeom prst="rect">
-            <a:avLst/>
-          </a:prstGeom>
-        </p:spPr>
-        <p:style>
-          <a:lnRef idx="2">
-            <a:schemeClr val="accent1"/>
-          </a:lnRef>
-          <a:fillRef idx="1">
-            <a:schemeClr val="lt1"/>
-          </a:fillRef>
-          <a:effectRef idx="0">
-            <a:schemeClr val="accent1"/>
-          </a:effectRef>
-          <a:fontRef idx="minor">
-            <a:schemeClr val="dk1"/>
-          </a:fontRef>
-        </p:style>
-        <p:txBody>
-          <a:bodyPr rtlCol="0" anchor="ctr"/>
-          <a:lstStyle/>
-          <a:p>
-            <a:pPr algn="ctr"/>
-            <a:r>
-              <a:rPr lang="en-US" altLang="zh-CN" dirty="0" smtClean="0"/>
-              <a:t>0</a:t>
-            </a:r>
-            <a:endParaRPr lang="zh-CN" altLang="en-US" dirty="0"/>
-          </a:p>
-        </p:txBody>
-      </p:sp>
-      <p:sp>
-        <p:nvSpPr>
-          <p:cNvPr id="84" name="矩形 83"/>
-          <p:cNvSpPr/>
-          <p:nvPr/>
-        </p:nvSpPr>
-        <p:spPr>
-          <a:xfrm>
-            <a:off x="2281356" y="1516715"/>
-            <a:ext cx="360000" cy="360000"/>
-          </a:xfrm>
-          <a:prstGeom prst="rect">
-            <a:avLst/>
-          </a:prstGeom>
-        </p:spPr>
-        <p:style>
-          <a:lnRef idx="2">
-            <a:schemeClr val="accent1"/>
-          </a:lnRef>
-          <a:fillRef idx="1">
-            <a:schemeClr val="lt1"/>
-          </a:fillRef>
-          <a:effectRef idx="0">
-            <a:schemeClr val="accent1"/>
-          </a:effectRef>
-          <a:fontRef idx="minor">
-            <a:schemeClr val="dk1"/>
-          </a:fontRef>
-        </p:style>
-        <p:txBody>
-          <a:bodyPr rtlCol="0" anchor="ctr"/>
-          <a:lstStyle/>
-          <a:p>
-            <a:pPr algn="ctr"/>
-            <a:r>
-              <a:rPr lang="en-US" altLang="zh-CN" dirty="0" smtClean="0"/>
-              <a:t>0</a:t>
-            </a:r>
-            <a:endParaRPr lang="zh-CN" altLang="en-US" dirty="0"/>
-          </a:p>
-        </p:txBody>
-      </p:sp>
-      <p:sp>
-        <p:nvSpPr>
-          <p:cNvPr id="85" name="矩形 84"/>
-          <p:cNvSpPr/>
-          <p:nvPr/>
-        </p:nvSpPr>
-        <p:spPr>
-          <a:xfrm>
-            <a:off x="2641356" y="1515308"/>
-            <a:ext cx="360000" cy="360000"/>
-          </a:xfrm>
-          <a:prstGeom prst="rect">
-            <a:avLst/>
-          </a:prstGeom>
-        </p:spPr>
-        <p:style>
-          <a:lnRef idx="2">
-            <a:schemeClr val="accent1"/>
-          </a:lnRef>
-          <a:fillRef idx="1">
-            <a:schemeClr val="lt1"/>
-          </a:fillRef>
-          <a:effectRef idx="0">
-            <a:schemeClr val="accent1"/>
-          </a:effectRef>
-          <a:fontRef idx="minor">
-            <a:schemeClr val="dk1"/>
-          </a:fontRef>
-        </p:style>
-        <p:txBody>
-          <a:bodyPr rtlCol="0" anchor="ctr"/>
-          <a:lstStyle/>
-          <a:p>
-            <a:pPr algn="ctr"/>
-            <a:r>
-              <a:rPr lang="en-US" altLang="zh-CN" dirty="0" smtClean="0"/>
-              <a:t>0</a:t>
-            </a:r>
-            <a:endParaRPr lang="zh-CN" altLang="en-US" dirty="0"/>
-          </a:p>
-        </p:txBody>
-      </p:sp>
-      <p:sp>
-        <p:nvSpPr>
-          <p:cNvPr id="86" name="矩形 85"/>
-          <p:cNvSpPr/>
-          <p:nvPr/>
-        </p:nvSpPr>
-        <p:spPr>
-          <a:xfrm>
-            <a:off x="3001356" y="1515308"/>
-            <a:ext cx="360000" cy="360000"/>
-          </a:xfrm>
-          <a:prstGeom prst="rect">
-            <a:avLst/>
-          </a:prstGeom>
-        </p:spPr>
-        <p:style>
-          <a:lnRef idx="2">
-            <a:schemeClr val="accent1"/>
-          </a:lnRef>
-          <a:fillRef idx="1">
-            <a:schemeClr val="lt1"/>
-          </a:fillRef>
-          <a:effectRef idx="0">
-            <a:schemeClr val="accent1"/>
-          </a:effectRef>
-          <a:fontRef idx="minor">
-            <a:schemeClr val="dk1"/>
-          </a:fontRef>
-        </p:style>
-        <p:txBody>
-          <a:bodyPr rtlCol="0" anchor="ctr"/>
-          <a:lstStyle/>
-          <a:p>
-            <a:pPr algn="ctr"/>
-            <a:r>
-              <a:rPr lang="en-US" altLang="zh-CN" dirty="0" smtClean="0"/>
-              <a:t>0</a:t>
-            </a:r>
-            <a:endParaRPr lang="zh-CN" altLang="en-US" dirty="0"/>
-          </a:p>
-        </p:txBody>
-      </p:sp>
-      <p:sp>
-        <p:nvSpPr>
-          <p:cNvPr id="87" name="矩形 86"/>
-          <p:cNvSpPr/>
-          <p:nvPr/>
-        </p:nvSpPr>
-        <p:spPr>
-          <a:xfrm>
-            <a:off x="481356" y="1873901"/>
-            <a:ext cx="360000" cy="360000"/>
-          </a:xfrm>
-          <a:prstGeom prst="rect">
-            <a:avLst/>
-          </a:prstGeom>
-        </p:spPr>
-        <p:style>
-          <a:lnRef idx="2">
-            <a:schemeClr val="accent1"/>
-          </a:lnRef>
-          <a:fillRef idx="1">
-            <a:schemeClr val="lt1"/>
-          </a:fillRef>
-          <a:effectRef idx="0">
-            <a:schemeClr val="accent1"/>
-          </a:effectRef>
-          <a:fontRef idx="minor">
-            <a:schemeClr val="dk1"/>
-          </a:fontRef>
-        </p:style>
-        <p:txBody>
-          <a:bodyPr rtlCol="0" anchor="ctr"/>
-          <a:lstStyle/>
-          <a:p>
-            <a:pPr algn="ctr"/>
-            <a:r>
-              <a:rPr lang="en-US" altLang="zh-CN" dirty="0" smtClean="0"/>
-              <a:t>0</a:t>
-            </a:r>
-            <a:endParaRPr lang="zh-CN" altLang="en-US" dirty="0"/>
-          </a:p>
-        </p:txBody>
-      </p:sp>
-      <p:sp>
-        <p:nvSpPr>
-          <p:cNvPr id="88" name="矩形 87"/>
-          <p:cNvSpPr/>
-          <p:nvPr/>
-        </p:nvSpPr>
-        <p:spPr>
-          <a:xfrm>
-            <a:off x="841356" y="1873901"/>
-            <a:ext cx="360000" cy="360000"/>
-          </a:xfrm>
-          <a:prstGeom prst="rect">
-            <a:avLst/>
-          </a:prstGeom>
-        </p:spPr>
-        <p:style>
-          <a:lnRef idx="2">
-            <a:schemeClr val="accent1"/>
-          </a:lnRef>
-          <a:fillRef idx="1">
-            <a:schemeClr val="lt1"/>
-          </a:fillRef>
-          <a:effectRef idx="0">
-            <a:schemeClr val="accent1"/>
-          </a:effectRef>
-          <a:fontRef idx="minor">
-            <a:schemeClr val="dk1"/>
-          </a:fontRef>
-        </p:style>
-        <p:txBody>
-          <a:bodyPr rtlCol="0" anchor="ctr"/>
-          <a:lstStyle/>
-          <a:p>
-            <a:pPr algn="ctr"/>
-            <a:r>
-              <a:rPr lang="en-US" altLang="zh-CN" dirty="0" smtClean="0"/>
-              <a:t>0</a:t>
-            </a:r>
-            <a:endParaRPr lang="zh-CN" altLang="en-US" dirty="0"/>
-          </a:p>
-        </p:txBody>
-      </p:sp>
-      <p:sp>
-        <p:nvSpPr>
-          <p:cNvPr id="89" name="矩形 88"/>
-          <p:cNvSpPr/>
-          <p:nvPr/>
-        </p:nvSpPr>
-        <p:spPr>
-          <a:xfrm>
-            <a:off x="1201356" y="1873901"/>
-            <a:ext cx="360000" cy="360000"/>
-          </a:xfrm>
-          <a:prstGeom prst="rect">
-            <a:avLst/>
-          </a:prstGeom>
-        </p:spPr>
-        <p:style>
-          <a:lnRef idx="2">
-            <a:schemeClr val="accent1"/>
-          </a:lnRef>
-          <a:fillRef idx="1">
-            <a:schemeClr val="lt1"/>
-          </a:fillRef>
-          <a:effectRef idx="0">
-            <a:schemeClr val="accent1"/>
-          </a:effectRef>
-          <a:fontRef idx="minor">
-            <a:schemeClr val="dk1"/>
-          </a:fontRef>
-        </p:style>
-        <p:txBody>
-          <a:bodyPr rtlCol="0" anchor="ctr"/>
-          <a:lstStyle/>
-          <a:p>
-            <a:pPr algn="ctr"/>
-            <a:r>
-              <a:rPr lang="en-US" altLang="zh-CN" dirty="0" smtClean="0"/>
-              <a:t>0</a:t>
-            </a:r>
-            <a:endParaRPr lang="zh-CN" altLang="en-US" dirty="0"/>
-          </a:p>
-        </p:txBody>
-      </p:sp>
-      <p:sp>
-        <p:nvSpPr>
-          <p:cNvPr id="90" name="矩形 89"/>
-          <p:cNvSpPr/>
-          <p:nvPr/>
-        </p:nvSpPr>
-        <p:spPr>
-          <a:xfrm>
-            <a:off x="1561356" y="1873901"/>
-            <a:ext cx="360000" cy="360000"/>
-          </a:xfrm>
-          <a:prstGeom prst="rect">
-            <a:avLst/>
-          </a:prstGeom>
-        </p:spPr>
-        <p:style>
-          <a:lnRef idx="2">
-            <a:schemeClr val="accent1"/>
-          </a:lnRef>
-          <a:fillRef idx="1">
-            <a:schemeClr val="lt1"/>
-          </a:fillRef>
-          <a:effectRef idx="0">
-            <a:schemeClr val="accent1"/>
-          </a:effectRef>
-          <a:fontRef idx="minor">
-            <a:schemeClr val="dk1"/>
-          </a:fontRef>
-        </p:style>
-        <p:txBody>
-          <a:bodyPr rtlCol="0" anchor="ctr"/>
-          <a:lstStyle/>
-          <a:p>
-            <a:pPr algn="ctr"/>
-            <a:r>
-              <a:rPr lang="en-US" altLang="zh-CN" dirty="0" smtClean="0"/>
-              <a:t>0</a:t>
-            </a:r>
-            <a:endParaRPr lang="zh-CN" altLang="en-US" dirty="0"/>
-          </a:p>
-        </p:txBody>
-      </p:sp>
-      <p:sp>
-        <p:nvSpPr>
-          <p:cNvPr id="91" name="矩形 90"/>
-          <p:cNvSpPr/>
-          <p:nvPr/>
-        </p:nvSpPr>
-        <p:spPr>
-          <a:xfrm>
-            <a:off x="1921356" y="1873901"/>
-            <a:ext cx="360000" cy="360000"/>
-          </a:xfrm>
-          <a:prstGeom prst="rect">
-            <a:avLst/>
-          </a:prstGeom>
-        </p:spPr>
-        <p:style>
-          <a:lnRef idx="2">
-            <a:schemeClr val="accent1"/>
-          </a:lnRef>
-          <a:fillRef idx="1">
-            <a:schemeClr val="lt1"/>
-          </a:fillRef>
-          <a:effectRef idx="0">
-            <a:schemeClr val="accent1"/>
-          </a:effectRef>
-          <a:fontRef idx="minor">
-            <a:schemeClr val="dk1"/>
-          </a:fontRef>
-        </p:style>
-        <p:txBody>
-          <a:bodyPr rtlCol="0" anchor="ctr"/>
-          <a:lstStyle/>
-          <a:p>
-            <a:pPr algn="ctr"/>
-            <a:r>
-              <a:rPr lang="en-US" altLang="zh-CN" dirty="0" smtClean="0"/>
-              <a:t>0</a:t>
-            </a:r>
-            <a:endParaRPr lang="zh-CN" altLang="en-US" dirty="0"/>
-          </a:p>
-        </p:txBody>
-      </p:sp>
-      <p:sp>
-        <p:nvSpPr>
-          <p:cNvPr id="92" name="矩形 91"/>
-          <p:cNvSpPr/>
-          <p:nvPr/>
-        </p:nvSpPr>
-        <p:spPr>
-          <a:xfrm>
-            <a:off x="2281356" y="1873901"/>
-            <a:ext cx="360000" cy="360000"/>
-          </a:xfrm>
-          <a:prstGeom prst="rect">
-            <a:avLst/>
-          </a:prstGeom>
-        </p:spPr>
-        <p:style>
-          <a:lnRef idx="2">
-            <a:schemeClr val="accent1"/>
-          </a:lnRef>
-          <a:fillRef idx="1">
-            <a:schemeClr val="lt1"/>
-          </a:fillRef>
-          <a:effectRef idx="0">
-            <a:schemeClr val="accent1"/>
-          </a:effectRef>
-          <a:fontRef idx="minor">
-            <a:schemeClr val="dk1"/>
-          </a:fontRef>
-        </p:style>
-        <p:txBody>
-          <a:bodyPr rtlCol="0" anchor="ctr"/>
-          <a:lstStyle/>
-          <a:p>
-            <a:pPr algn="ctr"/>
-            <a:r>
-              <a:rPr lang="en-US" altLang="zh-CN" dirty="0" smtClean="0"/>
-              <a:t>0</a:t>
-            </a:r>
-            <a:endParaRPr lang="zh-CN" altLang="en-US" dirty="0"/>
-          </a:p>
-        </p:txBody>
-      </p:sp>
-      <p:sp>
-        <p:nvSpPr>
-          <p:cNvPr id="93" name="矩形 92"/>
-          <p:cNvSpPr/>
-          <p:nvPr/>
-        </p:nvSpPr>
-        <p:spPr>
-          <a:xfrm>
-            <a:off x="2641356" y="1872494"/>
-            <a:ext cx="360000" cy="360000"/>
-          </a:xfrm>
-          <a:prstGeom prst="rect">
-            <a:avLst/>
-          </a:prstGeom>
-        </p:spPr>
-        <p:style>
-          <a:lnRef idx="2">
-            <a:schemeClr val="accent1"/>
-          </a:lnRef>
-          <a:fillRef idx="1">
-            <a:schemeClr val="lt1"/>
-          </a:fillRef>
-          <a:effectRef idx="0">
-            <a:schemeClr val="accent1"/>
-          </a:effectRef>
-          <a:fontRef idx="minor">
-            <a:schemeClr val="dk1"/>
-          </a:fontRef>
-        </p:style>
-        <p:txBody>
-          <a:bodyPr rtlCol="0" anchor="ctr"/>
-          <a:lstStyle/>
-          <a:p>
-            <a:pPr algn="ctr"/>
-            <a:r>
-              <a:rPr lang="en-US" altLang="zh-CN" dirty="0" smtClean="0"/>
-              <a:t>0</a:t>
-            </a:r>
-            <a:endParaRPr lang="zh-CN" altLang="en-US" dirty="0"/>
-          </a:p>
-        </p:txBody>
-      </p:sp>
-      <p:sp>
-        <p:nvSpPr>
-          <p:cNvPr id="94" name="矩形 93"/>
-          <p:cNvSpPr/>
-          <p:nvPr/>
-        </p:nvSpPr>
-        <p:spPr>
-          <a:xfrm>
-            <a:off x="3001356" y="1872494"/>
-            <a:ext cx="360000" cy="360000"/>
-          </a:xfrm>
-          <a:prstGeom prst="rect">
-            <a:avLst/>
-          </a:prstGeom>
-        </p:spPr>
-        <p:style>
-          <a:lnRef idx="2">
-            <a:schemeClr val="accent1"/>
-          </a:lnRef>
-          <a:fillRef idx="1">
-            <a:schemeClr val="lt1"/>
-          </a:fillRef>
-          <a:effectRef idx="0">
-            <a:schemeClr val="accent1"/>
-          </a:effectRef>
-          <a:fontRef idx="minor">
-            <a:schemeClr val="dk1"/>
-          </a:fontRef>
-        </p:style>
-        <p:txBody>
-          <a:bodyPr rtlCol="0" anchor="ctr"/>
-          <a:lstStyle/>
-          <a:p>
-            <a:pPr algn="ctr"/>
-            <a:r>
-              <a:rPr lang="en-US" altLang="zh-CN" dirty="0" smtClean="0"/>
-              <a:t>0</a:t>
-            </a:r>
-            <a:endParaRPr lang="zh-CN" altLang="en-US" dirty="0"/>
-          </a:p>
-        </p:txBody>
-      </p:sp>
-      <p:sp>
-        <p:nvSpPr>
-          <p:cNvPr id="95" name="矩形 94"/>
-          <p:cNvSpPr/>
-          <p:nvPr/>
-        </p:nvSpPr>
-        <p:spPr>
-          <a:xfrm>
-            <a:off x="481356" y="2237814"/>
-            <a:ext cx="360000" cy="360000"/>
-          </a:xfrm>
-          <a:prstGeom prst="rect">
-            <a:avLst/>
-          </a:prstGeom>
-        </p:spPr>
-        <p:style>
-          <a:lnRef idx="2">
-            <a:schemeClr val="accent1"/>
-          </a:lnRef>
-          <a:fillRef idx="1">
-            <a:schemeClr val="lt1"/>
-          </a:fillRef>
-          <a:effectRef idx="0">
-            <a:schemeClr val="accent1"/>
-          </a:effectRef>
-          <a:fontRef idx="minor">
-            <a:schemeClr val="dk1"/>
-          </a:fontRef>
-        </p:style>
-        <p:txBody>
-          <a:bodyPr rtlCol="0" anchor="ctr"/>
-          <a:lstStyle/>
-          <a:p>
-            <a:pPr algn="ctr"/>
-            <a:r>
-              <a:rPr lang="en-US" altLang="zh-CN" dirty="0" smtClean="0"/>
-              <a:t>0</a:t>
-            </a:r>
-            <a:endParaRPr lang="zh-CN" altLang="en-US" dirty="0"/>
-          </a:p>
-        </p:txBody>
-      </p:sp>
-      <p:sp>
-        <p:nvSpPr>
-          <p:cNvPr id="96" name="矩形 95"/>
-          <p:cNvSpPr/>
-          <p:nvPr/>
-        </p:nvSpPr>
-        <p:spPr>
-          <a:xfrm>
-            <a:off x="841356" y="2237814"/>
-            <a:ext cx="360000" cy="360000"/>
-          </a:xfrm>
-          <a:prstGeom prst="rect">
-            <a:avLst/>
-          </a:prstGeom>
-        </p:spPr>
-        <p:style>
-          <a:lnRef idx="2">
-            <a:schemeClr val="accent1"/>
-          </a:lnRef>
-          <a:fillRef idx="1">
-            <a:schemeClr val="lt1"/>
-          </a:fillRef>
-          <a:effectRef idx="0">
-            <a:schemeClr val="accent1"/>
-          </a:effectRef>
-          <a:fontRef idx="minor">
-            <a:schemeClr val="dk1"/>
-          </a:fontRef>
-        </p:style>
-        <p:txBody>
-          <a:bodyPr rtlCol="0" anchor="ctr"/>
-          <a:lstStyle/>
-          <a:p>
-            <a:pPr algn="ctr"/>
-            <a:r>
-              <a:rPr lang="en-US" altLang="zh-CN" dirty="0" smtClean="0"/>
-              <a:t>0</a:t>
-            </a:r>
-            <a:endParaRPr lang="zh-CN" altLang="en-US" dirty="0"/>
-          </a:p>
-        </p:txBody>
-      </p:sp>
-      <p:sp>
-        <p:nvSpPr>
-          <p:cNvPr id="97" name="矩形 96"/>
-          <p:cNvSpPr/>
-          <p:nvPr/>
-        </p:nvSpPr>
-        <p:spPr>
-          <a:xfrm>
-            <a:off x="1201356" y="2237814"/>
-            <a:ext cx="360000" cy="360000"/>
-          </a:xfrm>
-          <a:prstGeom prst="rect">
-            <a:avLst/>
-          </a:prstGeom>
-        </p:spPr>
-        <p:style>
-          <a:lnRef idx="2">
-            <a:schemeClr val="accent1"/>
-          </a:lnRef>
-          <a:fillRef idx="1">
-            <a:schemeClr val="lt1"/>
-          </a:fillRef>
-          <a:effectRef idx="0">
-            <a:schemeClr val="accent1"/>
-          </a:effectRef>
-          <a:fontRef idx="minor">
-            <a:schemeClr val="dk1"/>
-          </a:fontRef>
-        </p:style>
-        <p:txBody>
-          <a:bodyPr rtlCol="0" anchor="ctr"/>
-          <a:lstStyle/>
-          <a:p>
-            <a:pPr algn="ctr"/>
-            <a:r>
-              <a:rPr lang="en-US" altLang="zh-CN" dirty="0" smtClean="0"/>
-              <a:t>0</a:t>
-            </a:r>
-            <a:endParaRPr lang="zh-CN" altLang="en-US" dirty="0"/>
-          </a:p>
-        </p:txBody>
-      </p:sp>
-      <p:sp>
-        <p:nvSpPr>
-          <p:cNvPr id="98" name="矩形 97"/>
-          <p:cNvSpPr/>
-          <p:nvPr/>
-        </p:nvSpPr>
-        <p:spPr>
-          <a:xfrm>
-            <a:off x="1561356" y="2237814"/>
-            <a:ext cx="360000" cy="360000"/>
-          </a:xfrm>
-          <a:prstGeom prst="rect">
-            <a:avLst/>
-          </a:prstGeom>
-        </p:spPr>
-        <p:style>
-          <a:lnRef idx="2">
-            <a:schemeClr val="accent1"/>
-          </a:lnRef>
-          <a:fillRef idx="1">
-            <a:schemeClr val="lt1"/>
-          </a:fillRef>
-          <a:effectRef idx="0">
-            <a:schemeClr val="accent1"/>
-          </a:effectRef>
-          <a:fontRef idx="minor">
-            <a:schemeClr val="dk1"/>
-          </a:fontRef>
-        </p:style>
-        <p:txBody>
-          <a:bodyPr rtlCol="0" anchor="ctr"/>
-          <a:lstStyle/>
-          <a:p>
-            <a:pPr algn="ctr"/>
-            <a:r>
-              <a:rPr lang="en-US" altLang="zh-CN" dirty="0" smtClean="0"/>
-              <a:t>0</a:t>
-            </a:r>
-            <a:endParaRPr lang="zh-CN" altLang="en-US" dirty="0"/>
-          </a:p>
-        </p:txBody>
-      </p:sp>
-      <p:sp>
-        <p:nvSpPr>
-          <p:cNvPr id="99" name="矩形 98"/>
-          <p:cNvSpPr/>
-          <p:nvPr/>
-        </p:nvSpPr>
-        <p:spPr>
-          <a:xfrm>
-            <a:off x="1921356" y="2237814"/>
-            <a:ext cx="360000" cy="360000"/>
-          </a:xfrm>
-          <a:prstGeom prst="rect">
-            <a:avLst/>
-          </a:prstGeom>
-        </p:spPr>
-        <p:style>
-          <a:lnRef idx="2">
-            <a:schemeClr val="accent1"/>
-          </a:lnRef>
-          <a:fillRef idx="1">
-            <a:schemeClr val="lt1"/>
-          </a:fillRef>
-          <a:effectRef idx="0">
-            <a:schemeClr val="accent1"/>
-          </a:effectRef>
-          <a:fontRef idx="minor">
-            <a:schemeClr val="dk1"/>
-          </a:fontRef>
-        </p:style>
-        <p:txBody>
-          <a:bodyPr rtlCol="0" anchor="ctr"/>
-          <a:lstStyle/>
-          <a:p>
-            <a:pPr algn="ctr"/>
-            <a:r>
-              <a:rPr lang="en-US" altLang="zh-CN" dirty="0" smtClean="0"/>
-              <a:t>0</a:t>
-            </a:r>
-            <a:endParaRPr lang="zh-CN" altLang="en-US" dirty="0"/>
-          </a:p>
-        </p:txBody>
-      </p:sp>
-      <p:sp>
-        <p:nvSpPr>
-          <p:cNvPr id="100" name="矩形 99"/>
-          <p:cNvSpPr/>
-          <p:nvPr/>
-        </p:nvSpPr>
-        <p:spPr>
-          <a:xfrm>
-            <a:off x="2281356" y="2237814"/>
-            <a:ext cx="360000" cy="360000"/>
-          </a:xfrm>
-          <a:prstGeom prst="rect">
-            <a:avLst/>
-          </a:prstGeom>
-        </p:spPr>
-        <p:style>
-          <a:lnRef idx="2">
-            <a:schemeClr val="accent1"/>
-          </a:lnRef>
-          <a:fillRef idx="1">
-            <a:schemeClr val="lt1"/>
-          </a:fillRef>
-          <a:effectRef idx="0">
-            <a:schemeClr val="accent1"/>
-          </a:effectRef>
-          <a:fontRef idx="minor">
-            <a:schemeClr val="dk1"/>
-          </a:fontRef>
-        </p:style>
-        <p:txBody>
-          <a:bodyPr rtlCol="0" anchor="ctr"/>
-          <a:lstStyle/>
-          <a:p>
-            <a:pPr algn="ctr"/>
-            <a:r>
-              <a:rPr lang="en-US" altLang="zh-CN" dirty="0" smtClean="0"/>
-              <a:t>0</a:t>
-            </a:r>
-            <a:endParaRPr lang="zh-CN" altLang="en-US" dirty="0"/>
-          </a:p>
-        </p:txBody>
-      </p:sp>
-      <p:sp>
-        <p:nvSpPr>
-          <p:cNvPr id="101" name="矩形 100"/>
-          <p:cNvSpPr/>
-          <p:nvPr/>
-        </p:nvSpPr>
-        <p:spPr>
-          <a:xfrm>
-            <a:off x="2641356" y="2236407"/>
-            <a:ext cx="360000" cy="360000"/>
-          </a:xfrm>
-          <a:prstGeom prst="rect">
-            <a:avLst/>
-          </a:prstGeom>
-        </p:spPr>
-        <p:style>
-          <a:lnRef idx="2">
-            <a:schemeClr val="accent1"/>
-          </a:lnRef>
-          <a:fillRef idx="1">
-            <a:schemeClr val="lt1"/>
-          </a:fillRef>
-          <a:effectRef idx="0">
-            <a:schemeClr val="accent1"/>
-          </a:effectRef>
-          <a:fontRef idx="minor">
-            <a:schemeClr val="dk1"/>
-          </a:fontRef>
-        </p:style>
-        <p:txBody>
-          <a:bodyPr rtlCol="0" anchor="ctr"/>
-          <a:lstStyle/>
-          <a:p>
-            <a:pPr algn="ctr"/>
-            <a:r>
-              <a:rPr lang="en-US" altLang="zh-CN" dirty="0" smtClean="0"/>
-              <a:t>0</a:t>
-            </a:r>
-            <a:endParaRPr lang="zh-CN" altLang="en-US" dirty="0"/>
-          </a:p>
-        </p:txBody>
-      </p:sp>
-      <p:sp>
-        <p:nvSpPr>
-          <p:cNvPr id="102" name="矩形 101"/>
-          <p:cNvSpPr/>
-          <p:nvPr/>
-        </p:nvSpPr>
-        <p:spPr>
-          <a:xfrm>
-            <a:off x="3001356" y="2236407"/>
-            <a:ext cx="360000" cy="360000"/>
-          </a:xfrm>
-          <a:prstGeom prst="rect">
-            <a:avLst/>
-          </a:prstGeom>
-        </p:spPr>
-        <p:style>
-          <a:lnRef idx="2">
-            <a:schemeClr val="accent1"/>
-          </a:lnRef>
-          <a:fillRef idx="1">
-            <a:schemeClr val="lt1"/>
-          </a:fillRef>
-          <a:effectRef idx="0">
-            <a:schemeClr val="accent1"/>
-          </a:effectRef>
-          <a:fontRef idx="minor">
-            <a:schemeClr val="dk1"/>
-          </a:fontRef>
-        </p:style>
-        <p:txBody>
-          <a:bodyPr rtlCol="0" anchor="ctr"/>
-          <a:lstStyle/>
-          <a:p>
-            <a:pPr algn="ctr"/>
-            <a:r>
-              <a:rPr lang="en-US" altLang="zh-CN" dirty="0" smtClean="0"/>
-              <a:t>0</a:t>
-            </a:r>
-            <a:endParaRPr lang="zh-CN" altLang="en-US" dirty="0"/>
-          </a:p>
-        </p:txBody>
-      </p:sp>
-      <p:sp>
-        <p:nvSpPr>
-          <p:cNvPr id="103" name="矩形 102"/>
-          <p:cNvSpPr/>
-          <p:nvPr/>
-        </p:nvSpPr>
-        <p:spPr>
-          <a:xfrm>
-            <a:off x="481356" y="2595000"/>
-            <a:ext cx="360000" cy="360000"/>
-          </a:xfrm>
-          <a:prstGeom prst="rect">
-            <a:avLst/>
-          </a:prstGeom>
-        </p:spPr>
-        <p:style>
-          <a:lnRef idx="2">
-            <a:schemeClr val="accent1"/>
-          </a:lnRef>
-          <a:fillRef idx="1">
-            <a:schemeClr val="lt1"/>
-          </a:fillRef>
-          <a:effectRef idx="0">
-            <a:schemeClr val="accent1"/>
-          </a:effectRef>
-          <a:fontRef idx="minor">
-            <a:schemeClr val="dk1"/>
-          </a:fontRef>
-        </p:style>
-        <p:txBody>
-          <a:bodyPr rtlCol="0" anchor="ctr"/>
-          <a:lstStyle/>
-          <a:p>
-            <a:pPr algn="ctr"/>
-            <a:r>
-              <a:rPr lang="en-US" altLang="zh-CN" dirty="0" smtClean="0"/>
-              <a:t>0</a:t>
-            </a:r>
-            <a:endParaRPr lang="zh-CN" altLang="en-US" dirty="0"/>
-          </a:p>
-        </p:txBody>
-      </p:sp>
-      <p:sp>
-        <p:nvSpPr>
-          <p:cNvPr id="104" name="矩形 103"/>
-          <p:cNvSpPr/>
-          <p:nvPr/>
-        </p:nvSpPr>
-        <p:spPr>
-          <a:xfrm>
-            <a:off x="841356" y="2595000"/>
-            <a:ext cx="360000" cy="360000"/>
-          </a:xfrm>
-          <a:prstGeom prst="rect">
-            <a:avLst/>
-          </a:prstGeom>
-        </p:spPr>
-        <p:style>
-          <a:lnRef idx="2">
-            <a:schemeClr val="accent1"/>
-          </a:lnRef>
-          <a:fillRef idx="1">
-            <a:schemeClr val="lt1"/>
-          </a:fillRef>
-          <a:effectRef idx="0">
-            <a:schemeClr val="accent1"/>
-          </a:effectRef>
-          <a:fontRef idx="minor">
-            <a:schemeClr val="dk1"/>
-          </a:fontRef>
-        </p:style>
-        <p:txBody>
-          <a:bodyPr rtlCol="0" anchor="ctr"/>
-          <a:lstStyle/>
-          <a:p>
-            <a:pPr algn="ctr"/>
-            <a:r>
-              <a:rPr lang="en-US" altLang="zh-CN" dirty="0" smtClean="0"/>
-              <a:t>0</a:t>
-            </a:r>
-            <a:endParaRPr lang="zh-CN" altLang="en-US" dirty="0"/>
-          </a:p>
-        </p:txBody>
-      </p:sp>
-      <p:sp>
-        <p:nvSpPr>
-          <p:cNvPr id="105" name="矩形 104"/>
-          <p:cNvSpPr/>
-          <p:nvPr/>
-        </p:nvSpPr>
-        <p:spPr>
-          <a:xfrm>
-            <a:off x="1201356" y="2595000"/>
-            <a:ext cx="360000" cy="360000"/>
-          </a:xfrm>
-          <a:prstGeom prst="rect">
-            <a:avLst/>
-          </a:prstGeom>
-        </p:spPr>
-        <p:style>
-          <a:lnRef idx="2">
-            <a:schemeClr val="accent1"/>
-          </a:lnRef>
-          <a:fillRef idx="1">
-            <a:schemeClr val="lt1"/>
-          </a:fillRef>
-          <a:effectRef idx="0">
-            <a:schemeClr val="accent1"/>
-          </a:effectRef>
-          <a:fontRef idx="minor">
-            <a:schemeClr val="dk1"/>
-          </a:fontRef>
-        </p:style>
-        <p:txBody>
-          <a:bodyPr rtlCol="0" anchor="ctr"/>
-          <a:lstStyle/>
-          <a:p>
-            <a:pPr algn="ctr"/>
-            <a:r>
-              <a:rPr lang="en-US" altLang="zh-CN" dirty="0" smtClean="0"/>
-              <a:t>0</a:t>
-            </a:r>
-            <a:endParaRPr lang="zh-CN" altLang="en-US" dirty="0"/>
-          </a:p>
-        </p:txBody>
-      </p:sp>
-      <p:sp>
-        <p:nvSpPr>
-          <p:cNvPr id="106" name="矩形 105"/>
-          <p:cNvSpPr/>
-          <p:nvPr/>
-        </p:nvSpPr>
-        <p:spPr>
-          <a:xfrm>
-            <a:off x="1561356" y="2595000"/>
-            <a:ext cx="360000" cy="360000"/>
-          </a:xfrm>
-          <a:prstGeom prst="rect">
-            <a:avLst/>
-          </a:prstGeom>
-        </p:spPr>
-        <p:style>
-          <a:lnRef idx="2">
-            <a:schemeClr val="accent1"/>
-          </a:lnRef>
-          <a:fillRef idx="1">
-            <a:schemeClr val="lt1"/>
-          </a:fillRef>
-          <a:effectRef idx="0">
-            <a:schemeClr val="accent1"/>
-          </a:effectRef>
-          <a:fontRef idx="minor">
-            <a:schemeClr val="dk1"/>
-          </a:fontRef>
-        </p:style>
-        <p:txBody>
-          <a:bodyPr rtlCol="0" anchor="ctr"/>
-          <a:lstStyle/>
-          <a:p>
-            <a:pPr algn="ctr"/>
-            <a:r>
-              <a:rPr lang="en-US" altLang="zh-CN" dirty="0" smtClean="0"/>
-              <a:t>0</a:t>
-            </a:r>
-            <a:endParaRPr lang="zh-CN" altLang="en-US" dirty="0"/>
-          </a:p>
-        </p:txBody>
-      </p:sp>
-      <p:sp>
-        <p:nvSpPr>
-          <p:cNvPr id="107" name="矩形 106"/>
-          <p:cNvSpPr/>
-          <p:nvPr/>
-        </p:nvSpPr>
-        <p:spPr>
-          <a:xfrm>
-            <a:off x="1921356" y="2595000"/>
-            <a:ext cx="360000" cy="360000"/>
-          </a:xfrm>
-          <a:prstGeom prst="rect">
-            <a:avLst/>
-          </a:prstGeom>
-        </p:spPr>
-        <p:style>
-          <a:lnRef idx="2">
-            <a:schemeClr val="accent1"/>
-          </a:lnRef>
-          <a:fillRef idx="1">
-            <a:schemeClr val="lt1"/>
-          </a:fillRef>
-          <a:effectRef idx="0">
-            <a:schemeClr val="accent1"/>
-          </a:effectRef>
-          <a:fontRef idx="minor">
-            <a:schemeClr val="dk1"/>
-          </a:fontRef>
-        </p:style>
-        <p:txBody>
-          <a:bodyPr rtlCol="0" anchor="ctr"/>
-          <a:lstStyle/>
-          <a:p>
-            <a:pPr algn="ctr"/>
-            <a:r>
-              <a:rPr lang="en-US" altLang="zh-CN" dirty="0" smtClean="0"/>
-              <a:t>0</a:t>
-            </a:r>
-            <a:endParaRPr lang="zh-CN" altLang="en-US" dirty="0"/>
-          </a:p>
-        </p:txBody>
-      </p:sp>
-      <p:sp>
-        <p:nvSpPr>
-          <p:cNvPr id="108" name="矩形 107"/>
-          <p:cNvSpPr/>
-          <p:nvPr/>
-        </p:nvSpPr>
-        <p:spPr>
-          <a:xfrm>
-            <a:off x="2281356" y="2595000"/>
-            <a:ext cx="360000" cy="360000"/>
-          </a:xfrm>
-          <a:prstGeom prst="rect">
-            <a:avLst/>
-          </a:prstGeom>
-        </p:spPr>
-        <p:style>
-          <a:lnRef idx="2">
-            <a:schemeClr val="accent1"/>
-          </a:lnRef>
-          <a:fillRef idx="1">
-            <a:schemeClr val="lt1"/>
-          </a:fillRef>
-          <a:effectRef idx="0">
-            <a:schemeClr val="accent1"/>
-          </a:effectRef>
-          <a:fontRef idx="minor">
-            <a:schemeClr val="dk1"/>
-          </a:fontRef>
-        </p:style>
-        <p:txBody>
-          <a:bodyPr rtlCol="0" anchor="ctr"/>
-          <a:lstStyle/>
-          <a:p>
-            <a:pPr algn="ctr"/>
-            <a:r>
-              <a:rPr lang="en-US" altLang="zh-CN" dirty="0" smtClean="0"/>
-              <a:t>0</a:t>
-            </a:r>
-            <a:endParaRPr lang="zh-CN" altLang="en-US" dirty="0"/>
-          </a:p>
-        </p:txBody>
-      </p:sp>
-      <p:sp>
-        <p:nvSpPr>
-          <p:cNvPr id="109" name="矩形 108"/>
-          <p:cNvSpPr/>
-          <p:nvPr/>
-        </p:nvSpPr>
-        <p:spPr>
-          <a:xfrm>
-            <a:off x="2641356" y="2593593"/>
-            <a:ext cx="360000" cy="360000"/>
-          </a:xfrm>
-          <a:prstGeom prst="rect">
-            <a:avLst/>
-          </a:prstGeom>
-        </p:spPr>
-        <p:style>
-          <a:lnRef idx="2">
-            <a:schemeClr val="accent1"/>
-          </a:lnRef>
-          <a:fillRef idx="1">
-            <a:schemeClr val="lt1"/>
-          </a:fillRef>
-          <a:effectRef idx="0">
-            <a:schemeClr val="accent1"/>
-          </a:effectRef>
-          <a:fontRef idx="minor">
-            <a:schemeClr val="dk1"/>
-          </a:fontRef>
-        </p:style>
-        <p:txBody>
-          <a:bodyPr rtlCol="0" anchor="ctr"/>
-          <a:lstStyle/>
-          <a:p>
-            <a:pPr algn="ctr"/>
-            <a:r>
-              <a:rPr lang="en-US" altLang="zh-CN" dirty="0" smtClean="0"/>
-              <a:t>0</a:t>
-            </a:r>
-            <a:endParaRPr lang="zh-CN" altLang="en-US" dirty="0"/>
-          </a:p>
-        </p:txBody>
-      </p:sp>
-      <p:sp>
-        <p:nvSpPr>
-          <p:cNvPr id="110" name="矩形 109"/>
-          <p:cNvSpPr/>
-          <p:nvPr/>
-        </p:nvSpPr>
-        <p:spPr>
-          <a:xfrm>
-            <a:off x="3001356" y="2593593"/>
-            <a:ext cx="360000" cy="360000"/>
-          </a:xfrm>
-          <a:prstGeom prst="rect">
-            <a:avLst/>
-          </a:prstGeom>
-        </p:spPr>
-        <p:style>
-          <a:lnRef idx="2">
-            <a:schemeClr val="accent1"/>
-          </a:lnRef>
-          <a:fillRef idx="1">
-            <a:schemeClr val="lt1"/>
-          </a:fillRef>
-          <a:effectRef idx="0">
-            <a:schemeClr val="accent1"/>
-          </a:effectRef>
-          <a:fontRef idx="minor">
-            <a:schemeClr val="dk1"/>
-          </a:fontRef>
-        </p:style>
-        <p:txBody>
-          <a:bodyPr rtlCol="0" anchor="ctr"/>
-          <a:lstStyle/>
-          <a:p>
-            <a:pPr algn="ctr"/>
-            <a:r>
-              <a:rPr lang="en-US" altLang="zh-CN" dirty="0" smtClean="0"/>
-              <a:t>0</a:t>
-            </a:r>
-            <a:endParaRPr lang="zh-CN" altLang="en-US" dirty="0"/>
-          </a:p>
-        </p:txBody>
-      </p:sp>
-    </p:spTree>
-    <p:extLst>
-      <p:ext uri="{BB962C8B-B14F-4D97-AF65-F5344CB8AC3E}">
-        <p14:creationId xmlns:p14="http://schemas.microsoft.com/office/powerpoint/2010/main" val="2960270139"/>
-      </p:ext>
-    </p:extLst>
-  </p:cSld>
-  <p:clrMapOvr>
-    <a:masterClrMapping/>
-  </p:clrMapOvr>
 </p:sld>
 </file>
 

</xml_diff>